<commit_message>
# Avance con la presentacion final
</commit_message>
<xml_diff>
--- a/presentations/presentacionFinal.pptx
+++ b/presentations/presentacionFinal.pptx
@@ -5,10 +5,10 @@
     <p:sldMasterId id="2147483648" r:id="rId1"/>
   </p:sldMasterIdLst>
   <p:notesMasterIdLst>
-    <p:notesMasterId r:id="rId18"/>
+    <p:notesMasterId r:id="rId19"/>
   </p:notesMasterIdLst>
   <p:handoutMasterIdLst>
-    <p:handoutMasterId r:id="rId19"/>
+    <p:handoutMasterId r:id="rId20"/>
   </p:handoutMasterIdLst>
   <p:sldIdLst>
     <p:sldId id="256" r:id="rId2"/>
@@ -19,14 +19,15 @@
     <p:sldId id="273" r:id="rId7"/>
     <p:sldId id="272" r:id="rId8"/>
     <p:sldId id="279" r:id="rId9"/>
-    <p:sldId id="297" r:id="rId10"/>
-    <p:sldId id="276" r:id="rId11"/>
-    <p:sldId id="282" r:id="rId12"/>
-    <p:sldId id="296" r:id="rId13"/>
-    <p:sldId id="278" r:id="rId14"/>
-    <p:sldId id="286" r:id="rId15"/>
-    <p:sldId id="293" r:id="rId16"/>
-    <p:sldId id="264" r:id="rId17"/>
+    <p:sldId id="298" r:id="rId10"/>
+    <p:sldId id="299" r:id="rId11"/>
+    <p:sldId id="297" r:id="rId12"/>
+    <p:sldId id="276" r:id="rId13"/>
+    <p:sldId id="296" r:id="rId14"/>
+    <p:sldId id="278" r:id="rId15"/>
+    <p:sldId id="286" r:id="rId16"/>
+    <p:sldId id="293" r:id="rId17"/>
+    <p:sldId id="264" r:id="rId18"/>
   </p:sldIdLst>
   <p:sldSz cx="9144000" cy="6858000" type="screen4x3"/>
   <p:notesSz cx="6858000" cy="9144000"/>
@@ -8786,6 +8787,101 @@
       </p:grpSpPr>
       <p:sp>
         <p:nvSpPr>
+          <p:cNvPr id="36866" name="Rectangle 7"/>
+          <p:cNvSpPr>
+            <a:spLocks noGrp="1" noChangeArrowheads="1"/>
+          </p:cNvSpPr>
+          <p:nvPr>
+            <p:ph type="sldNum" sz="quarter" idx="5"/>
+          </p:nvPr>
+        </p:nvSpPr>
+        <p:spPr>
+          <a:noFill/>
+        </p:spPr>
+        <p:txBody>
+          <a:bodyPr/>
+          <a:lstStyle/>
+          <a:p>
+            <a:fld id="{1E1A1660-3780-4A19-B6F5-320F2243A912}" type="slidenum">
+              <a:rPr lang="es-ES" smtClean="0"/>
+              <a:pPr/>
+              <a:t>10</a:t>
+            </a:fld>
+            <a:endParaRPr lang="es-ES" smtClean="0"/>
+          </a:p>
+        </p:txBody>
+      </p:sp>
+      <p:sp>
+        <p:nvSpPr>
+          <p:cNvPr id="36867" name="Rectangle 2"/>
+          <p:cNvSpPr>
+            <a:spLocks noGrp="1" noRot="1" noChangeAspect="1" noChangeArrowheads="1" noTextEdit="1"/>
+          </p:cNvSpPr>
+          <p:nvPr>
+            <p:ph type="sldImg"/>
+          </p:nvPr>
+        </p:nvSpPr>
+        <p:spPr>
+          <a:ln cap="flat"/>
+        </p:spPr>
+      </p:sp>
+      <p:sp>
+        <p:nvSpPr>
+          <p:cNvPr id="36868" name="Rectangle 3"/>
+          <p:cNvSpPr>
+            <a:spLocks noGrp="1" noChangeArrowheads="1"/>
+          </p:cNvSpPr>
+          <p:nvPr>
+            <p:ph type="body" idx="1"/>
+          </p:nvPr>
+        </p:nvSpPr>
+        <p:spPr>
+          <a:noFill/>
+          <a:ln/>
+        </p:spPr>
+        <p:txBody>
+          <a:bodyPr/>
+          <a:lstStyle/>
+          <a:p>
+            <a:pPr>
+              <a:buFont typeface="Arial" pitchFamily="34" charset="0"/>
+              <a:buNone/>
+            </a:pPr>
+            <a:r>
+              <a:rPr lang="es-AR" b="1" dirty="0" smtClean="0"/>
+              <a:t>Speaker:</a:t>
+            </a:r>
+            <a:endParaRPr lang="es-AR" dirty="0" smtClean="0"/>
+          </a:p>
+        </p:txBody>
+      </p:sp>
+    </p:spTree>
+  </p:cSld>
+  <p:clrMapOvr>
+    <a:masterClrMapping/>
+  </p:clrMapOvr>
+</p:notes>
+</file>
+
+<file path=ppt/notesSlides/notesSlide11.xml><?xml version="1.0" encoding="utf-8"?>
+<p:notes xmlns:a="http://schemas.openxmlformats.org/drawingml/2006/main" xmlns:r="http://schemas.openxmlformats.org/officeDocument/2006/relationships" xmlns:p="http://schemas.openxmlformats.org/presentationml/2006/main">
+  <p:cSld>
+    <p:spTree>
+      <p:nvGrpSpPr>
+        <p:cNvPr id="1" name=""/>
+        <p:cNvGrpSpPr/>
+        <p:nvPr/>
+      </p:nvGrpSpPr>
+      <p:grpSpPr>
+        <a:xfrm>
+          <a:off x="0" y="0"/>
+          <a:ext cx="0" cy="0"/>
+          <a:chOff x="0" y="0"/>
+          <a:chExt cx="0" cy="0"/>
+        </a:xfrm>
+      </p:grpSpPr>
+      <p:sp>
+        <p:nvSpPr>
           <p:cNvPr id="35842" name="Rectangle 7"/>
           <p:cNvSpPr>
             <a:spLocks noGrp="1" noChangeArrowheads="1"/>
@@ -8804,7 +8900,7 @@
             <a:fld id="{14EEAC4B-1C41-41C5-8B73-AFF1C9F3356C}" type="slidenum">
               <a:rPr lang="es-ES" smtClean="0"/>
               <a:pPr/>
-              <a:t>10</a:t>
+              <a:t>11</a:t>
             </a:fld>
             <a:endParaRPr lang="es-ES" smtClean="0"/>
           </a:p>
@@ -8862,7 +8958,7 @@
 </p:notes>
 </file>
 
-<file path=ppt/notesSlides/notesSlide11.xml><?xml version="1.0" encoding="utf-8"?>
+<file path=ppt/notesSlides/notesSlide12.xml><?xml version="1.0" encoding="utf-8"?>
 <p:notes xmlns:a="http://schemas.openxmlformats.org/drawingml/2006/main" xmlns:r="http://schemas.openxmlformats.org/officeDocument/2006/relationships" xmlns:p="http://schemas.openxmlformats.org/presentationml/2006/main">
   <p:cSld>
     <p:spTree>
@@ -8881,7 +8977,7 @@
       </p:grpSpPr>
       <p:sp>
         <p:nvSpPr>
-          <p:cNvPr id="41986" name="Rectangle 7"/>
+          <p:cNvPr id="35842" name="Rectangle 7"/>
           <p:cNvSpPr>
             <a:spLocks noGrp="1" noChangeArrowheads="1"/>
           </p:cNvSpPr>
@@ -8896,10 +8992,10 @@
           <a:bodyPr/>
           <a:lstStyle/>
           <a:p>
-            <a:fld id="{09FE994F-A800-45E0-B4A9-9BF8CAAA6AA7}" type="slidenum">
+            <a:fld id="{14EEAC4B-1C41-41C5-8B73-AFF1C9F3356C}" type="slidenum">
               <a:rPr lang="es-ES" smtClean="0"/>
               <a:pPr/>
-              <a:t>11</a:t>
+              <a:t>12</a:t>
             </a:fld>
             <a:endParaRPr lang="es-ES" smtClean="0"/>
           </a:p>
@@ -8907,7 +9003,7 @@
       </p:sp>
       <p:sp>
         <p:nvSpPr>
-          <p:cNvPr id="41987" name="Rectangle 2"/>
+          <p:cNvPr id="35843" name="Rectangle 2"/>
           <p:cNvSpPr>
             <a:spLocks noGrp="1" noRot="1" noChangeAspect="1" noChangeArrowheads="1" noTextEdit="1"/>
           </p:cNvSpPr>
@@ -8921,7 +9017,7 @@
       </p:sp>
       <p:sp>
         <p:nvSpPr>
-          <p:cNvPr id="41988" name="Rectangle 3"/>
+          <p:cNvPr id="35844" name="Rectangle 3"/>
           <p:cNvSpPr>
             <a:spLocks noGrp="1" noChangeArrowheads="1"/>
           </p:cNvSpPr>
@@ -8937,12 +9033,15 @@
           <a:bodyPr/>
           <a:lstStyle/>
           <a:p>
-            <a:pPr eaLnBrk="1" hangingPunct="1"/>
+            <a:pPr>
+              <a:buFontTx/>
+              <a:buNone/>
+            </a:pPr>
             <a:r>
               <a:rPr lang="es-AR" b="1" dirty="0" smtClean="0"/>
               <a:t>Speaker:</a:t>
             </a:r>
-            <a:endParaRPr lang="es-AR" dirty="0" smtClean="0"/>
+            <a:endParaRPr lang="es-ES_tradnl" baseline="0" dirty="0" smtClean="0"/>
           </a:p>
         </p:txBody>
       </p:sp>
@@ -8954,7 +9053,7 @@
 </p:notes>
 </file>
 
-<file path=ppt/notesSlides/notesSlide12.xml><?xml version="1.0" encoding="utf-8"?>
+<file path=ppt/notesSlides/notesSlide13.xml><?xml version="1.0" encoding="utf-8"?>
 <p:notes xmlns:a="http://schemas.openxmlformats.org/drawingml/2006/main" xmlns:r="http://schemas.openxmlformats.org/officeDocument/2006/relationships" xmlns:p="http://schemas.openxmlformats.org/presentationml/2006/main">
   <p:cSld>
     <p:spTree>
@@ -8991,7 +9090,7 @@
             <a:fld id="{060F6942-349D-437D-B6CE-AF49DFD3E8BD}" type="slidenum">
               <a:rPr lang="es-ES" smtClean="0"/>
               <a:pPr/>
-              <a:t>12</a:t>
+              <a:t>13</a:t>
             </a:fld>
             <a:endParaRPr lang="es-ES" smtClean="0"/>
           </a:p>
@@ -9046,7 +9145,7 @@
 </p:notes>
 </file>
 
-<file path=ppt/notesSlides/notesSlide13.xml><?xml version="1.0" encoding="utf-8"?>
+<file path=ppt/notesSlides/notesSlide14.xml><?xml version="1.0" encoding="utf-8"?>
 <p:notes xmlns:a="http://schemas.openxmlformats.org/drawingml/2006/main" xmlns:r="http://schemas.openxmlformats.org/officeDocument/2006/relationships" xmlns:p="http://schemas.openxmlformats.org/presentationml/2006/main">
   <p:cSld>
     <p:spTree>
@@ -9083,7 +9182,7 @@
             <a:fld id="{D9234D06-4B3E-4649-8770-4AC86EB469B1}" type="slidenum">
               <a:rPr lang="es-ES" smtClean="0"/>
               <a:pPr/>
-              <a:t>13</a:t>
+              <a:t>14</a:t>
             </a:fld>
             <a:endParaRPr lang="es-ES" smtClean="0"/>
           </a:p>
@@ -9138,7 +9237,7 @@
 </p:notes>
 </file>
 
-<file path=ppt/notesSlides/notesSlide14.xml><?xml version="1.0" encoding="utf-8"?>
+<file path=ppt/notesSlides/notesSlide15.xml><?xml version="1.0" encoding="utf-8"?>
 <p:notes xmlns:a="http://schemas.openxmlformats.org/drawingml/2006/main" xmlns:r="http://schemas.openxmlformats.org/officeDocument/2006/relationships" xmlns:p="http://schemas.openxmlformats.org/presentationml/2006/main">
   <p:cSld>
     <p:spTree>
@@ -9175,7 +9274,7 @@
             <a:fld id="{060F6942-349D-437D-B6CE-AF49DFD3E8BD}" type="slidenum">
               <a:rPr lang="es-ES" smtClean="0"/>
               <a:pPr/>
-              <a:t>14</a:t>
+              <a:t>15</a:t>
             </a:fld>
             <a:endParaRPr lang="es-ES" smtClean="0"/>
           </a:p>
@@ -9219,94 +9318,6 @@
               <a:t>Speaker:</a:t>
             </a:r>
             <a:endParaRPr lang="es-AR" b="0" baseline="0" dirty="0" smtClean="0"/>
-          </a:p>
-        </p:txBody>
-      </p:sp>
-    </p:spTree>
-  </p:cSld>
-  <p:clrMapOvr>
-    <a:masterClrMapping/>
-  </p:clrMapOvr>
-</p:notes>
-</file>
-
-<file path=ppt/notesSlides/notesSlide15.xml><?xml version="1.0" encoding="utf-8"?>
-<p:notes xmlns:a="http://schemas.openxmlformats.org/drawingml/2006/main" xmlns:r="http://schemas.openxmlformats.org/officeDocument/2006/relationships" xmlns:p="http://schemas.openxmlformats.org/presentationml/2006/main">
-  <p:cSld>
-    <p:spTree>
-      <p:nvGrpSpPr>
-        <p:cNvPr id="1" name=""/>
-        <p:cNvGrpSpPr/>
-        <p:nvPr/>
-      </p:nvGrpSpPr>
-      <p:grpSpPr>
-        <a:xfrm>
-          <a:off x="0" y="0"/>
-          <a:ext cx="0" cy="0"/>
-          <a:chOff x="0" y="0"/>
-          <a:chExt cx="0" cy="0"/>
-        </a:xfrm>
-      </p:grpSpPr>
-      <p:sp>
-        <p:nvSpPr>
-          <p:cNvPr id="48130" name="Rectangle 7"/>
-          <p:cNvSpPr>
-            <a:spLocks noGrp="1" noChangeArrowheads="1"/>
-          </p:cNvSpPr>
-          <p:nvPr>
-            <p:ph type="sldNum" sz="quarter" idx="5"/>
-          </p:nvPr>
-        </p:nvSpPr>
-        <p:spPr>
-          <a:noFill/>
-        </p:spPr>
-        <p:txBody>
-          <a:bodyPr/>
-          <a:lstStyle/>
-          <a:p>
-            <a:fld id="{4D183F08-FBD3-4A86-BA7F-79516DB782E6}" type="slidenum">
-              <a:rPr lang="es-ES" smtClean="0"/>
-              <a:pPr/>
-              <a:t>15</a:t>
-            </a:fld>
-            <a:endParaRPr lang="es-ES" smtClean="0"/>
-          </a:p>
-        </p:txBody>
-      </p:sp>
-      <p:sp>
-        <p:nvSpPr>
-          <p:cNvPr id="48131" name="Rectangle 2"/>
-          <p:cNvSpPr>
-            <a:spLocks noGrp="1" noRot="1" noChangeAspect="1" noChangeArrowheads="1" noTextEdit="1"/>
-          </p:cNvSpPr>
-          <p:nvPr>
-            <p:ph type="sldImg"/>
-          </p:nvPr>
-        </p:nvSpPr>
-        <p:spPr>
-          <a:ln cap="flat"/>
-        </p:spPr>
-      </p:sp>
-      <p:sp>
-        <p:nvSpPr>
-          <p:cNvPr id="48132" name="Rectangle 3"/>
-          <p:cNvSpPr>
-            <a:spLocks noGrp="1" noChangeArrowheads="1"/>
-          </p:cNvSpPr>
-          <p:nvPr>
-            <p:ph type="body" idx="1"/>
-          </p:nvPr>
-        </p:nvSpPr>
-        <p:spPr>
-          <a:noFill/>
-          <a:ln/>
-        </p:spPr>
-        <p:txBody>
-          <a:bodyPr/>
-          <a:lstStyle/>
-          <a:p>
-            <a:pPr eaLnBrk="1" hangingPunct="1"/>
-            <a:endParaRPr lang="es-AR" smtClean="0"/>
           </a:p>
         </p:txBody>
       </p:sp>
@@ -9406,6 +9417,94 @@
 </p:notes>
 </file>
 
+<file path=ppt/notesSlides/notesSlide17.xml><?xml version="1.0" encoding="utf-8"?>
+<p:notes xmlns:a="http://schemas.openxmlformats.org/drawingml/2006/main" xmlns:r="http://schemas.openxmlformats.org/officeDocument/2006/relationships" xmlns:p="http://schemas.openxmlformats.org/presentationml/2006/main">
+  <p:cSld>
+    <p:spTree>
+      <p:nvGrpSpPr>
+        <p:cNvPr id="1" name=""/>
+        <p:cNvGrpSpPr/>
+        <p:nvPr/>
+      </p:nvGrpSpPr>
+      <p:grpSpPr>
+        <a:xfrm>
+          <a:off x="0" y="0"/>
+          <a:ext cx="0" cy="0"/>
+          <a:chOff x="0" y="0"/>
+          <a:chExt cx="0" cy="0"/>
+        </a:xfrm>
+      </p:grpSpPr>
+      <p:sp>
+        <p:nvSpPr>
+          <p:cNvPr id="48130" name="Rectangle 7"/>
+          <p:cNvSpPr>
+            <a:spLocks noGrp="1" noChangeArrowheads="1"/>
+          </p:cNvSpPr>
+          <p:nvPr>
+            <p:ph type="sldNum" sz="quarter" idx="5"/>
+          </p:nvPr>
+        </p:nvSpPr>
+        <p:spPr>
+          <a:noFill/>
+        </p:spPr>
+        <p:txBody>
+          <a:bodyPr/>
+          <a:lstStyle/>
+          <a:p>
+            <a:fld id="{4D183F08-FBD3-4A86-BA7F-79516DB782E6}" type="slidenum">
+              <a:rPr lang="es-ES" smtClean="0"/>
+              <a:pPr/>
+              <a:t>17</a:t>
+            </a:fld>
+            <a:endParaRPr lang="es-ES" smtClean="0"/>
+          </a:p>
+        </p:txBody>
+      </p:sp>
+      <p:sp>
+        <p:nvSpPr>
+          <p:cNvPr id="48131" name="Rectangle 2"/>
+          <p:cNvSpPr>
+            <a:spLocks noGrp="1" noRot="1" noChangeAspect="1" noChangeArrowheads="1" noTextEdit="1"/>
+          </p:cNvSpPr>
+          <p:nvPr>
+            <p:ph type="sldImg"/>
+          </p:nvPr>
+        </p:nvSpPr>
+        <p:spPr>
+          <a:ln cap="flat"/>
+        </p:spPr>
+      </p:sp>
+      <p:sp>
+        <p:nvSpPr>
+          <p:cNvPr id="48132" name="Rectangle 3"/>
+          <p:cNvSpPr>
+            <a:spLocks noGrp="1" noChangeArrowheads="1"/>
+          </p:cNvSpPr>
+          <p:nvPr>
+            <p:ph type="body" idx="1"/>
+          </p:nvPr>
+        </p:nvSpPr>
+        <p:spPr>
+          <a:noFill/>
+          <a:ln/>
+        </p:spPr>
+        <p:txBody>
+          <a:bodyPr/>
+          <a:lstStyle/>
+          <a:p>
+            <a:pPr eaLnBrk="1" hangingPunct="1"/>
+            <a:endParaRPr lang="es-AR" smtClean="0"/>
+          </a:p>
+        </p:txBody>
+      </p:sp>
+    </p:spTree>
+  </p:cSld>
+  <p:clrMapOvr>
+    <a:masterClrMapping/>
+  </p:clrMapOvr>
+</p:notes>
+</file>
+
 <file path=ppt/notesSlides/notesSlide2.xml><?xml version="1.0" encoding="utf-8"?>
 <p:notes xmlns:a="http://schemas.openxmlformats.org/drawingml/2006/main" xmlns:r="http://schemas.openxmlformats.org/officeDocument/2006/relationships" xmlns:p="http://schemas.openxmlformats.org/presentationml/2006/main">
   <p:cSld>
@@ -10091,7 +10190,7 @@
       </p:grpSpPr>
       <p:sp>
         <p:nvSpPr>
-          <p:cNvPr id="35842" name="Rectangle 7"/>
+          <p:cNvPr id="36866" name="Rectangle 7"/>
           <p:cNvSpPr>
             <a:spLocks noGrp="1" noChangeArrowheads="1"/>
           </p:cNvSpPr>
@@ -10106,7 +10205,7 @@
           <a:bodyPr/>
           <a:lstStyle/>
           <a:p>
-            <a:fld id="{14EEAC4B-1C41-41C5-8B73-AFF1C9F3356C}" type="slidenum">
+            <a:fld id="{1E1A1660-3780-4A19-B6F5-320F2243A912}" type="slidenum">
               <a:rPr lang="es-ES" smtClean="0"/>
               <a:pPr/>
               <a:t>9</a:t>
@@ -10117,7 +10216,7 @@
       </p:sp>
       <p:sp>
         <p:nvSpPr>
-          <p:cNvPr id="35843" name="Rectangle 2"/>
+          <p:cNvPr id="36867" name="Rectangle 2"/>
           <p:cNvSpPr>
             <a:spLocks noGrp="1" noRot="1" noChangeAspect="1" noChangeArrowheads="1" noTextEdit="1"/>
           </p:cNvSpPr>
@@ -10131,7 +10230,7 @@
       </p:sp>
       <p:sp>
         <p:nvSpPr>
-          <p:cNvPr id="35844" name="Rectangle 3"/>
+          <p:cNvPr id="36868" name="Rectangle 3"/>
           <p:cNvSpPr>
             <a:spLocks noGrp="1" noChangeArrowheads="1"/>
           </p:cNvSpPr>
@@ -10148,14 +10247,14 @@
           <a:lstStyle/>
           <a:p>
             <a:pPr>
-              <a:buFontTx/>
+              <a:buFont typeface="Arial" pitchFamily="34" charset="0"/>
               <a:buNone/>
             </a:pPr>
             <a:r>
               <a:rPr lang="es-AR" b="1" dirty="0" smtClean="0"/>
               <a:t>Speaker:</a:t>
             </a:r>
-            <a:endParaRPr lang="es-ES_tradnl" baseline="0" dirty="0" smtClean="0"/>
+            <a:endParaRPr lang="es-AR" dirty="0" smtClean="0"/>
           </a:p>
         </p:txBody>
       </p:sp>
@@ -16559,7 +16658,7 @@
       </p:grpSpPr>
       <p:sp>
         <p:nvSpPr>
-          <p:cNvPr id="14338" name="Rectangle 4"/>
+          <p:cNvPr id="15362" name="Rectangle 2"/>
           <p:cNvSpPr>
             <a:spLocks noGrp="1" noChangeArrowheads="1"/>
           </p:cNvSpPr>
@@ -16574,20 +16673,17 @@
           <a:p>
             <a:pPr eaLnBrk="1" hangingPunct="1"/>
             <a:r>
-              <a:rPr lang="es-AR" dirty="0" smtClean="0">
+              <a:rPr lang="es-AR" sz="3200" smtClean="0">
                 <a:latin typeface="Copperplate Gothic Bold" pitchFamily="34" charset="0"/>
               </a:rPr>
-              <a:t>Cambios de Alcance</a:t>
+              <a:t>Seguimiento y Control</a:t>
             </a:r>
-            <a:endParaRPr lang="es-AR" dirty="0" smtClean="0">
-              <a:latin typeface="Copperplate Gothic Bold" pitchFamily="34" charset="0"/>
-            </a:endParaRPr>
           </a:p>
         </p:txBody>
       </p:sp>
       <p:sp>
         <p:nvSpPr>
-          <p:cNvPr id="11" name="TextBox 24"/>
+          <p:cNvPr id="25" name="TextBox 24"/>
           <p:cNvSpPr txBox="1">
             <a:spLocks noChangeArrowheads="1"/>
           </p:cNvSpPr>
@@ -16595,8 +16691,8 @@
         </p:nvSpPr>
         <p:spPr bwMode="auto">
           <a:xfrm>
-            <a:off x="1403648" y="1988840"/>
-            <a:ext cx="5832648" cy="1015663"/>
+            <a:off x="1403648" y="1700808"/>
+            <a:ext cx="4033837" cy="400110"/>
           </a:xfrm>
           <a:prstGeom prst="rect">
             <a:avLst/>
@@ -16610,15 +16706,11 @@
           </a:ln>
         </p:spPr>
         <p:txBody>
-          <a:bodyPr wrap="square">
+          <a:bodyPr>
             <a:spAutoFit/>
           </a:bodyPr>
           <a:lstStyle/>
           <a:p>
-            <a:pPr>
-              <a:buFont typeface="Arial" pitchFamily="34" charset="0"/>
-              <a:buChar char="•"/>
-            </a:pPr>
             <a:r>
               <a:rPr lang="es-AR" sz="2000" dirty="0" smtClean="0">
                 <a:solidFill>
@@ -16629,7 +16721,7 @@
                 <a:latin typeface="Cambria" pitchFamily="18" charset="0"/>
                 <a:cs typeface="Arial" charset="0"/>
               </a:rPr>
-              <a:t>Múltiples </a:t>
+              <a:t>Caso de Análisis: Sprint </a:t>
             </a:r>
             <a:r>
               <a:rPr lang="es-AR" sz="2000" dirty="0" smtClean="0">
@@ -16641,40 +16733,7 @@
                 <a:latin typeface="Cambria" pitchFamily="18" charset="0"/>
                 <a:cs typeface="Arial" charset="0"/>
               </a:rPr>
-              <a:t>supervisores</a:t>
-            </a:r>
-          </a:p>
-          <a:p>
-            <a:pPr>
-              <a:buFont typeface="Arial" pitchFamily="34" charset="0"/>
-              <a:buChar char="•"/>
-            </a:pPr>
-            <a:endParaRPr lang="es-AR" sz="2000" dirty="0" smtClean="0">
-              <a:solidFill>
-                <a:schemeClr val="tx2">
-                  <a:lumMod val="50000"/>
-                </a:schemeClr>
-              </a:solidFill>
-              <a:latin typeface="Cambria" pitchFamily="18" charset="0"/>
-              <a:cs typeface="Arial" charset="0"/>
-            </a:endParaRPr>
-          </a:p>
-          <a:p>
-            <a:pPr>
-              <a:buFont typeface="Arial" pitchFamily="34" charset="0"/>
-              <a:buChar char="•"/>
-            </a:pPr>
-            <a:r>
-              <a:rPr lang="es-AR" sz="2000" dirty="0" smtClean="0">
-                <a:solidFill>
-                  <a:schemeClr val="tx2">
-                    <a:lumMod val="50000"/>
-                  </a:schemeClr>
-                </a:solidFill>
-                <a:latin typeface="Cambria" pitchFamily="18" charset="0"/>
-                <a:cs typeface="Arial" charset="0"/>
-              </a:rPr>
-              <a:t>…</a:t>
+              <a:t>4</a:t>
             </a:r>
             <a:endParaRPr lang="es-AR" sz="2000" dirty="0">
               <a:solidFill>
@@ -16688,6 +16747,112 @@
           </a:p>
         </p:txBody>
       </p:sp>
+      <p:grpSp>
+        <p:nvGrpSpPr>
+          <p:cNvPr id="7" name="6 Grupo"/>
+          <p:cNvGrpSpPr/>
+          <p:nvPr/>
+        </p:nvGrpSpPr>
+        <p:grpSpPr>
+          <a:xfrm>
+            <a:off x="971600" y="2132856"/>
+            <a:ext cx="7805330" cy="4536504"/>
+            <a:chOff x="971600" y="2132856"/>
+            <a:chExt cx="7805330" cy="4536504"/>
+          </a:xfrm>
+        </p:grpSpPr>
+        <p:sp>
+          <p:nvSpPr>
+            <p:cNvPr id="5" name="TextBox 24"/>
+            <p:cNvSpPr txBox="1">
+              <a:spLocks noChangeArrowheads="1"/>
+            </p:cNvSpPr>
+            <p:nvPr/>
+          </p:nvSpPr>
+          <p:spPr bwMode="auto">
+            <a:xfrm>
+              <a:off x="7164288" y="2132856"/>
+              <a:ext cx="1612642" cy="338554"/>
+            </a:xfrm>
+            <a:prstGeom prst="rect">
+              <a:avLst/>
+            </a:prstGeom>
+            <a:noFill/>
+            <a:ln w="9525">
+              <a:noFill/>
+              <a:miter lim="800000"/>
+              <a:headEnd/>
+              <a:tailEnd/>
+            </a:ln>
+          </p:spPr>
+          <p:txBody>
+            <a:bodyPr wrap="square">
+              <a:spAutoFit/>
+            </a:bodyPr>
+            <a:lstStyle/>
+            <a:p>
+              <a:r>
+                <a:rPr lang="es-AR" sz="1600" b="1" dirty="0" smtClean="0">
+                  <a:solidFill>
+                    <a:schemeClr val="tx1">
+                      <a:lumMod val="95000"/>
+                      <a:lumOff val="5000"/>
+                    </a:schemeClr>
+                  </a:solidFill>
+                  <a:latin typeface="Cambria" pitchFamily="18" charset="0"/>
+                  <a:cs typeface="Arial" charset="0"/>
+                </a:rPr>
+                <a:t>Costo en horas</a:t>
+              </a:r>
+              <a:endParaRPr lang="es-AR" sz="1600" b="1" dirty="0">
+                <a:solidFill>
+                  <a:schemeClr val="tx1">
+                    <a:lumMod val="95000"/>
+                    <a:lumOff val="5000"/>
+                  </a:schemeClr>
+                </a:solidFill>
+                <a:latin typeface="Cambria" pitchFamily="18" charset="0"/>
+                <a:cs typeface="Arial" charset="0"/>
+              </a:endParaRPr>
+            </a:p>
+          </p:txBody>
+        </p:sp>
+        <p:pic>
+          <p:nvPicPr>
+            <p:cNvPr id="3074" name="Gráfico 3"/>
+            <p:cNvPicPr>
+              <a:picLocks noChangeArrowheads="1"/>
+            </p:cNvPicPr>
+            <p:nvPr/>
+          </p:nvPicPr>
+          <p:blipFill>
+            <a:blip r:embed="rId3" cstate="print"/>
+            <a:srcRect/>
+            <a:stretch>
+              <a:fillRect/>
+            </a:stretch>
+          </p:blipFill>
+          <p:spPr bwMode="auto">
+            <a:xfrm>
+              <a:off x="971600" y="2564033"/>
+              <a:ext cx="7632924" cy="4105327"/>
+            </a:xfrm>
+            <a:prstGeom prst="rect">
+              <a:avLst/>
+            </a:prstGeom>
+            <a:ln>
+              <a:noFill/>
+            </a:ln>
+            <a:effectLst>
+              <a:outerShdw blurRad="190500" algn="tl" rotWithShape="0">
+                <a:srgbClr val="000000">
+                  <a:alpha val="70000"/>
+                </a:srgbClr>
+              </a:outerShdw>
+            </a:effectLst>
+          </p:spPr>
+        </p:pic>
+      </p:grpSp>
     </p:spTree>
   </p:cSld>
   <p:clrMapOvr>
@@ -16696,7 +16861,86 @@
   <p:timing>
     <p:tnLst>
       <p:par>
-        <p:cTn id="1" dur="indefinite" restart="never" nodeType="tmRoot"/>
+        <p:cTn id="1" dur="indefinite" restart="never" nodeType="tmRoot">
+          <p:childTnLst>
+            <p:seq concurrent="1" nextAc="seek">
+              <p:cTn id="2" dur="indefinite" nodeType="mainSeq">
+                <p:childTnLst>
+                  <p:par>
+                    <p:cTn id="3" fill="hold">
+                      <p:stCondLst>
+                        <p:cond delay="indefinite"/>
+                        <p:cond evt="onBegin" delay="0">
+                          <p:tn val="2"/>
+                        </p:cond>
+                      </p:stCondLst>
+                      <p:childTnLst>
+                        <p:par>
+                          <p:cTn id="4" fill="hold">
+                            <p:stCondLst>
+                              <p:cond delay="0"/>
+                            </p:stCondLst>
+                            <p:childTnLst>
+                              <p:par>
+                                <p:cTn id="5" presetID="10" presetClass="entr" presetSubtype="0" fill="hold" nodeType="withEffect">
+                                  <p:stCondLst>
+                                    <p:cond delay="0"/>
+                                  </p:stCondLst>
+                                  <p:childTnLst>
+                                    <p:set>
+                                      <p:cBhvr>
+                                        <p:cTn id="6" dur="1" fill="hold">
+                                          <p:stCondLst>
+                                            <p:cond delay="0"/>
+                                          </p:stCondLst>
+                                        </p:cTn>
+                                        <p:tgtEl>
+                                          <p:spTgt spid="7"/>
+                                        </p:tgtEl>
+                                        <p:attrNameLst>
+                                          <p:attrName>style.visibility</p:attrName>
+                                        </p:attrNameLst>
+                                      </p:cBhvr>
+                                      <p:to>
+                                        <p:strVal val="visible"/>
+                                      </p:to>
+                                    </p:set>
+                                    <p:animEffect transition="in" filter="fade">
+                                      <p:cBhvr>
+                                        <p:cTn id="7" dur="2000"/>
+                                        <p:tgtEl>
+                                          <p:spTgt spid="7"/>
+                                        </p:tgtEl>
+                                      </p:cBhvr>
+                                    </p:animEffect>
+                                  </p:childTnLst>
+                                </p:cTn>
+                              </p:par>
+                            </p:childTnLst>
+                          </p:cTn>
+                        </p:par>
+                      </p:childTnLst>
+                    </p:cTn>
+                  </p:par>
+                </p:childTnLst>
+              </p:cTn>
+              <p:prevCondLst>
+                <p:cond evt="onPrev" delay="0">
+                  <p:tgtEl>
+                    <p:sldTgt/>
+                  </p:tgtEl>
+                </p:cond>
+              </p:prevCondLst>
+              <p:nextCondLst>
+                <p:cond evt="onNext" delay="0">
+                  <p:tgtEl>
+                    <p:sldTgt/>
+                  </p:tgtEl>
+                </p:cond>
+              </p:nextCondLst>
+            </p:seq>
+          </p:childTnLst>
+        </p:cTn>
       </p:par>
     </p:tnLst>
   </p:timing>
@@ -16722,7 +16966,7 @@
       </p:grpSpPr>
       <p:sp>
         <p:nvSpPr>
-          <p:cNvPr id="3076" name="Rectangle 2"/>
+          <p:cNvPr id="14338" name="Rectangle 4"/>
           <p:cNvSpPr>
             <a:spLocks noGrp="1" noChangeArrowheads="1"/>
           </p:cNvSpPr>
@@ -16740,14 +16984,343 @@
               <a:rPr lang="es-AR" dirty="0" smtClean="0">
                 <a:latin typeface="Copperplate Gothic Bold" pitchFamily="34" charset="0"/>
               </a:rPr>
-              <a:t>Pruebas</a:t>
+              <a:t>Desvíos No Planificados</a:t>
+            </a:r>
+          </a:p>
+        </p:txBody>
+      </p:sp>
+      <p:grpSp>
+        <p:nvGrpSpPr>
+          <p:cNvPr id="7" name="6 Grupo"/>
+          <p:cNvGrpSpPr/>
+          <p:nvPr/>
+        </p:nvGrpSpPr>
+        <p:grpSpPr>
+          <a:xfrm>
+            <a:off x="1403648" y="1772816"/>
+            <a:ext cx="6928964" cy="4752528"/>
+            <a:chOff x="1403648" y="1772816"/>
+            <a:chExt cx="6928964" cy="4752528"/>
+          </a:xfrm>
+        </p:grpSpPr>
+        <p:sp>
+          <p:nvSpPr>
+            <p:cNvPr id="11" name="TextBox 24"/>
+            <p:cNvSpPr txBox="1">
+              <a:spLocks noChangeArrowheads="1"/>
+            </p:cNvSpPr>
+            <p:nvPr/>
+          </p:nvSpPr>
+          <p:spPr bwMode="auto">
+            <a:xfrm>
+              <a:off x="1403648" y="1772816"/>
+              <a:ext cx="5832648" cy="400110"/>
+            </a:xfrm>
+            <a:prstGeom prst="rect">
+              <a:avLst/>
+            </a:prstGeom>
+            <a:noFill/>
+            <a:ln w="9525">
+              <a:noFill/>
+              <a:miter lim="800000"/>
+              <a:headEnd/>
+              <a:tailEnd/>
+            </a:ln>
+          </p:spPr>
+          <p:txBody>
+            <a:bodyPr wrap="square">
+              <a:spAutoFit/>
+            </a:bodyPr>
+            <a:lstStyle/>
+            <a:p>
+              <a:pPr>
+                <a:buFont typeface="Arial" pitchFamily="34" charset="0"/>
+                <a:buChar char="•"/>
+              </a:pPr>
+              <a:r>
+                <a:rPr lang="es-AR" sz="2000" dirty="0" smtClean="0">
+                  <a:solidFill>
+                    <a:schemeClr val="tx2">
+                      <a:lumMod val="50000"/>
+                    </a:schemeClr>
+                  </a:solidFill>
+                  <a:latin typeface="Cambria" pitchFamily="18" charset="0"/>
+                  <a:cs typeface="Arial" charset="0"/>
+                </a:rPr>
+                <a:t> </a:t>
+              </a:r>
+              <a:r>
+                <a:rPr lang="es-AR" sz="2000" dirty="0" err="1" smtClean="0">
+                  <a:solidFill>
+                    <a:schemeClr val="tx2">
+                      <a:lumMod val="50000"/>
+                    </a:schemeClr>
+                  </a:solidFill>
+                  <a:latin typeface="Cambria" pitchFamily="18" charset="0"/>
+                  <a:cs typeface="Arial" charset="0"/>
+                </a:rPr>
+                <a:t>Code</a:t>
+              </a:r>
+              <a:r>
+                <a:rPr lang="es-AR" sz="2000" dirty="0" smtClean="0">
+                  <a:solidFill>
+                    <a:schemeClr val="tx2">
+                      <a:lumMod val="50000"/>
+                    </a:schemeClr>
+                  </a:solidFill>
+                  <a:latin typeface="Cambria" pitchFamily="18" charset="0"/>
+                  <a:cs typeface="Arial" charset="0"/>
+                </a:rPr>
+                <a:t> </a:t>
+              </a:r>
+              <a:r>
+                <a:rPr lang="es-AR" sz="2000" dirty="0" err="1" smtClean="0">
+                  <a:solidFill>
+                    <a:schemeClr val="tx2">
+                      <a:lumMod val="50000"/>
+                    </a:schemeClr>
+                  </a:solidFill>
+                  <a:latin typeface="Cambria" pitchFamily="18" charset="0"/>
+                  <a:cs typeface="Arial" charset="0"/>
+                </a:rPr>
+                <a:t>C</a:t>
+              </a:r>
+              <a:r>
+                <a:rPr lang="es-AR" sz="2000" dirty="0" err="1" smtClean="0">
+                  <a:solidFill>
+                    <a:schemeClr val="tx2">
+                      <a:lumMod val="50000"/>
+                    </a:schemeClr>
+                  </a:solidFill>
+                  <a:latin typeface="Cambria" pitchFamily="18" charset="0"/>
+                  <a:cs typeface="Arial" charset="0"/>
+                </a:rPr>
+                <a:t>overage</a:t>
+              </a:r>
+              <a:endParaRPr lang="es-AR" sz="2000" dirty="0">
+                <a:solidFill>
+                  <a:schemeClr val="tx2">
+                    <a:lumMod val="50000"/>
+                  </a:schemeClr>
+                </a:solidFill>
+                <a:latin typeface="Cambria" pitchFamily="18" charset="0"/>
+                <a:cs typeface="Arial" charset="0"/>
+              </a:endParaRPr>
+            </a:p>
+          </p:txBody>
+        </p:sp>
+        <p:pic>
+          <p:nvPicPr>
+            <p:cNvPr id="6" name="5 Imagen" descr="CodeCoverage.PNG"/>
+            <p:cNvPicPr>
+              <a:picLocks noChangeAspect="1"/>
+            </p:cNvPicPr>
+            <p:nvPr/>
+          </p:nvPicPr>
+          <p:blipFill>
+            <a:blip r:embed="rId3" cstate="print"/>
+            <a:stretch>
+              <a:fillRect/>
+            </a:stretch>
+          </p:blipFill>
+          <p:spPr>
+            <a:xfrm>
+              <a:off x="1475656" y="2276872"/>
+              <a:ext cx="6856956" cy="4248472"/>
+            </a:xfrm>
+            <a:prstGeom prst="rect">
+              <a:avLst/>
+            </a:prstGeom>
+            <a:ln>
+              <a:noFill/>
+            </a:ln>
+            <a:effectLst>
+              <a:outerShdw blurRad="190500" algn="tl" rotWithShape="0">
+                <a:srgbClr val="000000">
+                  <a:alpha val="70000"/>
+                </a:srgbClr>
+              </a:outerShdw>
+            </a:effectLst>
+          </p:spPr>
+        </p:pic>
+      </p:grpSp>
+    </p:spTree>
+  </p:cSld>
+  <p:clrMapOvr>
+    <a:masterClrMapping/>
+  </p:clrMapOvr>
+  <p:timing>
+    <p:tnLst>
+      <p:par>
+        <p:cTn id="1" dur="indefinite" restart="never" nodeType="tmRoot">
+          <p:childTnLst>
+            <p:seq concurrent="1" nextAc="seek">
+              <p:cTn id="2" dur="indefinite" nodeType="mainSeq">
+                <p:childTnLst>
+                  <p:par>
+                    <p:cTn id="3" fill="hold">
+                      <p:stCondLst>
+                        <p:cond delay="indefinite"/>
+                        <p:cond evt="onBegin" delay="0">
+                          <p:tn val="2"/>
+                        </p:cond>
+                      </p:stCondLst>
+                      <p:childTnLst>
+                        <p:par>
+                          <p:cTn id="4" fill="hold">
+                            <p:stCondLst>
+                              <p:cond delay="0"/>
+                            </p:stCondLst>
+                            <p:childTnLst>
+                              <p:par>
+                                <p:cTn id="5" presetID="2" presetClass="entr" presetSubtype="4" fill="hold" nodeType="withEffect">
+                                  <p:stCondLst>
+                                    <p:cond delay="0"/>
+                                  </p:stCondLst>
+                                  <p:childTnLst>
+                                    <p:set>
+                                      <p:cBhvr>
+                                        <p:cTn id="6" dur="1" fill="hold">
+                                          <p:stCondLst>
+                                            <p:cond delay="0"/>
+                                          </p:stCondLst>
+                                        </p:cTn>
+                                        <p:tgtEl>
+                                          <p:spTgt spid="7"/>
+                                        </p:tgtEl>
+                                        <p:attrNameLst>
+                                          <p:attrName>style.visibility</p:attrName>
+                                        </p:attrNameLst>
+                                      </p:cBhvr>
+                                      <p:to>
+                                        <p:strVal val="visible"/>
+                                      </p:to>
+                                    </p:set>
+                                    <p:anim calcmode="lin" valueType="num">
+                                      <p:cBhvr additive="base">
+                                        <p:cTn id="7" dur="500" fill="hold"/>
+                                        <p:tgtEl>
+                                          <p:spTgt spid="7"/>
+                                        </p:tgtEl>
+                                        <p:attrNameLst>
+                                          <p:attrName>ppt_x</p:attrName>
+                                        </p:attrNameLst>
+                                      </p:cBhvr>
+                                      <p:tavLst>
+                                        <p:tav tm="0">
+                                          <p:val>
+                                            <p:strVal val="#ppt_x"/>
+                                          </p:val>
+                                        </p:tav>
+                                        <p:tav tm="100000">
+                                          <p:val>
+                                            <p:strVal val="#ppt_x"/>
+                                          </p:val>
+                                        </p:tav>
+                                      </p:tavLst>
+                                    </p:anim>
+                                    <p:anim calcmode="lin" valueType="num">
+                                      <p:cBhvr additive="base">
+                                        <p:cTn id="8" dur="500" fill="hold"/>
+                                        <p:tgtEl>
+                                          <p:spTgt spid="7"/>
+                                        </p:tgtEl>
+                                        <p:attrNameLst>
+                                          <p:attrName>ppt_y</p:attrName>
+                                        </p:attrNameLst>
+                                      </p:cBhvr>
+                                      <p:tavLst>
+                                        <p:tav tm="0">
+                                          <p:val>
+                                            <p:strVal val="1+#ppt_h/2"/>
+                                          </p:val>
+                                        </p:tav>
+                                        <p:tav tm="100000">
+                                          <p:val>
+                                            <p:strVal val="#ppt_y"/>
+                                          </p:val>
+                                        </p:tav>
+                                      </p:tavLst>
+                                    </p:anim>
+                                  </p:childTnLst>
+                                </p:cTn>
+                              </p:par>
+                            </p:childTnLst>
+                          </p:cTn>
+                        </p:par>
+                      </p:childTnLst>
+                    </p:cTn>
+                  </p:par>
+                </p:childTnLst>
+              </p:cTn>
+              <p:prevCondLst>
+                <p:cond evt="onPrev" delay="0">
+                  <p:tgtEl>
+                    <p:sldTgt/>
+                  </p:tgtEl>
+                </p:cond>
+              </p:prevCondLst>
+              <p:nextCondLst>
+                <p:cond evt="onNext" delay="0">
+                  <p:tgtEl>
+                    <p:sldTgt/>
+                  </p:tgtEl>
+                </p:cond>
+              </p:nextCondLst>
+            </p:seq>
+          </p:childTnLst>
+        </p:cTn>
+      </p:par>
+    </p:tnLst>
+  </p:timing>
+</p:sld>
+</file>
+
+<file path=ppt/slides/slide12.xml><?xml version="1.0" encoding="utf-8"?>
+<p:sld xmlns:a="http://schemas.openxmlformats.org/drawingml/2006/main" xmlns:r="http://schemas.openxmlformats.org/officeDocument/2006/relationships" xmlns:p="http://schemas.openxmlformats.org/presentationml/2006/main">
+  <p:cSld>
+    <p:spTree>
+      <p:nvGrpSpPr>
+        <p:cNvPr id="1" name=""/>
+        <p:cNvGrpSpPr/>
+        <p:nvPr/>
+      </p:nvGrpSpPr>
+      <p:grpSpPr>
+        <a:xfrm>
+          <a:off x="0" y="0"/>
+          <a:ext cx="0" cy="0"/>
+          <a:chOff x="0" y="0"/>
+          <a:chExt cx="0" cy="0"/>
+        </a:xfrm>
+      </p:grpSpPr>
+      <p:sp>
+        <p:nvSpPr>
+          <p:cNvPr id="14338" name="Rectangle 4"/>
+          <p:cNvSpPr>
+            <a:spLocks noGrp="1" noChangeArrowheads="1"/>
+          </p:cNvSpPr>
+          <p:nvPr>
+            <p:ph type="title"/>
+          </p:nvPr>
+        </p:nvSpPr>
+        <p:spPr/>
+        <p:txBody>
+          <a:bodyPr/>
+          <a:lstStyle/>
+          <a:p>
+            <a:pPr eaLnBrk="1" hangingPunct="1"/>
+            <a:r>
+              <a:rPr lang="es-AR" dirty="0" smtClean="0">
+                <a:latin typeface="Copperplate Gothic Bold" pitchFamily="34" charset="0"/>
+              </a:rPr>
+              <a:t>Cambios de Alcance</a:t>
             </a:r>
           </a:p>
         </p:txBody>
       </p:sp>
       <p:sp>
         <p:nvSpPr>
-          <p:cNvPr id="14" name="TextBox 24"/>
+          <p:cNvPr id="11" name="TextBox 24"/>
           <p:cNvSpPr txBox="1">
             <a:spLocks noChangeArrowheads="1"/>
           </p:cNvSpPr>
@@ -16756,7 +17329,7 @@
         <p:spPr bwMode="auto">
           <a:xfrm>
             <a:off x="1403648" y="1988840"/>
-            <a:ext cx="5832648" cy="1631216"/>
+            <a:ext cx="5832648" cy="400110"/>
           </a:xfrm>
           <a:prstGeom prst="rect">
             <a:avLst/>
@@ -16789,153 +17362,9 @@
                 <a:latin typeface="Cambria" pitchFamily="18" charset="0"/>
                 <a:cs typeface="Arial" charset="0"/>
               </a:rPr>
-              <a:t>Pruebas unitarias: Problemas de </a:t>
-            </a:r>
-            <a:r>
-              <a:rPr lang="es-AR" sz="2000" dirty="0" err="1" smtClean="0">
-                <a:solidFill>
-                  <a:schemeClr val="tx2">
-                    <a:lumMod val="50000"/>
-                  </a:schemeClr>
-                </a:solidFill>
-                <a:latin typeface="Cambria" pitchFamily="18" charset="0"/>
-                <a:cs typeface="Arial" charset="0"/>
-              </a:rPr>
-              <a:t>coverage</a:t>
+              <a:t> Múltiples supervisores</a:t>
             </a:r>
             <a:endParaRPr lang="es-AR" sz="2000" dirty="0" smtClean="0">
-              <a:solidFill>
-                <a:schemeClr val="tx2">
-                  <a:lumMod val="50000"/>
-                </a:schemeClr>
-              </a:solidFill>
-              <a:latin typeface="Cambria" pitchFamily="18" charset="0"/>
-              <a:cs typeface="Arial" charset="0"/>
-            </a:endParaRPr>
-          </a:p>
-          <a:p>
-            <a:pPr>
-              <a:buFont typeface="Arial" pitchFamily="34" charset="0"/>
-              <a:buChar char="•"/>
-            </a:pPr>
-            <a:endParaRPr lang="es-AR" sz="2000" dirty="0" smtClean="0">
-              <a:solidFill>
-                <a:schemeClr val="tx2">
-                  <a:lumMod val="50000"/>
-                </a:schemeClr>
-              </a:solidFill>
-              <a:latin typeface="Cambria" pitchFamily="18" charset="0"/>
-              <a:cs typeface="Arial" charset="0"/>
-            </a:endParaRPr>
-          </a:p>
-          <a:p>
-            <a:pPr>
-              <a:buFont typeface="Arial" pitchFamily="34" charset="0"/>
-              <a:buChar char="•"/>
-            </a:pPr>
-            <a:r>
-              <a:rPr lang="es-AR" sz="2000" dirty="0" smtClean="0">
-                <a:solidFill>
-                  <a:schemeClr val="tx2">
-                    <a:lumMod val="50000"/>
-                  </a:schemeClr>
-                </a:solidFill>
-                <a:latin typeface="Cambria" pitchFamily="18" charset="0"/>
-                <a:cs typeface="Arial" charset="0"/>
-              </a:rPr>
-              <a:t>Pruebas  de integración: Verificación de </a:t>
-            </a:r>
-            <a:r>
-              <a:rPr lang="es-AR" sz="2000" dirty="0" err="1" smtClean="0">
-                <a:solidFill>
-                  <a:schemeClr val="tx2">
-                    <a:lumMod val="50000"/>
-                  </a:schemeClr>
-                </a:solidFill>
-                <a:latin typeface="Cambria" pitchFamily="18" charset="0"/>
-                <a:cs typeface="Arial" charset="0"/>
-              </a:rPr>
-              <a:t>UATs</a:t>
-            </a:r>
-            <a:endParaRPr lang="es-AR" sz="2000" dirty="0" smtClean="0">
-              <a:solidFill>
-                <a:schemeClr val="tx2">
-                  <a:lumMod val="50000"/>
-                </a:schemeClr>
-              </a:solidFill>
-              <a:latin typeface="Cambria" pitchFamily="18" charset="0"/>
-              <a:cs typeface="Arial" charset="0"/>
-            </a:endParaRPr>
-          </a:p>
-          <a:p>
-            <a:pPr>
-              <a:buFont typeface="Arial" pitchFamily="34" charset="0"/>
-              <a:buChar char="•"/>
-            </a:pPr>
-            <a:endParaRPr lang="es-AR" sz="2000" dirty="0" smtClean="0">
-              <a:solidFill>
-                <a:schemeClr val="tx2">
-                  <a:lumMod val="50000"/>
-                </a:schemeClr>
-              </a:solidFill>
-              <a:latin typeface="Cambria" pitchFamily="18" charset="0"/>
-              <a:cs typeface="Arial" charset="0"/>
-            </a:endParaRPr>
-          </a:p>
-          <a:p>
-            <a:pPr>
-              <a:buFont typeface="Arial" pitchFamily="34" charset="0"/>
-              <a:buChar char="•"/>
-            </a:pPr>
-            <a:r>
-              <a:rPr lang="es-AR" sz="2000" dirty="0" smtClean="0">
-                <a:solidFill>
-                  <a:schemeClr val="tx2">
-                    <a:lumMod val="50000"/>
-                  </a:schemeClr>
-                </a:solidFill>
-                <a:latin typeface="Cambria" pitchFamily="18" charset="0"/>
-                <a:cs typeface="Arial" charset="0"/>
-              </a:rPr>
-              <a:t>Seguimiento de </a:t>
-            </a:r>
-            <a:r>
-              <a:rPr lang="es-AR" sz="2000" dirty="0" err="1" smtClean="0">
-                <a:solidFill>
-                  <a:schemeClr val="tx2">
-                    <a:lumMod val="50000"/>
-                  </a:schemeClr>
-                </a:solidFill>
-                <a:latin typeface="Cambria" pitchFamily="18" charset="0"/>
-                <a:cs typeface="Arial" charset="0"/>
-              </a:rPr>
-              <a:t>bugs</a:t>
-            </a:r>
-            <a:r>
-              <a:rPr lang="es-AR" sz="2000" dirty="0" smtClean="0">
-                <a:solidFill>
-                  <a:schemeClr val="tx2">
-                    <a:lumMod val="50000"/>
-                  </a:schemeClr>
-                </a:solidFill>
-                <a:latin typeface="Cambria" pitchFamily="18" charset="0"/>
-                <a:cs typeface="Arial" charset="0"/>
-              </a:rPr>
-              <a:t>: </a:t>
-            </a:r>
-            <a:r>
-              <a:rPr lang="es-AR" sz="2000" dirty="0" err="1" smtClean="0">
-                <a:solidFill>
-                  <a:schemeClr val="tx2">
-                    <a:lumMod val="50000"/>
-                  </a:schemeClr>
-                </a:solidFill>
-                <a:latin typeface="Cambria" pitchFamily="18" charset="0"/>
-                <a:cs typeface="Arial" charset="0"/>
-              </a:rPr>
-              <a:t>Wolof</a:t>
-            </a:r>
-            <a:endParaRPr lang="es-AR" sz="2000" dirty="0">
               <a:solidFill>
                 <a:schemeClr val="tx2">
                   <a:lumMod val="50000"/>
@@ -16962,7 +17391,7 @@
 </p:sld>
 </file>
 
-<file path=ppt/slides/slide12.xml><?xml version="1.0" encoding="utf-8"?>
+<file path=ppt/slides/slide13.xml><?xml version="1.0" encoding="utf-8"?>
 <p:sld xmlns:a="http://schemas.openxmlformats.org/drawingml/2006/main" xmlns:r="http://schemas.openxmlformats.org/officeDocument/2006/relationships" xmlns:p="http://schemas.openxmlformats.org/presentationml/2006/main">
   <p:cSld>
     <p:spTree>
@@ -17084,14 +17513,142 @@
   <p:timing>
     <p:tnLst>
       <p:par>
-        <p:cTn id="1" dur="indefinite" restart="never" nodeType="tmRoot"/>
+        <p:cTn id="1" dur="indefinite" restart="never" nodeType="tmRoot">
+          <p:childTnLst>
+            <p:seq concurrent="1" nextAc="seek">
+              <p:cTn id="2" dur="indefinite" nodeType="mainSeq">
+                <p:childTnLst>
+                  <p:par>
+                    <p:cTn id="3" fill="hold">
+                      <p:stCondLst>
+                        <p:cond delay="indefinite"/>
+                        <p:cond evt="onBegin" delay="0">
+                          <p:tn val="2"/>
+                        </p:cond>
+                      </p:stCondLst>
+                      <p:childTnLst>
+                        <p:par>
+                          <p:cTn id="4" fill="hold">
+                            <p:stCondLst>
+                              <p:cond delay="0"/>
+                            </p:stCondLst>
+                            <p:childTnLst>
+                              <p:par>
+                                <p:cTn id="5" presetID="53" presetClass="entr" presetSubtype="0" fill="hold" grpId="0" nodeType="withEffect">
+                                  <p:stCondLst>
+                                    <p:cond delay="0"/>
+                                  </p:stCondLst>
+                                  <p:childTnLst>
+                                    <p:set>
+                                      <p:cBhvr>
+                                        <p:cTn id="6" dur="1" fill="hold">
+                                          <p:stCondLst>
+                                            <p:cond delay="0"/>
+                                          </p:stCondLst>
+                                        </p:cTn>
+                                        <p:tgtEl>
+                                          <p:spTgt spid="3"/>
+                                        </p:tgtEl>
+                                        <p:attrNameLst>
+                                          <p:attrName>style.visibility</p:attrName>
+                                        </p:attrNameLst>
+                                      </p:cBhvr>
+                                      <p:to>
+                                        <p:strVal val="visible"/>
+                                      </p:to>
+                                    </p:set>
+                                    <p:anim calcmode="lin" valueType="num">
+                                      <p:cBhvr>
+                                        <p:cTn id="7" dur="500" fill="hold"/>
+                                        <p:tgtEl>
+                                          <p:spTgt spid="3"/>
+                                        </p:tgtEl>
+                                        <p:attrNameLst>
+                                          <p:attrName>ppt_w</p:attrName>
+                                        </p:attrNameLst>
+                                      </p:cBhvr>
+                                      <p:tavLst>
+                                        <p:tav tm="0">
+                                          <p:val>
+                                            <p:fltVal val="0"/>
+                                          </p:val>
+                                        </p:tav>
+                                        <p:tav tm="100000">
+                                          <p:val>
+                                            <p:strVal val="#ppt_w"/>
+                                          </p:val>
+                                        </p:tav>
+                                      </p:tavLst>
+                                    </p:anim>
+                                    <p:anim calcmode="lin" valueType="num">
+                                      <p:cBhvr>
+                                        <p:cTn id="8" dur="500" fill="hold"/>
+                                        <p:tgtEl>
+                                          <p:spTgt spid="3"/>
+                                        </p:tgtEl>
+                                        <p:attrNameLst>
+                                          <p:attrName>ppt_h</p:attrName>
+                                        </p:attrNameLst>
+                                      </p:cBhvr>
+                                      <p:tavLst>
+                                        <p:tav tm="0">
+                                          <p:val>
+                                            <p:fltVal val="0"/>
+                                          </p:val>
+                                        </p:tav>
+                                        <p:tav tm="100000">
+                                          <p:val>
+                                            <p:strVal val="#ppt_h"/>
+                                          </p:val>
+                                        </p:tav>
+                                      </p:tavLst>
+                                    </p:anim>
+                                    <p:animEffect transition="in" filter="fade">
+                                      <p:cBhvr>
+                                        <p:cTn id="9" dur="500"/>
+                                        <p:tgtEl>
+                                          <p:spTgt spid="3"/>
+                                        </p:tgtEl>
+                                      </p:cBhvr>
+                                    </p:animEffect>
+                                  </p:childTnLst>
+                                </p:cTn>
+                              </p:par>
+                            </p:childTnLst>
+                          </p:cTn>
+                        </p:par>
+                      </p:childTnLst>
+                    </p:cTn>
+                  </p:par>
+                </p:childTnLst>
+              </p:cTn>
+              <p:prevCondLst>
+                <p:cond evt="onPrev" delay="0">
+                  <p:tgtEl>
+                    <p:sldTgt/>
+                  </p:tgtEl>
+                </p:cond>
+              </p:prevCondLst>
+              <p:nextCondLst>
+                <p:cond evt="onNext" delay="0">
+                  <p:tgtEl>
+                    <p:sldTgt/>
+                  </p:tgtEl>
+                </p:cond>
+              </p:nextCondLst>
+            </p:seq>
+          </p:childTnLst>
+        </p:cTn>
       </p:par>
     </p:tnLst>
+    <p:bldLst>
+      <p:bldP spid="3" grpId="0" animBg="1"/>
+    </p:bldLst>
   </p:timing>
 </p:sld>
 </file>
 
-<file path=ppt/slides/slide13.xml><?xml version="1.0" encoding="utf-8"?>
+<file path=ppt/slides/slide14.xml><?xml version="1.0" encoding="utf-8"?>
 <p:sld xmlns:a="http://schemas.openxmlformats.org/drawingml/2006/main" xmlns:r="http://schemas.openxmlformats.org/officeDocument/2006/relationships" xmlns:p="http://schemas.openxmlformats.org/presentationml/2006/main">
   <p:cSld>
     <p:spTree>
@@ -17588,7 +18145,7 @@
 </p:sld>
 </file>
 
-<file path=ppt/slides/slide14.xml><?xml version="1.0" encoding="utf-8"?>
+<file path=ppt/slides/slide15.xml><?xml version="1.0" encoding="utf-8"?>
 <p:sld xmlns:a="http://schemas.openxmlformats.org/drawingml/2006/main" xmlns:r="http://schemas.openxmlformats.org/officeDocument/2006/relationships" xmlns:p="http://schemas.openxmlformats.org/presentationml/2006/main">
   <p:cSld>
     <p:spTree>
@@ -17645,7 +18202,7 @@
 </p:sld>
 </file>
 
-<file path=ppt/slides/slide15.xml><?xml version="1.0" encoding="utf-8"?>
+<file path=ppt/slides/slide16.xml><?xml version="1.0" encoding="utf-8"?>
 <p:sld xmlns:a="http://schemas.openxmlformats.org/drawingml/2006/main" xmlns:r="http://schemas.openxmlformats.org/officeDocument/2006/relationships" xmlns:p="http://schemas.openxmlformats.org/presentationml/2006/main">
   <p:cSld>
     <p:spTree>
@@ -17852,7 +18409,7 @@
 </p:sld>
 </file>
 
-<file path=ppt/slides/slide16.xml><?xml version="1.0" encoding="utf-8"?>
+<file path=ppt/slides/slide17.xml><?xml version="1.0" encoding="utf-8"?>
 <p:sld xmlns:a="http://schemas.openxmlformats.org/drawingml/2006/main" xmlns:r="http://schemas.openxmlformats.org/officeDocument/2006/relationships" xmlns:p="http://schemas.openxmlformats.org/presentationml/2006/main">
   <p:cSld>
     <p:spTree>
@@ -18045,8 +18602,8 @@
         </p:nvSpPr>
         <p:spPr bwMode="auto">
           <a:xfrm>
-            <a:off x="539552" y="4581128"/>
-            <a:ext cx="6740549" cy="1872208"/>
+            <a:off x="539552" y="4797152"/>
+            <a:ext cx="7272808" cy="1872208"/>
           </a:xfrm>
           <a:prstGeom prst="rect">
             <a:avLst/>
@@ -18084,7 +18641,7 @@
               <a:defRPr/>
             </a:pPr>
             <a:r>
-              <a:rPr lang="es-ES" sz="2100" dirty="0" smtClean="0">
+              <a:rPr lang="es-ES" sz="2200" dirty="0" smtClean="0">
                 <a:solidFill>
                   <a:schemeClr val="tx2">
                     <a:lumMod val="50000"/>
@@ -18110,7 +18667,7 @@
               <a:defRPr/>
             </a:pPr>
             <a:r>
-              <a:rPr lang="es-AR" dirty="0" smtClean="0">
+              <a:rPr lang="es-AR" sz="2000" dirty="0" smtClean="0">
                 <a:latin typeface="Calibri" pitchFamily="34" charset="0"/>
                 <a:cs typeface="Calibri" pitchFamily="34" charset="0"/>
               </a:rPr>
@@ -18131,7 +18688,7 @@
               <a:defRPr/>
             </a:pPr>
             <a:r>
-              <a:rPr lang="es-AR" dirty="0" smtClean="0">
+              <a:rPr lang="es-AR" sz="2000" dirty="0" smtClean="0">
                 <a:latin typeface="Calibri" pitchFamily="34" charset="0"/>
                 <a:cs typeface="Calibri" pitchFamily="34" charset="0"/>
               </a:rPr>
@@ -18152,42 +18709,42 @@
               <a:defRPr/>
             </a:pPr>
             <a:r>
-              <a:rPr lang="es-AR" dirty="0" smtClean="0">
+              <a:rPr lang="es-AR" sz="2000" dirty="0" smtClean="0">
                 <a:latin typeface="Calibri" pitchFamily="34" charset="0"/>
                 <a:cs typeface="Calibri" pitchFamily="34" charset="0"/>
               </a:rPr>
               <a:t>Sprint </a:t>
             </a:r>
             <a:r>
-              <a:rPr lang="es-AR" dirty="0" err="1" smtClean="0">
+              <a:rPr lang="es-AR" sz="2000" dirty="0" err="1" smtClean="0">
                 <a:latin typeface="Calibri" pitchFamily="34" charset="0"/>
                 <a:cs typeface="Calibri" pitchFamily="34" charset="0"/>
               </a:rPr>
               <a:t>Review</a:t>
             </a:r>
             <a:r>
-              <a:rPr lang="es-AR" dirty="0" smtClean="0">
+              <a:rPr lang="es-AR" sz="2000" dirty="0" smtClean="0">
                 <a:latin typeface="Calibri" pitchFamily="34" charset="0"/>
                 <a:cs typeface="Calibri" pitchFamily="34" charset="0"/>
               </a:rPr>
               <a:t> + </a:t>
             </a:r>
             <a:r>
-              <a:rPr lang="es-AR" dirty="0" err="1" smtClean="0">
+              <a:rPr lang="es-AR" sz="2000" dirty="0" err="1" smtClean="0">
                 <a:latin typeface="Calibri" pitchFamily="34" charset="0"/>
                 <a:cs typeface="Calibri" pitchFamily="34" charset="0"/>
               </a:rPr>
               <a:t>Planning</a:t>
             </a:r>
             <a:r>
-              <a:rPr lang="es-AR" dirty="0" smtClean="0">
+              <a:rPr lang="es-AR" sz="2000" dirty="0" smtClean="0">
                 <a:latin typeface="Calibri" pitchFamily="34" charset="0"/>
                 <a:cs typeface="Calibri" pitchFamily="34" charset="0"/>
               </a:rPr>
               <a:t> </a:t>
             </a:r>
             <a:r>
-              <a:rPr lang="es-AR" dirty="0" smtClean="0">
+              <a:rPr lang="es-AR" sz="2000" dirty="0" smtClean="0">
                 <a:latin typeface="Calibri" pitchFamily="34" charset="0"/>
                 <a:cs typeface="Calibri" pitchFamily="34" charset="0"/>
                 <a:sym typeface="Wingdings" pitchFamily="2" charset="2"/>
@@ -18195,13 +18752,13 @@
               <a:t> </a:t>
             </a:r>
             <a:r>
-              <a:rPr lang="es-AR" dirty="0" smtClean="0">
+              <a:rPr lang="es-AR" sz="2000" dirty="0" smtClean="0">
                 <a:latin typeface="Calibri" pitchFamily="34" charset="0"/>
                 <a:cs typeface="Calibri" pitchFamily="34" charset="0"/>
               </a:rPr>
               <a:t>Reuniones formales de la materia</a:t>
             </a:r>
-            <a:endParaRPr lang="es-ES" dirty="0" smtClean="0">
+            <a:endParaRPr lang="es-ES" sz="2000" dirty="0" smtClean="0">
               <a:latin typeface="Calibri" pitchFamily="34" charset="0"/>
               <a:cs typeface="Calibri" pitchFamily="34" charset="0"/>
             </a:endParaRPr>
@@ -18235,63 +18792,100 @@
           </a:p>
         </p:txBody>
       </p:sp>
-      <p:pic>
-        <p:nvPicPr>
-          <p:cNvPr id="5" name="4 Imagen" descr="wolof1.PNG"/>
-          <p:cNvPicPr>
-            <a:picLocks noChangeAspect="1"/>
-          </p:cNvPicPr>
+      <p:grpSp>
+        <p:nvGrpSpPr>
+          <p:cNvPr id="7" name="6 Grupo"/>
+          <p:cNvGrpSpPr/>
           <p:nvPr/>
-        </p:nvPicPr>
-        <p:blipFill>
-          <a:blip r:embed="rId3" cstate="print"/>
-          <a:stretch>
-            <a:fillRect/>
-          </a:stretch>
-        </p:blipFill>
-        <p:spPr>
+        </p:nvGrpSpPr>
+        <p:grpSpPr>
           <a:xfrm>
-            <a:off x="3635896" y="2276872"/>
-            <a:ext cx="5009122" cy="2475487"/>
+            <a:off x="3347864" y="1830310"/>
+            <a:ext cx="5297154" cy="3038851"/>
+            <a:chOff x="3347864" y="1830310"/>
+            <a:chExt cx="5297154" cy="3038851"/>
           </a:xfrm>
-          <a:prstGeom prst="rect">
-            <a:avLst/>
-          </a:prstGeom>
-        </p:spPr>
-      </p:pic>
-      <p:sp>
-        <p:nvSpPr>
-          <p:cNvPr id="6" name="5 Rectángulo"/>
-          <p:cNvSpPr/>
-          <p:nvPr/>
-        </p:nvSpPr>
-        <p:spPr>
-          <a:xfrm>
-            <a:off x="3635896" y="1844824"/>
-            <a:ext cx="2819939" cy="415498"/>
-          </a:xfrm>
-          <a:prstGeom prst="rect">
-            <a:avLst/>
-          </a:prstGeom>
-        </p:spPr>
-        <p:txBody>
-          <a:bodyPr wrap="none">
-            <a:spAutoFit/>
-          </a:bodyPr>
-          <a:lstStyle/>
-          <a:p>
-            <a:pPr marL="342900" lvl="0" indent="-342900">
-              <a:spcBef>
-                <a:spcPts val="1600"/>
-              </a:spcBef>
-              <a:buClr>
-                <a:schemeClr val="tx2"/>
-              </a:buClr>
-              <a:buSzPct val="70000"/>
-              <a:defRPr/>
-            </a:pPr>
-            <a:r>
-              <a:rPr lang="es-ES" sz="2100" dirty="0" smtClean="0">
+        </p:grpSpPr>
+        <p:pic>
+          <p:nvPicPr>
+            <p:cNvPr id="5" name="4 Imagen" descr="wolof1.PNG"/>
+            <p:cNvPicPr>
+              <a:picLocks noChangeAspect="1"/>
+            </p:cNvPicPr>
+            <p:nvPr/>
+          </p:nvPicPr>
+          <p:blipFill>
+            <a:blip r:embed="rId3" cstate="print"/>
+            <a:stretch>
+              <a:fillRect/>
+            </a:stretch>
+          </p:blipFill>
+          <p:spPr>
+            <a:xfrm>
+              <a:off x="3399550" y="2276873"/>
+              <a:ext cx="5245468" cy="2592288"/>
+            </a:xfrm>
+            <a:prstGeom prst="rect">
+              <a:avLst/>
+            </a:prstGeom>
+          </p:spPr>
+        </p:pic>
+        <p:sp>
+          <p:nvSpPr>
+            <p:cNvPr id="6" name="5 Rectángulo"/>
+            <p:cNvSpPr/>
+            <p:nvPr/>
+          </p:nvSpPr>
+          <p:spPr>
+            <a:xfrm>
+              <a:off x="3347864" y="1830310"/>
+              <a:ext cx="2881430" cy="430887"/>
+            </a:xfrm>
+            <a:prstGeom prst="rect">
+              <a:avLst/>
+            </a:prstGeom>
+          </p:spPr>
+          <p:txBody>
+            <a:bodyPr wrap="none">
+              <a:spAutoFit/>
+            </a:bodyPr>
+            <a:lstStyle/>
+            <a:p>
+              <a:pPr marL="342900" lvl="0" indent="-342900">
+                <a:spcBef>
+                  <a:spcPts val="1600"/>
+                </a:spcBef>
+                <a:buClr>
+                  <a:schemeClr val="tx2"/>
+                </a:buClr>
+                <a:buSzPct val="70000"/>
+                <a:defRPr/>
+              </a:pPr>
+              <a:r>
+                <a:rPr lang="es-ES" sz="2200" dirty="0" smtClean="0">
+                  <a:solidFill>
+                    <a:schemeClr val="tx2">
+                      <a:lumMod val="50000"/>
+                    </a:schemeClr>
+                  </a:solidFill>
+                  <a:latin typeface="Cambria" pitchFamily="18" charset="0"/>
+                  <a:cs typeface="Calibri" pitchFamily="34" charset="0"/>
+                </a:rPr>
+                <a:t>Administración: </a:t>
+              </a:r>
+              <a:r>
+                <a:rPr lang="es-ES" sz="2200" dirty="0" err="1" smtClean="0">
+                  <a:solidFill>
+                    <a:schemeClr val="tx2">
+                      <a:lumMod val="50000"/>
+                    </a:schemeClr>
+                  </a:solidFill>
+                  <a:latin typeface="Cambria" pitchFamily="18" charset="0"/>
+                  <a:cs typeface="Calibri" pitchFamily="34" charset="0"/>
+                </a:rPr>
+                <a:t>Wolof</a:t>
+              </a:r>
+              <a:endParaRPr lang="es-ES" sz="2200" dirty="0" smtClean="0">
                 <a:solidFill>
                   <a:schemeClr val="tx2">
                     <a:lumMod val="50000"/>
@@ -18299,33 +18893,11 @@
                 </a:solidFill>
                 <a:latin typeface="Cambria" pitchFamily="18" charset="0"/>
                 <a:cs typeface="Calibri" pitchFamily="34" charset="0"/>
-              </a:rPr>
-              <a:t>Administración: </a:t>
-            </a:r>
-            <a:r>
-              <a:rPr lang="es-ES" sz="2100" dirty="0" err="1" smtClean="0">
-                <a:solidFill>
-                  <a:schemeClr val="tx2">
-                    <a:lumMod val="50000"/>
-                  </a:schemeClr>
-                </a:solidFill>
-                <a:latin typeface="Cambria" pitchFamily="18" charset="0"/>
-                <a:cs typeface="Calibri" pitchFamily="34" charset="0"/>
-              </a:rPr>
-              <a:t>Wolof</a:t>
-            </a:r>
-            <a:endParaRPr lang="es-ES" sz="2100" dirty="0" smtClean="0">
-              <a:solidFill>
-                <a:schemeClr val="tx2">
-                  <a:lumMod val="50000"/>
-                </a:schemeClr>
-              </a:solidFill>
-              <a:latin typeface="Cambria" pitchFamily="18" charset="0"/>
-              <a:cs typeface="Calibri" pitchFamily="34" charset="0"/>
-            </a:endParaRPr>
-          </a:p>
-        </p:txBody>
-      </p:sp>
+              </a:endParaRPr>
+            </a:p>
+          </p:txBody>
+        </p:sp>
+      </p:grpSp>
     </p:spTree>
   </p:cSld>
   <p:clrMapOvr>
@@ -18334,9 +18906,263 @@
   <p:timing>
     <p:tnLst>
       <p:par>
-        <p:cTn id="1" dur="indefinite" restart="never" nodeType="tmRoot"/>
+        <p:cTn id="1" dur="indefinite" restart="never" nodeType="tmRoot">
+          <p:childTnLst>
+            <p:seq concurrent="1" nextAc="seek">
+              <p:cTn id="2" dur="indefinite" nodeType="mainSeq">
+                <p:childTnLst>
+                  <p:par>
+                    <p:cTn id="3" fill="hold">
+                      <p:stCondLst>
+                        <p:cond delay="indefinite"/>
+                        <p:cond evt="onBegin" delay="0">
+                          <p:tn val="2"/>
+                        </p:cond>
+                      </p:stCondLst>
+                      <p:childTnLst>
+                        <p:par>
+                          <p:cTn id="4" fill="hold">
+                            <p:stCondLst>
+                              <p:cond delay="0"/>
+                            </p:stCondLst>
+                            <p:childTnLst>
+                              <p:par>
+                                <p:cTn id="5" presetID="3" presetClass="entr" presetSubtype="10" fill="hold" nodeType="withEffect">
+                                  <p:stCondLst>
+                                    <p:cond delay="0"/>
+                                  </p:stCondLst>
+                                  <p:childTnLst>
+                                    <p:set>
+                                      <p:cBhvr>
+                                        <p:cTn id="6" dur="1" fill="hold">
+                                          <p:stCondLst>
+                                            <p:cond delay="0"/>
+                                          </p:stCondLst>
+                                        </p:cTn>
+                                        <p:tgtEl>
+                                          <p:spTgt spid="7"/>
+                                        </p:tgtEl>
+                                        <p:attrNameLst>
+                                          <p:attrName>style.visibility</p:attrName>
+                                        </p:attrNameLst>
+                                      </p:cBhvr>
+                                      <p:to>
+                                        <p:strVal val="visible"/>
+                                      </p:to>
+                                    </p:set>
+                                    <p:animEffect transition="in" filter="blinds(horizontal)">
+                                      <p:cBhvr>
+                                        <p:cTn id="7" dur="500"/>
+                                        <p:tgtEl>
+                                          <p:spTgt spid="7"/>
+                                        </p:tgtEl>
+                                      </p:cBhvr>
+                                    </p:animEffect>
+                                  </p:childTnLst>
+                                </p:cTn>
+                              </p:par>
+                              <p:par>
+                                <p:cTn id="8" presetID="3" presetClass="entr" presetSubtype="10" fill="hold" grpId="0" nodeType="withEffect">
+                                  <p:stCondLst>
+                                    <p:cond delay="0"/>
+                                  </p:stCondLst>
+                                  <p:childTnLst>
+                                    <p:set>
+                                      <p:cBhvr>
+                                        <p:cTn id="9" dur="1" fill="hold">
+                                          <p:stCondLst>
+                                            <p:cond delay="0"/>
+                                          </p:stCondLst>
+                                        </p:cTn>
+                                        <p:tgtEl>
+                                          <p:spTgt spid="10">
+                                            <p:txEl>
+                                              <p:pRg st="0" end="0"/>
+                                            </p:txEl>
+                                          </p:spTgt>
+                                        </p:tgtEl>
+                                        <p:attrNameLst>
+                                          <p:attrName>style.visibility</p:attrName>
+                                        </p:attrNameLst>
+                                      </p:cBhvr>
+                                      <p:to>
+                                        <p:strVal val="visible"/>
+                                      </p:to>
+                                    </p:set>
+                                    <p:animEffect transition="in" filter="blinds(horizontal)">
+                                      <p:cBhvr>
+                                        <p:cTn id="10" dur="500"/>
+                                        <p:tgtEl>
+                                          <p:spTgt spid="10">
+                                            <p:txEl>
+                                              <p:pRg st="0" end="0"/>
+                                            </p:txEl>
+                                          </p:spTgt>
+                                        </p:tgtEl>
+                                      </p:cBhvr>
+                                    </p:animEffect>
+                                  </p:childTnLst>
+                                </p:cTn>
+                              </p:par>
+                              <p:par>
+                                <p:cTn id="11" presetID="3" presetClass="entr" presetSubtype="10" fill="hold" grpId="0" nodeType="withEffect">
+                                  <p:stCondLst>
+                                    <p:cond delay="0"/>
+                                  </p:stCondLst>
+                                  <p:childTnLst>
+                                    <p:set>
+                                      <p:cBhvr>
+                                        <p:cTn id="12" dur="1" fill="hold">
+                                          <p:stCondLst>
+                                            <p:cond delay="0"/>
+                                          </p:stCondLst>
+                                        </p:cTn>
+                                        <p:tgtEl>
+                                          <p:spTgt spid="10">
+                                            <p:txEl>
+                                              <p:pRg st="1" end="1"/>
+                                            </p:txEl>
+                                          </p:spTgt>
+                                        </p:tgtEl>
+                                        <p:attrNameLst>
+                                          <p:attrName>style.visibility</p:attrName>
+                                        </p:attrNameLst>
+                                      </p:cBhvr>
+                                      <p:to>
+                                        <p:strVal val="visible"/>
+                                      </p:to>
+                                    </p:set>
+                                    <p:animEffect transition="in" filter="blinds(horizontal)">
+                                      <p:cBhvr>
+                                        <p:cTn id="13" dur="500"/>
+                                        <p:tgtEl>
+                                          <p:spTgt spid="10">
+                                            <p:txEl>
+                                              <p:pRg st="1" end="1"/>
+                                            </p:txEl>
+                                          </p:spTgt>
+                                        </p:tgtEl>
+                                      </p:cBhvr>
+                                    </p:animEffect>
+                                  </p:childTnLst>
+                                </p:cTn>
+                              </p:par>
+                              <p:par>
+                                <p:cTn id="14" presetID="3" presetClass="entr" presetSubtype="10" fill="hold" grpId="0" nodeType="withEffect">
+                                  <p:stCondLst>
+                                    <p:cond delay="0"/>
+                                  </p:stCondLst>
+                                  <p:childTnLst>
+                                    <p:set>
+                                      <p:cBhvr>
+                                        <p:cTn id="15" dur="1" fill="hold">
+                                          <p:stCondLst>
+                                            <p:cond delay="0"/>
+                                          </p:stCondLst>
+                                        </p:cTn>
+                                        <p:tgtEl>
+                                          <p:spTgt spid="10">
+                                            <p:txEl>
+                                              <p:pRg st="2" end="2"/>
+                                            </p:txEl>
+                                          </p:spTgt>
+                                        </p:tgtEl>
+                                        <p:attrNameLst>
+                                          <p:attrName>style.visibility</p:attrName>
+                                        </p:attrNameLst>
+                                      </p:cBhvr>
+                                      <p:to>
+                                        <p:strVal val="visible"/>
+                                      </p:to>
+                                    </p:set>
+                                    <p:animEffect transition="in" filter="blinds(horizontal)">
+                                      <p:cBhvr>
+                                        <p:cTn id="16" dur="500"/>
+                                        <p:tgtEl>
+                                          <p:spTgt spid="10">
+                                            <p:txEl>
+                                              <p:pRg st="2" end="2"/>
+                                            </p:txEl>
+                                          </p:spTgt>
+                                        </p:tgtEl>
+                                      </p:cBhvr>
+                                    </p:animEffect>
+                                  </p:childTnLst>
+                                </p:cTn>
+                              </p:par>
+                              <p:par>
+                                <p:cTn id="17" presetID="3" presetClass="entr" presetSubtype="10" fill="hold" grpId="0" nodeType="withEffect">
+                                  <p:stCondLst>
+                                    <p:cond delay="0"/>
+                                  </p:stCondLst>
+                                  <p:childTnLst>
+                                    <p:set>
+                                      <p:cBhvr>
+                                        <p:cTn id="18" dur="1" fill="hold">
+                                          <p:stCondLst>
+                                            <p:cond delay="0"/>
+                                          </p:stCondLst>
+                                        </p:cTn>
+                                        <p:tgtEl>
+                                          <p:spTgt spid="10">
+                                            <p:txEl>
+                                              <p:pRg st="3" end="3"/>
+                                            </p:txEl>
+                                          </p:spTgt>
+                                        </p:tgtEl>
+                                        <p:attrNameLst>
+                                          <p:attrName>style.visibility</p:attrName>
+                                        </p:attrNameLst>
+                                      </p:cBhvr>
+                                      <p:to>
+                                        <p:strVal val="visible"/>
+                                      </p:to>
+                                    </p:set>
+                                    <p:animEffect transition="in" filter="blinds(horizontal)">
+                                      <p:cBhvr>
+                                        <p:cTn id="19" dur="500"/>
+                                        <p:tgtEl>
+                                          <p:spTgt spid="10">
+                                            <p:txEl>
+                                              <p:pRg st="3" end="3"/>
+                                            </p:txEl>
+                                          </p:spTgt>
+                                        </p:tgtEl>
+                                      </p:cBhvr>
+                                    </p:animEffect>
+                                  </p:childTnLst>
+                                </p:cTn>
+                              </p:par>
+                            </p:childTnLst>
+                          </p:cTn>
+                        </p:par>
+                      </p:childTnLst>
+                    </p:cTn>
+                  </p:par>
+                </p:childTnLst>
+              </p:cTn>
+              <p:prevCondLst>
+                <p:cond evt="onPrev" delay="0">
+                  <p:tgtEl>
+                    <p:sldTgt/>
+                  </p:tgtEl>
+                </p:cond>
+              </p:prevCondLst>
+              <p:nextCondLst>
+                <p:cond evt="onNext" delay="0">
+                  <p:tgtEl>
+                    <p:sldTgt/>
+                  </p:tgtEl>
+                </p:cond>
+              </p:nextCondLst>
+            </p:seq>
+          </p:childTnLst>
+        </p:cTn>
       </p:par>
     </p:tnLst>
+    <p:bldLst>
+      <p:bldP spid="10" grpId="0" build="allAtOnce"/>
+    </p:bldLst>
   </p:timing>
 </p:sld>
 </file>
@@ -19003,9 +19829,275 @@
   <p:timing>
     <p:tnLst>
       <p:par>
-        <p:cTn id="1" dur="indefinite" restart="never" nodeType="tmRoot"/>
+        <p:cTn id="1" dur="indefinite" restart="never" nodeType="tmRoot">
+          <p:childTnLst>
+            <p:seq concurrent="1" nextAc="seek">
+              <p:cTn id="2" dur="indefinite" nodeType="mainSeq">
+                <p:childTnLst>
+                  <p:par>
+                    <p:cTn id="3" fill="hold">
+                      <p:stCondLst>
+                        <p:cond delay="indefinite"/>
+                        <p:cond evt="onBegin" delay="0">
+                          <p:tn val="2"/>
+                        </p:cond>
+                      </p:stCondLst>
+                      <p:childTnLst>
+                        <p:par>
+                          <p:cTn id="4" fill="hold">
+                            <p:stCondLst>
+                              <p:cond delay="0"/>
+                            </p:stCondLst>
+                            <p:childTnLst>
+                              <p:par>
+                                <p:cTn id="5" presetID="10" presetClass="entr" presetSubtype="0" fill="hold" grpId="0" nodeType="withEffect">
+                                  <p:stCondLst>
+                                    <p:cond delay="0"/>
+                                  </p:stCondLst>
+                                  <p:childTnLst>
+                                    <p:set>
+                                      <p:cBhvr>
+                                        <p:cTn id="6" dur="1" fill="hold">
+                                          <p:stCondLst>
+                                            <p:cond delay="0"/>
+                                          </p:stCondLst>
+                                        </p:cTn>
+                                        <p:tgtEl>
+                                          <p:spTgt spid="16">
+                                            <p:graphicEl>
+                                              <a:dgm id="{890CD38B-303D-4AF9-A9E6-14557519AF81}"/>
+                                            </p:graphicEl>
+                                          </p:spTgt>
+                                        </p:tgtEl>
+                                        <p:attrNameLst>
+                                          <p:attrName>style.visibility</p:attrName>
+                                        </p:attrNameLst>
+                                      </p:cBhvr>
+                                      <p:to>
+                                        <p:strVal val="visible"/>
+                                      </p:to>
+                                    </p:set>
+                                    <p:animEffect transition="in" filter="fade">
+                                      <p:cBhvr>
+                                        <p:cTn id="7" dur="1000"/>
+                                        <p:tgtEl>
+                                          <p:spTgt spid="16">
+                                            <p:graphicEl>
+                                              <a:dgm id="{890CD38B-303D-4AF9-A9E6-14557519AF81}"/>
+                                            </p:graphicEl>
+                                          </p:spTgt>
+                                        </p:tgtEl>
+                                      </p:cBhvr>
+                                    </p:animEffect>
+                                  </p:childTnLst>
+                                </p:cTn>
+                              </p:par>
+                              <p:par>
+                                <p:cTn id="8" presetID="10" presetClass="entr" presetSubtype="0" fill="hold" grpId="0" nodeType="withEffect">
+                                  <p:stCondLst>
+                                    <p:cond delay="0"/>
+                                  </p:stCondLst>
+                                  <p:childTnLst>
+                                    <p:set>
+                                      <p:cBhvr>
+                                        <p:cTn id="9" dur="1" fill="hold">
+                                          <p:stCondLst>
+                                            <p:cond delay="0"/>
+                                          </p:stCondLst>
+                                        </p:cTn>
+                                        <p:tgtEl>
+                                          <p:spTgt spid="16">
+                                            <p:graphicEl>
+                                              <a:dgm id="{8717C3D6-AEB4-43BC-8C14-00EF8DABA0F1}"/>
+                                            </p:graphicEl>
+                                          </p:spTgt>
+                                        </p:tgtEl>
+                                        <p:attrNameLst>
+                                          <p:attrName>style.visibility</p:attrName>
+                                        </p:attrNameLst>
+                                      </p:cBhvr>
+                                      <p:to>
+                                        <p:strVal val="visible"/>
+                                      </p:to>
+                                    </p:set>
+                                    <p:animEffect transition="in" filter="fade">
+                                      <p:cBhvr>
+                                        <p:cTn id="10" dur="1000"/>
+                                        <p:tgtEl>
+                                          <p:spTgt spid="16">
+                                            <p:graphicEl>
+                                              <a:dgm id="{8717C3D6-AEB4-43BC-8C14-00EF8DABA0F1}"/>
+                                            </p:graphicEl>
+                                          </p:spTgt>
+                                        </p:tgtEl>
+                                      </p:cBhvr>
+                                    </p:animEffect>
+                                  </p:childTnLst>
+                                </p:cTn>
+                              </p:par>
+                              <p:par>
+                                <p:cTn id="11" presetID="10" presetClass="entr" presetSubtype="0" fill="hold" grpId="0" nodeType="withEffect">
+                                  <p:stCondLst>
+                                    <p:cond delay="0"/>
+                                  </p:stCondLst>
+                                  <p:childTnLst>
+                                    <p:set>
+                                      <p:cBhvr>
+                                        <p:cTn id="12" dur="1" fill="hold">
+                                          <p:stCondLst>
+                                            <p:cond delay="0"/>
+                                          </p:stCondLst>
+                                        </p:cTn>
+                                        <p:tgtEl>
+                                          <p:spTgt spid="16">
+                                            <p:graphicEl>
+                                              <a:dgm id="{2B04FF30-D00D-401E-96FA-6A9307E8887F}"/>
+                                            </p:graphicEl>
+                                          </p:spTgt>
+                                        </p:tgtEl>
+                                        <p:attrNameLst>
+                                          <p:attrName>style.visibility</p:attrName>
+                                        </p:attrNameLst>
+                                      </p:cBhvr>
+                                      <p:to>
+                                        <p:strVal val="visible"/>
+                                      </p:to>
+                                    </p:set>
+                                    <p:animEffect transition="in" filter="fade">
+                                      <p:cBhvr>
+                                        <p:cTn id="13" dur="1000"/>
+                                        <p:tgtEl>
+                                          <p:spTgt spid="16">
+                                            <p:graphicEl>
+                                              <a:dgm id="{2B04FF30-D00D-401E-96FA-6A9307E8887F}"/>
+                                            </p:graphicEl>
+                                          </p:spTgt>
+                                        </p:tgtEl>
+                                      </p:cBhvr>
+                                    </p:animEffect>
+                                  </p:childTnLst>
+                                </p:cTn>
+                              </p:par>
+                              <p:par>
+                                <p:cTn id="14" presetID="10" presetClass="entr" presetSubtype="0" fill="hold" grpId="0" nodeType="withEffect">
+                                  <p:stCondLst>
+                                    <p:cond delay="0"/>
+                                  </p:stCondLst>
+                                  <p:childTnLst>
+                                    <p:set>
+                                      <p:cBhvr>
+                                        <p:cTn id="15" dur="1" fill="hold">
+                                          <p:stCondLst>
+                                            <p:cond delay="0"/>
+                                          </p:stCondLst>
+                                        </p:cTn>
+                                        <p:tgtEl>
+                                          <p:spTgt spid="16">
+                                            <p:graphicEl>
+                                              <a:dgm id="{9E141F7E-6E09-4309-A88A-AB28D75F1864}"/>
+                                            </p:graphicEl>
+                                          </p:spTgt>
+                                        </p:tgtEl>
+                                        <p:attrNameLst>
+                                          <p:attrName>style.visibility</p:attrName>
+                                        </p:attrNameLst>
+                                      </p:cBhvr>
+                                      <p:to>
+                                        <p:strVal val="visible"/>
+                                      </p:to>
+                                    </p:set>
+                                    <p:animEffect transition="in" filter="fade">
+                                      <p:cBhvr>
+                                        <p:cTn id="16" dur="1000"/>
+                                        <p:tgtEl>
+                                          <p:spTgt spid="16">
+                                            <p:graphicEl>
+                                              <a:dgm id="{9E141F7E-6E09-4309-A88A-AB28D75F1864}"/>
+                                            </p:graphicEl>
+                                          </p:spTgt>
+                                        </p:tgtEl>
+                                      </p:cBhvr>
+                                    </p:animEffect>
+                                  </p:childTnLst>
+                                </p:cTn>
+                              </p:par>
+                              <p:par>
+                                <p:cTn id="17" presetID="10" presetClass="entr" presetSubtype="0" fill="hold" grpId="0" nodeType="withEffect">
+                                  <p:stCondLst>
+                                    <p:cond delay="0"/>
+                                  </p:stCondLst>
+                                  <p:childTnLst>
+                                    <p:set>
+                                      <p:cBhvr>
+                                        <p:cTn id="18" dur="1" fill="hold">
+                                          <p:stCondLst>
+                                            <p:cond delay="0"/>
+                                          </p:stCondLst>
+                                        </p:cTn>
+                                        <p:tgtEl>
+                                          <p:spTgt spid="16">
+                                            <p:graphicEl>
+                                              <a:dgm id="{49AB87C6-0C0C-427C-B09A-1FD1EC7BF601}"/>
+                                            </p:graphicEl>
+                                          </p:spTgt>
+                                        </p:tgtEl>
+                                        <p:attrNameLst>
+                                          <p:attrName>style.visibility</p:attrName>
+                                        </p:attrNameLst>
+                                      </p:cBhvr>
+                                      <p:to>
+                                        <p:strVal val="visible"/>
+                                      </p:to>
+                                    </p:set>
+                                    <p:animEffect transition="in" filter="fade">
+                                      <p:cBhvr>
+                                        <p:cTn id="19" dur="1000"/>
+                                        <p:tgtEl>
+                                          <p:spTgt spid="16">
+                                            <p:graphicEl>
+                                              <a:dgm id="{49AB87C6-0C0C-427C-B09A-1FD1EC7BF601}"/>
+                                            </p:graphicEl>
+                                          </p:spTgt>
+                                        </p:tgtEl>
+                                      </p:cBhvr>
+                                    </p:animEffect>
+                                  </p:childTnLst>
+                                </p:cTn>
+                              </p:par>
+                            </p:childTnLst>
+                          </p:cTn>
+                        </p:par>
+                      </p:childTnLst>
+                    </p:cTn>
+                  </p:par>
+                </p:childTnLst>
+              </p:cTn>
+              <p:prevCondLst>
+                <p:cond evt="onPrev" delay="0">
+                  <p:tgtEl>
+                    <p:sldTgt/>
+                  </p:tgtEl>
+                </p:cond>
+              </p:prevCondLst>
+              <p:nextCondLst>
+                <p:cond evt="onNext" delay="0">
+                  <p:tgtEl>
+                    <p:sldTgt/>
+                  </p:tgtEl>
+                </p:cond>
+              </p:nextCondLst>
+            </p:seq>
+          </p:childTnLst>
+        </p:cTn>
       </p:par>
     </p:tnLst>
+    <p:bldLst>
+      <p:bldGraphic spid="16" grpId="0">
+        <p:bldSub>
+          <a:bldDgm bld="one"/>
+        </p:bldSub>
+      </p:bldGraphic>
+    </p:bldLst>
   </p:timing>
 </p:sld>
 </file>
@@ -20223,7 +21315,7 @@
         </p:nvSpPr>
         <p:spPr bwMode="auto">
           <a:xfrm>
-            <a:off x="1403648" y="1844824"/>
+            <a:off x="1403648" y="1700808"/>
             <a:ext cx="4033837" cy="400110"/>
           </a:xfrm>
           <a:prstGeom prst="rect">
@@ -20253,7 +21345,19 @@
                 <a:latin typeface="Cambria" pitchFamily="18" charset="0"/>
                 <a:cs typeface="Arial" charset="0"/>
               </a:rPr>
-              <a:t>Caso de Análisis: Sprint ??</a:t>
+              <a:t>Caso de Análisis: Sprint </a:t>
+            </a:r>
+            <a:r>
+              <a:rPr lang="es-AR" sz="2000" dirty="0" smtClean="0">
+                <a:solidFill>
+                  <a:schemeClr val="tx2">
+                    <a:lumMod val="50000"/>
+                  </a:schemeClr>
+                </a:solidFill>
+                <a:latin typeface="Cambria" pitchFamily="18" charset="0"/>
+                <a:cs typeface="Arial" charset="0"/>
+              </a:rPr>
+              <a:t>4</a:t>
             </a:r>
             <a:endParaRPr lang="es-AR" sz="2000" dirty="0">
               <a:solidFill>
@@ -20267,6 +21371,125 @@
           </a:p>
         </p:txBody>
       </p:sp>
+      <p:grpSp>
+        <p:nvGrpSpPr>
+          <p:cNvPr id="6" name="5 Grupo"/>
+          <p:cNvGrpSpPr/>
+          <p:nvPr/>
+        </p:nvGrpSpPr>
+        <p:grpSpPr>
+          <a:xfrm>
+            <a:off x="2124290" y="2132856"/>
+            <a:ext cx="6696182" cy="4475798"/>
+            <a:chOff x="2124290" y="2132856"/>
+            <a:chExt cx="6696182" cy="4475798"/>
+          </a:xfrm>
+        </p:grpSpPr>
+        <p:pic>
+          <p:nvPicPr>
+            <p:cNvPr id="1026" name="Gráfico 1"/>
+            <p:cNvPicPr>
+              <a:picLocks noChangeArrowheads="1"/>
+            </p:cNvPicPr>
+            <p:nvPr/>
+          </p:nvPicPr>
+          <p:blipFill>
+            <a:blip r:embed="rId3" cstate="print"/>
+            <a:srcRect/>
+            <a:stretch>
+              <a:fillRect/>
+            </a:stretch>
+          </p:blipFill>
+          <p:spPr bwMode="auto">
+            <a:xfrm>
+              <a:off x="2124290" y="2492895"/>
+              <a:ext cx="6518534" cy="4115759"/>
+            </a:xfrm>
+            <a:prstGeom prst="rect">
+              <a:avLst/>
+            </a:prstGeom>
+            <a:ln>
+              <a:noFill/>
+            </a:ln>
+            <a:effectLst>
+              <a:outerShdw blurRad="190500" algn="tl" rotWithShape="0">
+                <a:srgbClr val="000000">
+                  <a:alpha val="70000"/>
+                </a:srgbClr>
+              </a:outerShdw>
+            </a:effectLst>
+          </p:spPr>
+        </p:pic>
+        <p:sp>
+          <p:nvSpPr>
+            <p:cNvPr id="5" name="TextBox 24"/>
+            <p:cNvSpPr txBox="1">
+              <a:spLocks noChangeArrowheads="1"/>
+            </p:cNvSpPr>
+            <p:nvPr/>
+          </p:nvSpPr>
+          <p:spPr bwMode="auto">
+            <a:xfrm>
+              <a:off x="7020272" y="2132856"/>
+              <a:ext cx="1800200" cy="338554"/>
+            </a:xfrm>
+            <a:prstGeom prst="rect">
+              <a:avLst/>
+            </a:prstGeom>
+            <a:noFill/>
+            <a:ln w="9525">
+              <a:noFill/>
+              <a:miter lim="800000"/>
+              <a:headEnd/>
+              <a:tailEnd/>
+            </a:ln>
+          </p:spPr>
+          <p:txBody>
+            <a:bodyPr wrap="square">
+              <a:spAutoFit/>
+            </a:bodyPr>
+            <a:lstStyle/>
+            <a:p>
+              <a:r>
+                <a:rPr lang="es-AR" sz="1600" b="1" dirty="0" err="1" smtClean="0">
+                  <a:solidFill>
+                    <a:schemeClr val="tx1">
+                      <a:lumMod val="95000"/>
+                      <a:lumOff val="5000"/>
+                    </a:schemeClr>
+                  </a:solidFill>
+                  <a:latin typeface="Cambria" pitchFamily="18" charset="0"/>
+                  <a:cs typeface="Arial" charset="0"/>
+                </a:rPr>
+                <a:t>Burndown</a:t>
+              </a:r>
+              <a:r>
+                <a:rPr lang="es-AR" sz="1600" b="1" dirty="0" smtClean="0">
+                  <a:solidFill>
+                    <a:schemeClr val="tx1">
+                      <a:lumMod val="95000"/>
+                      <a:lumOff val="5000"/>
+                    </a:schemeClr>
+                  </a:solidFill>
+                  <a:latin typeface="Cambria" pitchFamily="18" charset="0"/>
+                  <a:cs typeface="Arial" charset="0"/>
+                </a:rPr>
+                <a:t> chart</a:t>
+              </a:r>
+              <a:endParaRPr lang="es-AR" sz="1600" b="1" dirty="0">
+                <a:solidFill>
+                  <a:schemeClr val="tx1">
+                    <a:lumMod val="95000"/>
+                    <a:lumOff val="5000"/>
+                  </a:schemeClr>
+                </a:solidFill>
+                <a:latin typeface="Cambria" pitchFamily="18" charset="0"/>
+                <a:cs typeface="Arial" charset="0"/>
+              </a:endParaRPr>
+            </a:p>
+          </p:txBody>
+        </p:sp>
+      </p:grpSp>
     </p:spTree>
   </p:cSld>
   <p:clrMapOvr>
@@ -20275,7 +21498,86 @@
   <p:timing>
     <p:tnLst>
       <p:par>
-        <p:cTn id="1" dur="indefinite" restart="never" nodeType="tmRoot"/>
+        <p:cTn id="1" dur="indefinite" restart="never" nodeType="tmRoot">
+          <p:childTnLst>
+            <p:seq concurrent="1" nextAc="seek">
+              <p:cTn id="2" dur="indefinite" nodeType="mainSeq">
+                <p:childTnLst>
+                  <p:par>
+                    <p:cTn id="3" fill="hold">
+                      <p:stCondLst>
+                        <p:cond delay="indefinite"/>
+                        <p:cond evt="onBegin" delay="0">
+                          <p:tn val="2"/>
+                        </p:cond>
+                      </p:stCondLst>
+                      <p:childTnLst>
+                        <p:par>
+                          <p:cTn id="4" fill="hold">
+                            <p:stCondLst>
+                              <p:cond delay="0"/>
+                            </p:stCondLst>
+                            <p:childTnLst>
+                              <p:par>
+                                <p:cTn id="5" presetID="10" presetClass="entr" presetSubtype="0" fill="hold" nodeType="withEffect">
+                                  <p:stCondLst>
+                                    <p:cond delay="0"/>
+                                  </p:stCondLst>
+                                  <p:childTnLst>
+                                    <p:set>
+                                      <p:cBhvr>
+                                        <p:cTn id="6" dur="1" fill="hold">
+                                          <p:stCondLst>
+                                            <p:cond delay="0"/>
+                                          </p:stCondLst>
+                                        </p:cTn>
+                                        <p:tgtEl>
+                                          <p:spTgt spid="6"/>
+                                        </p:tgtEl>
+                                        <p:attrNameLst>
+                                          <p:attrName>style.visibility</p:attrName>
+                                        </p:attrNameLst>
+                                      </p:cBhvr>
+                                      <p:to>
+                                        <p:strVal val="visible"/>
+                                      </p:to>
+                                    </p:set>
+                                    <p:animEffect transition="in" filter="fade">
+                                      <p:cBhvr>
+                                        <p:cTn id="7" dur="2000"/>
+                                        <p:tgtEl>
+                                          <p:spTgt spid="6"/>
+                                        </p:tgtEl>
+                                      </p:cBhvr>
+                                    </p:animEffect>
+                                  </p:childTnLst>
+                                </p:cTn>
+                              </p:par>
+                            </p:childTnLst>
+                          </p:cTn>
+                        </p:par>
+                      </p:childTnLst>
+                    </p:cTn>
+                  </p:par>
+                </p:childTnLst>
+              </p:cTn>
+              <p:prevCondLst>
+                <p:cond evt="onPrev" delay="0">
+                  <p:tgtEl>
+                    <p:sldTgt/>
+                  </p:tgtEl>
+                </p:cond>
+              </p:prevCondLst>
+              <p:nextCondLst>
+                <p:cond evt="onNext" delay="0">
+                  <p:tgtEl>
+                    <p:sldTgt/>
+                  </p:tgtEl>
+                </p:cond>
+              </p:nextCondLst>
+            </p:seq>
+          </p:childTnLst>
+        </p:cTn>
       </p:par>
     </p:tnLst>
   </p:timing>
@@ -20301,7 +21603,7 @@
       </p:grpSpPr>
       <p:sp>
         <p:nvSpPr>
-          <p:cNvPr id="14338" name="Rectangle 4"/>
+          <p:cNvPr id="15362" name="Rectangle 2"/>
           <p:cNvSpPr>
             <a:spLocks noGrp="1" noChangeArrowheads="1"/>
           </p:cNvSpPr>
@@ -20316,17 +21618,17 @@
           <a:p>
             <a:pPr eaLnBrk="1" hangingPunct="1"/>
             <a:r>
-              <a:rPr lang="es-AR" dirty="0" smtClean="0">
+              <a:rPr lang="es-AR" sz="3200" smtClean="0">
                 <a:latin typeface="Copperplate Gothic Bold" pitchFamily="34" charset="0"/>
               </a:rPr>
-              <a:t>Desvíos No Planificados</a:t>
+              <a:t>Seguimiento y Control</a:t>
             </a:r>
           </a:p>
         </p:txBody>
       </p:sp>
       <p:sp>
         <p:nvSpPr>
-          <p:cNvPr id="11" name="TextBox 24"/>
+          <p:cNvPr id="25" name="TextBox 24"/>
           <p:cNvSpPr txBox="1">
             <a:spLocks noChangeArrowheads="1"/>
           </p:cNvSpPr>
@@ -20334,8 +21636,8 @@
         </p:nvSpPr>
         <p:spPr bwMode="auto">
           <a:xfrm>
-            <a:off x="1403648" y="1988840"/>
-            <a:ext cx="5832648" cy="400110"/>
+            <a:off x="1403648" y="1700808"/>
+            <a:ext cx="4033837" cy="400110"/>
           </a:xfrm>
           <a:prstGeom prst="rect">
             <a:avLst/>
@@ -20349,15 +21651,11 @@
           </a:ln>
         </p:spPr>
         <p:txBody>
-          <a:bodyPr wrap="square">
+          <a:bodyPr>
             <a:spAutoFit/>
           </a:bodyPr>
           <a:lstStyle/>
           <a:p>
-            <a:pPr>
-              <a:buFont typeface="Arial" pitchFamily="34" charset="0"/>
-              <a:buChar char="•"/>
-            </a:pPr>
             <a:r>
               <a:rPr lang="es-AR" sz="2000" dirty="0" smtClean="0">
                 <a:solidFill>
@@ -20368,7 +21666,19 @@
                 <a:latin typeface="Cambria" pitchFamily="18" charset="0"/>
                 <a:cs typeface="Arial" charset="0"/>
               </a:rPr>
-              <a:t>…</a:t>
+              <a:t>Caso de Análisis: Sprint </a:t>
+            </a:r>
+            <a:r>
+              <a:rPr lang="es-AR" sz="2000" dirty="0" smtClean="0">
+                <a:solidFill>
+                  <a:schemeClr val="tx2">
+                    <a:lumMod val="50000"/>
+                  </a:schemeClr>
+                </a:solidFill>
+                <a:latin typeface="Cambria" pitchFamily="18" charset="0"/>
+                <a:cs typeface="Arial" charset="0"/>
+              </a:rPr>
+              <a:t>4</a:t>
             </a:r>
             <a:endParaRPr lang="es-AR" sz="2000" dirty="0">
               <a:solidFill>
@@ -20382,6 +21692,125 @@
           </a:p>
         </p:txBody>
       </p:sp>
+      <p:grpSp>
+        <p:nvGrpSpPr>
+          <p:cNvPr id="7" name="6 Grupo"/>
+          <p:cNvGrpSpPr/>
+          <p:nvPr/>
+        </p:nvGrpSpPr>
+        <p:grpSpPr>
+          <a:xfrm>
+            <a:off x="1547664" y="2132856"/>
+            <a:ext cx="7100326" cy="4536504"/>
+            <a:chOff x="1547664" y="2132856"/>
+            <a:chExt cx="7100326" cy="4536504"/>
+          </a:xfrm>
+        </p:grpSpPr>
+        <p:sp>
+          <p:nvSpPr>
+            <p:cNvPr id="5" name="TextBox 24"/>
+            <p:cNvSpPr txBox="1">
+              <a:spLocks noChangeArrowheads="1"/>
+            </p:cNvSpPr>
+            <p:nvPr/>
+          </p:nvSpPr>
+          <p:spPr bwMode="auto">
+            <a:xfrm>
+              <a:off x="4803100" y="2132856"/>
+              <a:ext cx="3844890" cy="338554"/>
+            </a:xfrm>
+            <a:prstGeom prst="rect">
+              <a:avLst/>
+            </a:prstGeom>
+            <a:noFill/>
+            <a:ln w="9525">
+              <a:noFill/>
+              <a:miter lim="800000"/>
+              <a:headEnd/>
+              <a:tailEnd/>
+            </a:ln>
+          </p:spPr>
+          <p:txBody>
+            <a:bodyPr wrap="square">
+              <a:spAutoFit/>
+            </a:bodyPr>
+            <a:lstStyle/>
+            <a:p>
+              <a:r>
+                <a:rPr lang="es-AR" sz="1600" b="1" dirty="0" smtClean="0">
+                  <a:solidFill>
+                    <a:schemeClr val="tx1">
+                      <a:lumMod val="95000"/>
+                      <a:lumOff val="5000"/>
+                    </a:schemeClr>
+                  </a:solidFill>
+                  <a:latin typeface="Cambria" pitchFamily="18" charset="0"/>
+                  <a:cs typeface="Arial" charset="0"/>
+                </a:rPr>
+                <a:t>Cobertura de la prueba basado en </a:t>
+              </a:r>
+              <a:r>
+                <a:rPr lang="es-AR" sz="1600" b="1" dirty="0" err="1" smtClean="0">
+                  <a:solidFill>
+                    <a:schemeClr val="tx1">
+                      <a:lumMod val="95000"/>
+                      <a:lumOff val="5000"/>
+                    </a:schemeClr>
+                  </a:solidFill>
+                  <a:latin typeface="Cambria" pitchFamily="18" charset="0"/>
+                  <a:cs typeface="Arial" charset="0"/>
+                </a:rPr>
+                <a:t>UATs</a:t>
+              </a:r>
+              <a:endParaRPr lang="es-AR" sz="1600" b="1" dirty="0">
+                <a:solidFill>
+                  <a:schemeClr val="tx1">
+                    <a:lumMod val="95000"/>
+                    <a:lumOff val="5000"/>
+                  </a:schemeClr>
+                </a:solidFill>
+                <a:latin typeface="Cambria" pitchFamily="18" charset="0"/>
+                <a:cs typeface="Arial" charset="0"/>
+              </a:endParaRPr>
+            </a:p>
+          </p:txBody>
+        </p:sp>
+        <p:pic>
+          <p:nvPicPr>
+            <p:cNvPr id="2050" name="Gráfico 2"/>
+            <p:cNvPicPr>
+              <a:picLocks noChangeArrowheads="1"/>
+            </p:cNvPicPr>
+            <p:nvPr/>
+          </p:nvPicPr>
+          <p:blipFill>
+            <a:blip r:embed="rId3" cstate="print"/>
+            <a:srcRect/>
+            <a:stretch>
+              <a:fillRect/>
+            </a:stretch>
+          </p:blipFill>
+          <p:spPr bwMode="auto">
+            <a:xfrm>
+              <a:off x="1547664" y="2537302"/>
+              <a:ext cx="7056859" cy="4132058"/>
+            </a:xfrm>
+            <a:prstGeom prst="rect">
+              <a:avLst/>
+            </a:prstGeom>
+            <a:ln>
+              <a:noFill/>
+            </a:ln>
+            <a:effectLst>
+              <a:outerShdw blurRad="190500" algn="tl" rotWithShape="0">
+                <a:srgbClr val="000000">
+                  <a:alpha val="70000"/>
+                </a:srgbClr>
+              </a:outerShdw>
+            </a:effectLst>
+          </p:spPr>
+        </p:pic>
+      </p:grpSp>
     </p:spTree>
   </p:cSld>
   <p:clrMapOvr>
@@ -20390,7 +21819,86 @@
   <p:timing>
     <p:tnLst>
       <p:par>
-        <p:cTn id="1" dur="indefinite" restart="never" nodeType="tmRoot"/>
+        <p:cTn id="1" dur="indefinite" restart="never" nodeType="tmRoot">
+          <p:childTnLst>
+            <p:seq concurrent="1" nextAc="seek">
+              <p:cTn id="2" dur="indefinite" nodeType="mainSeq">
+                <p:childTnLst>
+                  <p:par>
+                    <p:cTn id="3" fill="hold">
+                      <p:stCondLst>
+                        <p:cond delay="indefinite"/>
+                        <p:cond evt="onBegin" delay="0">
+                          <p:tn val="2"/>
+                        </p:cond>
+                      </p:stCondLst>
+                      <p:childTnLst>
+                        <p:par>
+                          <p:cTn id="4" fill="hold">
+                            <p:stCondLst>
+                              <p:cond delay="0"/>
+                            </p:stCondLst>
+                            <p:childTnLst>
+                              <p:par>
+                                <p:cTn id="5" presetID="10" presetClass="entr" presetSubtype="0" fill="hold" nodeType="withEffect">
+                                  <p:stCondLst>
+                                    <p:cond delay="0"/>
+                                  </p:stCondLst>
+                                  <p:childTnLst>
+                                    <p:set>
+                                      <p:cBhvr>
+                                        <p:cTn id="6" dur="1" fill="hold">
+                                          <p:stCondLst>
+                                            <p:cond delay="0"/>
+                                          </p:stCondLst>
+                                        </p:cTn>
+                                        <p:tgtEl>
+                                          <p:spTgt spid="7"/>
+                                        </p:tgtEl>
+                                        <p:attrNameLst>
+                                          <p:attrName>style.visibility</p:attrName>
+                                        </p:attrNameLst>
+                                      </p:cBhvr>
+                                      <p:to>
+                                        <p:strVal val="visible"/>
+                                      </p:to>
+                                    </p:set>
+                                    <p:animEffect transition="in" filter="fade">
+                                      <p:cBhvr>
+                                        <p:cTn id="7" dur="2000"/>
+                                        <p:tgtEl>
+                                          <p:spTgt spid="7"/>
+                                        </p:tgtEl>
+                                      </p:cBhvr>
+                                    </p:animEffect>
+                                  </p:childTnLst>
+                                </p:cTn>
+                              </p:par>
+                            </p:childTnLst>
+                          </p:cTn>
+                        </p:par>
+                      </p:childTnLst>
+                    </p:cTn>
+                  </p:par>
+                </p:childTnLst>
+              </p:cTn>
+              <p:prevCondLst>
+                <p:cond evt="onPrev" delay="0">
+                  <p:tgtEl>
+                    <p:sldTgt/>
+                  </p:tgtEl>
+                </p:cond>
+              </p:prevCondLst>
+              <p:nextCondLst>
+                <p:cond evt="onNext" delay="0">
+                  <p:tgtEl>
+                    <p:sldTgt/>
+                  </p:tgtEl>
+                </p:cond>
+              </p:nextCondLst>
+            </p:seq>
+          </p:childTnLst>
+        </p:cTn>
       </p:par>
     </p:tnLst>
   </p:timing>

</xml_diff>

<commit_message>
#Lecciones aprendidas en presentacionFinal.pptx
</commit_message>
<xml_diff>
--- a/presentations/presentacionFinal.pptx
+++ b/presentations/presentacionFinal.pptx
@@ -3290,7 +3290,7 @@
   <dgm:whole/>
   <dgm:extLst>
     <a:ext uri="http://schemas.microsoft.com/office/drawing/2008/diagram">
-      <dsp:dataModelExt xmlns:dsp="http://schemas.microsoft.com/office/drawing/2008/diagram" xmlns="" relId="rId7" minVer="http://schemas.openxmlformats.org/drawingml/2006/diagram"/>
+      <dsp:dataModelExt xmlns="" xmlns:dsp="http://schemas.microsoft.com/office/drawing/2008/diagram" relId="rId7" minVer="http://schemas.openxmlformats.org/drawingml/2006/diagram"/>
     </a:ext>
   </dgm:extLst>
 </dgm:dataModel>
@@ -3592,7 +3592,7 @@
   <dgm:whole/>
   <dgm:extLst>
     <a:ext uri="http://schemas.microsoft.com/office/drawing/2008/diagram">
-      <dsp:dataModelExt xmlns:dsp="http://schemas.microsoft.com/office/drawing/2008/diagram" xmlns="" relId="rId7" minVer="http://schemas.openxmlformats.org/drawingml/2006/diagram"/>
+      <dsp:dataModelExt xmlns="" xmlns:dsp="http://schemas.microsoft.com/office/drawing/2008/diagram" relId="rId7" minVer="http://schemas.openxmlformats.org/drawingml/2006/diagram"/>
     </a:ext>
   </dgm:extLst>
 </dgm:dataModel>
@@ -3731,6 +3731,13 @@
         </dgm:presLayoutVars>
       </dgm:prSet>
       <dgm:spPr/>
+      <dgm:t>
+        <a:bodyPr/>
+        <a:lstStyle/>
+        <a:p>
+          <a:endParaRPr lang="es-AR"/>
+        </a:p>
+      </dgm:t>
     </dgm:pt>
     <dgm:pt modelId="{BDC8FC93-55F3-42CA-9630-F3D0AEDB332B}" type="pres">
       <dgm:prSet presAssocID="{337FC5F5-C507-42D3-9895-2F9F73CEC34F}" presName="node" presStyleLbl="node1" presStyleIdx="0" presStyleCnt="3">
@@ -3804,7 +3811,7 @@
   <dgm:whole/>
   <dgm:extLst>
     <a:ext uri="http://schemas.microsoft.com/office/drawing/2008/diagram">
-      <dsp:dataModelExt xmlns:dsp="http://schemas.microsoft.com/office/drawing/2008/diagram" xmlns="" relId="rId7" minVer="http://schemas.openxmlformats.org/drawingml/2006/diagram"/>
+      <dsp:dataModelExt xmlns="" xmlns:dsp="http://schemas.microsoft.com/office/drawing/2008/diagram" relId="rId7" minVer="http://schemas.openxmlformats.org/drawingml/2006/diagram"/>
     </a:ext>
   </dgm:extLst>
 </dgm:dataModel>
@@ -20915,15 +20922,6 @@
               </a:rPr>
               <a:t>Seguimiento de Costos</a:t>
             </a:r>
-            <a:endParaRPr lang="es-AR" sz="2800" dirty="0" smtClean="0">
-              <a:solidFill>
-                <a:schemeClr val="tx2">
-                  <a:lumMod val="50000"/>
-                </a:schemeClr>
-              </a:solidFill>
-              <a:latin typeface="Cambria" pitchFamily="18" charset="0"/>
-              <a:cs typeface="Arial" charset="0"/>
-            </a:endParaRPr>
           </a:p>
         </p:txBody>
       </p:sp>
@@ -21105,15 +21103,6 @@
               </a:rPr>
               <a:t>Seguimiento de Costos</a:t>
             </a:r>
-            <a:endParaRPr lang="es-AR" sz="2800" dirty="0" smtClean="0">
-              <a:solidFill>
-                <a:schemeClr val="tx2">
-                  <a:lumMod val="50000"/>
-                </a:schemeClr>
-              </a:solidFill>
-              <a:latin typeface="Cambria" pitchFamily="18" charset="0"/>
-              <a:cs typeface="Arial" charset="0"/>
-            </a:endParaRPr>
           </a:p>
         </p:txBody>
       </p:sp>
@@ -21398,8 +21387,8 @@
         </p:nvSpPr>
         <p:spPr bwMode="auto">
           <a:xfrm>
-            <a:off x="1403648" y="1772816"/>
-            <a:ext cx="5832648" cy="523220"/>
+            <a:off x="1214414" y="2285992"/>
+            <a:ext cx="7715304" cy="4093428"/>
           </a:xfrm>
           <a:prstGeom prst="rect">
             <a:avLst/>
@@ -21418,8 +21407,15 @@
           </a:bodyPr>
           <a:lstStyle/>
           <a:p>
+            <a:pPr>
+              <a:spcAft>
+                <a:spcPts val="4200"/>
+              </a:spcAft>
+              <a:buFont typeface="Arial" pitchFamily="34" charset="0"/>
+              <a:buChar char="•"/>
+            </a:pPr>
             <a:r>
-              <a:rPr lang="es-AR" sz="2800" dirty="0" smtClean="0">
+              <a:rPr lang="es-AR" sz="2400" dirty="0" smtClean="0">
                 <a:solidFill>
                   <a:schemeClr val="tx2">
                     <a:lumMod val="50000"/>
@@ -21428,9 +21424,153 @@
                 <a:latin typeface="Cambria" pitchFamily="18" charset="0"/>
                 <a:cs typeface="Arial" charset="0"/>
               </a:rPr>
-              <a:t>??</a:t>
+              <a:t> Buscar </a:t>
             </a:r>
-            <a:endParaRPr lang="es-AR" sz="2800" dirty="0" smtClean="0">
+            <a:r>
+              <a:rPr lang="es-AR" sz="2400" dirty="0" smtClean="0">
+                <a:solidFill>
+                  <a:schemeClr val="tx2">
+                    <a:lumMod val="50000"/>
+                  </a:schemeClr>
+                </a:solidFill>
+                <a:latin typeface="Cambria" pitchFamily="18" charset="0"/>
+                <a:cs typeface="Arial" charset="0"/>
+              </a:rPr>
+              <a:t>una comunicación fluida con el cliente</a:t>
+            </a:r>
+          </a:p>
+          <a:p>
+            <a:pPr>
+              <a:spcAft>
+                <a:spcPts val="4200"/>
+              </a:spcAft>
+              <a:buFont typeface="Arial" pitchFamily="34" charset="0"/>
+              <a:buChar char="•"/>
+            </a:pPr>
+            <a:r>
+              <a:rPr lang="es-AR" sz="2400" dirty="0" smtClean="0">
+                <a:solidFill>
+                  <a:schemeClr val="tx2">
+                    <a:lumMod val="50000"/>
+                  </a:schemeClr>
+                </a:solidFill>
+                <a:latin typeface="Cambria" pitchFamily="18" charset="0"/>
+                <a:cs typeface="Arial" charset="0"/>
+              </a:rPr>
+              <a:t> Asegurar </a:t>
+            </a:r>
+            <a:r>
+              <a:rPr lang="es-AR" sz="2400" dirty="0" smtClean="0">
+                <a:solidFill>
+                  <a:schemeClr val="tx2">
+                    <a:lumMod val="50000"/>
+                  </a:schemeClr>
+                </a:solidFill>
+                <a:latin typeface="Cambria" pitchFamily="18" charset="0"/>
+                <a:cs typeface="Arial" charset="0"/>
+              </a:rPr>
+              <a:t>que los requisitos son precisos</a:t>
+            </a:r>
+          </a:p>
+          <a:p>
+            <a:pPr>
+              <a:spcAft>
+                <a:spcPts val="4200"/>
+              </a:spcAft>
+              <a:buFont typeface="Arial" pitchFamily="34" charset="0"/>
+              <a:buChar char="•"/>
+            </a:pPr>
+            <a:r>
+              <a:rPr lang="es-AR" sz="2400" dirty="0" smtClean="0">
+                <a:solidFill>
+                  <a:schemeClr val="tx2">
+                    <a:lumMod val="50000"/>
+                  </a:schemeClr>
+                </a:solidFill>
+                <a:latin typeface="Cambria" pitchFamily="18" charset="0"/>
+                <a:cs typeface="Arial" charset="0"/>
+              </a:rPr>
+              <a:t> Buscar </a:t>
+            </a:r>
+            <a:r>
+              <a:rPr lang="es-AR" sz="2400" dirty="0" smtClean="0">
+                <a:solidFill>
+                  <a:schemeClr val="tx2">
+                    <a:lumMod val="50000"/>
+                  </a:schemeClr>
+                </a:solidFill>
+                <a:latin typeface="Cambria" pitchFamily="18" charset="0"/>
+                <a:cs typeface="Arial" charset="0"/>
+              </a:rPr>
+              <a:t>verificación del alcance por parte del cliente</a:t>
+            </a:r>
+          </a:p>
+          <a:p>
+            <a:pPr>
+              <a:spcAft>
+                <a:spcPts val="4200"/>
+              </a:spcAft>
+              <a:buFont typeface="Arial" pitchFamily="34" charset="0"/>
+              <a:buChar char="•"/>
+            </a:pPr>
+            <a:r>
+              <a:rPr lang="es-AR" sz="2400" dirty="0" smtClean="0">
+                <a:solidFill>
+                  <a:schemeClr val="tx2">
+                    <a:lumMod val="50000"/>
+                  </a:schemeClr>
+                </a:solidFill>
+                <a:latin typeface="Cambria" pitchFamily="18" charset="0"/>
+                <a:cs typeface="Arial" charset="0"/>
+              </a:rPr>
+              <a:t> Avisar </a:t>
+            </a:r>
+            <a:r>
+              <a:rPr lang="es-AR" sz="2400" dirty="0" smtClean="0">
+                <a:solidFill>
+                  <a:schemeClr val="tx2">
+                    <a:lumMod val="50000"/>
+                  </a:schemeClr>
+                </a:solidFill>
+                <a:latin typeface="Cambria" pitchFamily="18" charset="0"/>
+                <a:cs typeface="Arial" charset="0"/>
+              </a:rPr>
+              <a:t>con anticipación al no finalizar algo en un sprint</a:t>
+            </a:r>
+          </a:p>
+          <a:p>
+            <a:pPr>
+              <a:spcAft>
+                <a:spcPts val="4200"/>
+              </a:spcAft>
+              <a:buFont typeface="Arial" pitchFamily="34" charset="0"/>
+              <a:buChar char="•"/>
+            </a:pPr>
+            <a:r>
+              <a:rPr lang="es-AR" sz="2400" dirty="0" smtClean="0">
+                <a:solidFill>
+                  <a:schemeClr val="tx2">
+                    <a:lumMod val="50000"/>
+                  </a:schemeClr>
+                </a:solidFill>
+                <a:latin typeface="Cambria" pitchFamily="18" charset="0"/>
+                <a:cs typeface="Arial" charset="0"/>
+              </a:rPr>
+              <a:t> Importancia </a:t>
+            </a:r>
+            <a:r>
+              <a:rPr lang="es-AR" sz="2400" dirty="0" smtClean="0">
+                <a:solidFill>
+                  <a:schemeClr val="tx2">
+                    <a:lumMod val="50000"/>
+                  </a:schemeClr>
+                </a:solidFill>
+                <a:latin typeface="Cambria" pitchFamily="18" charset="0"/>
+                <a:cs typeface="Arial" charset="0"/>
+              </a:rPr>
+              <a:t>de mantener una trazabilidad</a:t>
+            </a:r>
+            <a:endParaRPr lang="es-AR" sz="2400" dirty="0" smtClean="0">
               <a:solidFill>
                 <a:schemeClr val="tx2">
                   <a:lumMod val="50000"/>
@@ -22494,7 +22634,7 @@
           <p:nvPr/>
         </p:nvPicPr>
         <p:blipFill>
-          <a:blip r:embed="rId8" cstate="print"/>
+          <a:blip r:embed="rId7" cstate="print"/>
           <a:stretch>
             <a:fillRect/>
           </a:stretch>
@@ -22532,7 +22672,7 @@
             <p:nvPr/>
           </p:nvPicPr>
           <p:blipFill>
-            <a:blip r:embed="rId9" cstate="print">
+            <a:blip r:embed="rId8" cstate="print">
               <a:clrChange>
                 <a:clrFrom>
                   <a:srgbClr val="F6F6FB"/>
@@ -22567,7 +22707,7 @@
             <p:nvPr/>
           </p:nvPicPr>
           <p:blipFill>
-            <a:blip r:embed="rId10" cstate="print">
+            <a:blip r:embed="rId9" cstate="print">
               <a:clrChange>
                 <a:clrFrom>
                   <a:srgbClr val="F6F6FB"/>
@@ -22611,7 +22751,7 @@
           <p:nvPr/>
         </p:nvPicPr>
         <p:blipFill>
-          <a:blip r:embed="rId11" cstate="print"/>
+          <a:blip r:embed="rId10" cstate="print"/>
           <a:srcRect/>
           <a:stretch>
             <a:fillRect/>
@@ -22646,7 +22786,7 @@
           <p:nvPr/>
         </p:nvPicPr>
         <p:blipFill>
-          <a:blip r:embed="rId11" cstate="print"/>
+          <a:blip r:embed="rId10" cstate="print"/>
           <a:srcRect/>
           <a:stretch>
             <a:fillRect/>
@@ -22681,7 +22821,7 @@
           <p:nvPr/>
         </p:nvPicPr>
         <p:blipFill>
-          <a:blip r:embed="rId12" cstate="print"/>
+          <a:blip r:embed="rId11" cstate="print"/>
           <a:srcRect/>
           <a:stretch>
             <a:fillRect/>

</xml_diff>

<commit_message>
# pequeño cambio a la presentación final
</commit_message>
<xml_diff>
--- a/presentations/presentacionFinal.pptx
+++ b/presentations/presentacionFinal.pptx
@@ -4511,6 +4511,13 @@
         </dgm:presLayoutVars>
       </dgm:prSet>
       <dgm:spPr/>
+      <dgm:t>
+        <a:bodyPr/>
+        <a:lstStyle/>
+        <a:p>
+          <a:endParaRPr lang="es-AR"/>
+        </a:p>
+      </dgm:t>
     </dgm:pt>
     <dgm:pt modelId="{BA95758A-2237-4356-B9A1-2725CF38A041}" type="pres">
       <dgm:prSet presAssocID="{F347E4E1-32C2-4ADD-86D3-636ADCF8C776}" presName="sibTrans" presStyleCnt="0"/>
@@ -4523,6 +4530,13 @@
         </dgm:presLayoutVars>
       </dgm:prSet>
       <dgm:spPr/>
+      <dgm:t>
+        <a:bodyPr/>
+        <a:lstStyle/>
+        <a:p>
+          <a:endParaRPr lang="es-AR"/>
+        </a:p>
+      </dgm:t>
     </dgm:pt>
     <dgm:pt modelId="{8BA669E2-4FE4-4A76-A003-7F81253E9070}" type="pres">
       <dgm:prSet presAssocID="{95638AF9-C5BA-4E06-969F-00394F314752}" presName="sibTrans" presStyleCnt="0"/>
@@ -4535,6 +4549,13 @@
         </dgm:presLayoutVars>
       </dgm:prSet>
       <dgm:spPr/>
+      <dgm:t>
+        <a:bodyPr/>
+        <a:lstStyle/>
+        <a:p>
+          <a:endParaRPr lang="es-AR"/>
+        </a:p>
+      </dgm:t>
     </dgm:pt>
   </dgm:ptLst>
   <dgm:cxnLst>
@@ -6338,8 +6359,8 @@
       </dsp:nvSpPr>
       <dsp:spPr>
         <a:xfrm>
-          <a:off x="534659" y="0"/>
-          <a:ext cx="6059473" cy="4248472"/>
+          <a:off x="561662" y="0"/>
+          <a:ext cx="6365507" cy="4248472"/>
         </a:xfrm>
         <a:prstGeom prst="rightArrow">
           <a:avLst/>
@@ -6384,8 +6405,8 @@
       </dsp:nvSpPr>
       <dsp:spPr>
         <a:xfrm>
-          <a:off x="1903" y="1274541"/>
-          <a:ext cx="2081703" cy="1699388"/>
+          <a:off x="2702" y="1274541"/>
+          <a:ext cx="2172053" cy="1699388"/>
         </a:xfrm>
         <a:prstGeom prst="roundRect">
           <a:avLst/>
@@ -6479,8 +6500,8 @@
         </a:p>
       </dsp:txBody>
       <dsp:txXfrm>
-        <a:off x="1903" y="1274541"/>
-        <a:ext cx="2081703" cy="1699388"/>
+        <a:off x="2702" y="1274541"/>
+        <a:ext cx="2172053" cy="1699388"/>
       </dsp:txXfrm>
     </dsp:sp>
     <dsp:sp modelId="{89E31B8C-B1F1-4ACF-9FA6-A908EB5B54AA}">
@@ -6490,8 +6511,8 @@
       </dsp:nvSpPr>
       <dsp:spPr>
         <a:xfrm>
-          <a:off x="2406979" y="1274541"/>
-          <a:ext cx="2081703" cy="1699388"/>
+          <a:off x="2536764" y="1274541"/>
+          <a:ext cx="2172053" cy="1699388"/>
         </a:xfrm>
         <a:prstGeom prst="roundRect">
           <a:avLst/>
@@ -6589,8 +6610,8 @@
         </a:p>
       </dsp:txBody>
       <dsp:txXfrm>
-        <a:off x="2406979" y="1274541"/>
-        <a:ext cx="2081703" cy="1699388"/>
+        <a:off x="2536764" y="1274541"/>
+        <a:ext cx="2172053" cy="1699388"/>
       </dsp:txXfrm>
     </dsp:sp>
     <dsp:sp modelId="{31A8DE1E-3226-437D-9608-072DF772CBF1}">
@@ -6600,8 +6621,8 @@
       </dsp:nvSpPr>
       <dsp:spPr>
         <a:xfrm>
-          <a:off x="4812054" y="1274541"/>
-          <a:ext cx="2314833" cy="1699388"/>
+          <a:off x="5070827" y="1274541"/>
+          <a:ext cx="2415302" cy="1699388"/>
         </a:xfrm>
         <a:prstGeom prst="roundRect">
           <a:avLst/>
@@ -6699,8 +6720,8 @@
         </a:p>
       </dsp:txBody>
       <dsp:txXfrm>
-        <a:off x="4812054" y="1274541"/>
-        <a:ext cx="2314833" cy="1699388"/>
+        <a:off x="5070827" y="1274541"/>
+        <a:ext cx="2415302" cy="1699388"/>
       </dsp:txXfrm>
     </dsp:sp>
   </dsp:spTree>
@@ -22677,19 +22698,7 @@
                 <a:latin typeface="Cambria" pitchFamily="18" charset="0"/>
                 <a:cs typeface="Arial" charset="0"/>
               </a:rPr>
-              <a:t> </a:t>
-            </a:r>
-            <a:r>
-              <a:rPr lang="es-AR" sz="2800" dirty="0" smtClean="0">
-                <a:solidFill>
-                  <a:schemeClr val="tx2">
-                    <a:lumMod val="50000"/>
-                  </a:schemeClr>
-                </a:solidFill>
-                <a:latin typeface="Cambria" pitchFamily="18" charset="0"/>
-                <a:cs typeface="Arial" charset="0"/>
-              </a:rPr>
-              <a:t>Comienzo Sprint 2 </a:t>
+              <a:t> Comienzo Sprint 2 </a:t>
             </a:r>
             <a:r>
               <a:rPr lang="es-AR" sz="2800" dirty="0" smtClean="0">
@@ -22714,19 +22723,7 @@
                 <a:latin typeface="Cambria" pitchFamily="18" charset="0"/>
                 <a:cs typeface="Arial" charset="0"/>
               </a:rPr>
-              <a:t>Múltiples </a:t>
-            </a:r>
-            <a:r>
-              <a:rPr lang="es-AR" sz="2800" dirty="0" smtClean="0">
-                <a:solidFill>
-                  <a:schemeClr val="tx2">
-                    <a:lumMod val="50000"/>
-                  </a:schemeClr>
-                </a:solidFill>
-                <a:latin typeface="Cambria" pitchFamily="18" charset="0"/>
-                <a:cs typeface="Arial" charset="0"/>
-              </a:rPr>
-              <a:t>supervisores</a:t>
+              <a:t>Múltiples supervisores</a:t>
             </a:r>
           </a:p>
         </p:txBody>
@@ -22738,8 +22735,8 @@
           <p:nvPr/>
         </p:nvGraphicFramePr>
         <p:xfrm>
-          <a:off x="1403648" y="2420888"/>
-          <a:ext cx="7128792" cy="4248472"/>
+          <a:off x="1259632" y="2420888"/>
+          <a:ext cx="7488832" cy="4248472"/>
         </p:xfrm>
         <a:graphic>
           <a:graphicData uri="http://schemas.openxmlformats.org/drawingml/2006/diagram">
@@ -23197,6 +23194,41 @@
           <a:chExt cx="0" cy="0"/>
         </a:xfrm>
       </p:grpSpPr>
+      <p:pic>
+        <p:nvPicPr>
+          <p:cNvPr id="2050" name="Picture 2"/>
+          <p:cNvPicPr>
+            <a:picLocks noChangeAspect="1" noChangeArrowheads="1"/>
+          </p:cNvPicPr>
+          <p:nvPr/>
+        </p:nvPicPr>
+        <p:blipFill>
+          <a:blip r:embed="rId3" cstate="print"/>
+          <a:srcRect/>
+          <a:stretch>
+            <a:fillRect/>
+          </a:stretch>
+        </p:blipFill>
+        <p:spPr bwMode="auto">
+          <a:xfrm>
+            <a:off x="1706195" y="1873852"/>
+            <a:ext cx="6276522" cy="4428000"/>
+          </a:xfrm>
+          <a:prstGeom prst="rect">
+            <a:avLst/>
+          </a:prstGeom>
+          <a:ln>
+            <a:noFill/>
+          </a:ln>
+          <a:effectLst>
+            <a:outerShdw blurRad="190500" algn="tl" rotWithShape="0">
+              <a:srgbClr val="000000">
+                <a:alpha val="70000"/>
+              </a:srgbClr>
+            </a:outerShdw>
+          </a:effectLst>
+        </p:spPr>
+      </p:pic>
       <p:sp>
         <p:nvSpPr>
           <p:cNvPr id="4099" name="Rectangle 2"/>
@@ -23222,78 +23254,32 @@
           </a:p>
         </p:txBody>
       </p:sp>
-      <p:sp>
-        <p:nvSpPr>
-          <p:cNvPr id="3" name="2 Botón de acción: Hacia delante o Siguiente">
-            <a:hlinkClick r:id="" action="ppaction://noaction" highlightClick="1"/>
-          </p:cNvPr>
-          <p:cNvSpPr/>
+      <p:pic>
+        <p:nvPicPr>
+          <p:cNvPr id="4" name="Picture 3" descr="C:\Users\sixdemons\AppData\Local\Microsoft\Windows\Temporary Internet Files\Content.IE5\07ASDV69\MCj02157920000[1].wmf"/>
+          <p:cNvPicPr>
+            <a:picLocks noChangeAspect="1" noChangeArrowheads="1"/>
+          </p:cNvPicPr>
           <p:nvPr/>
-        </p:nvSpPr>
+        </p:nvPicPr>
+        <p:blipFill>
+          <a:blip r:embed="rId4" cstate="print"/>
+          <a:srcRect/>
+          <a:stretch>
+            <a:fillRect/>
+          </a:stretch>
+        </p:blipFill>
         <p:spPr bwMode="auto">
           <a:xfrm>
-            <a:off x="3851920" y="3140968"/>
-            <a:ext cx="1872208" cy="1872208"/>
+            <a:off x="7092280" y="4941168"/>
+            <a:ext cx="1584000" cy="2241926"/>
           </a:xfrm>
-          <a:prstGeom prst="actionButtonForwardNext">
+          <a:prstGeom prst="rect">
             <a:avLst/>
           </a:prstGeom>
-          <a:ln>
-            <a:headEnd type="none" w="sm" len="sm"/>
-            <a:tailEnd type="none" w="sm" len="sm"/>
-          </a:ln>
+          <a:noFill/>
         </p:spPr>
-        <p:style>
-          <a:lnRef idx="1">
-            <a:schemeClr val="accent2"/>
-          </a:lnRef>
-          <a:fillRef idx="3">
-            <a:schemeClr val="accent2"/>
-          </a:fillRef>
-          <a:effectRef idx="2">
-            <a:schemeClr val="accent2"/>
-          </a:effectRef>
-          <a:fontRef idx="minor">
-            <a:schemeClr val="lt1"/>
-          </a:fontRef>
-        </p:style>
-        <p:txBody>
-          <a:bodyPr vert="horz" wrap="square" lIns="91440" tIns="45720" rIns="91440" bIns="45720" numCol="1" rtlCol="0" anchor="t" anchorCtr="0" compatLnSpc="1">
-            <a:prstTxWarp prst="textNoShape">
-              <a:avLst/>
-            </a:prstTxWarp>
-          </a:bodyPr>
-          <a:lstStyle/>
-          <a:p>
-            <a:pPr marL="0" marR="0" indent="0" algn="l" defTabSz="914400" rtl="0" eaLnBrk="1" fontAlgn="base" latinLnBrk="0" hangingPunct="1">
-              <a:lnSpc>
-                <a:spcPct val="100000"/>
-              </a:lnSpc>
-              <a:spcBef>
-                <a:spcPct val="0"/>
-              </a:spcBef>
-              <a:spcAft>
-                <a:spcPct val="0"/>
-              </a:spcAft>
-              <a:buClrTx/>
-              <a:buSzTx/>
-              <a:buFontTx/>
-              <a:buNone/>
-              <a:tabLst/>
-            </a:pPr>
-            <a:endParaRPr kumimoji="0" lang="en-US" sz="1800" b="0" i="0" u="none" strike="noStrike" cap="none" normalizeH="0" baseline="0" smtClean="0">
-              <a:ln>
-                <a:noFill/>
-              </a:ln>
-              <a:solidFill>
-                <a:schemeClr val="tx1"/>
-              </a:solidFill>
-              <a:effectLst/>
-              <a:latin typeface="Verdana" pitchFamily="34" charset="0"/>
-            </a:endParaRPr>
-          </a:p>
-        </p:txBody>
-      </p:sp>
+      </p:pic>
     </p:spTree>
   </p:cSld>
   <p:clrMapOvr>
@@ -23302,137 +23288,9 @@
   <p:timing>
     <p:tnLst>
       <p:par>
-        <p:cTn id="1" dur="indefinite" restart="never" nodeType="tmRoot">
-          <p:childTnLst>
-            <p:seq concurrent="1" nextAc="seek">
-              <p:cTn id="2" dur="indefinite" nodeType="mainSeq">
-                <p:childTnLst>
-                  <p:par>
-                    <p:cTn id="3" fill="hold">
-                      <p:stCondLst>
-                        <p:cond delay="indefinite"/>
-                        <p:cond evt="onBegin" delay="0">
-                          <p:tn val="2"/>
-                        </p:cond>
-                      </p:stCondLst>
-                      <p:childTnLst>
-                        <p:par>
-                          <p:cTn id="4" fill="hold">
-                            <p:stCondLst>
-                              <p:cond delay="0"/>
-                            </p:stCondLst>
-                            <p:childTnLst>
-                              <p:par>
-                                <p:cTn id="5" presetID="53" presetClass="entr" presetSubtype="0" fill="hold" grpId="0" nodeType="withEffect">
-                                  <p:stCondLst>
-                                    <p:cond delay="0"/>
-                                  </p:stCondLst>
-                                  <p:childTnLst>
-                                    <p:set>
-                                      <p:cBhvr>
-                                        <p:cTn id="6" dur="1" fill="hold">
-                                          <p:stCondLst>
-                                            <p:cond delay="0"/>
-                                          </p:stCondLst>
-                                        </p:cTn>
-                                        <p:tgtEl>
-                                          <p:spTgt spid="3"/>
-                                        </p:tgtEl>
-                                        <p:attrNameLst>
-                                          <p:attrName>style.visibility</p:attrName>
-                                        </p:attrNameLst>
-                                      </p:cBhvr>
-                                      <p:to>
-                                        <p:strVal val="visible"/>
-                                      </p:to>
-                                    </p:set>
-                                    <p:anim calcmode="lin" valueType="num">
-                                      <p:cBhvr>
-                                        <p:cTn id="7" dur="500" fill="hold"/>
-                                        <p:tgtEl>
-                                          <p:spTgt spid="3"/>
-                                        </p:tgtEl>
-                                        <p:attrNameLst>
-                                          <p:attrName>ppt_w</p:attrName>
-                                        </p:attrNameLst>
-                                      </p:cBhvr>
-                                      <p:tavLst>
-                                        <p:tav tm="0">
-                                          <p:val>
-                                            <p:fltVal val="0"/>
-                                          </p:val>
-                                        </p:tav>
-                                        <p:tav tm="100000">
-                                          <p:val>
-                                            <p:strVal val="#ppt_w"/>
-                                          </p:val>
-                                        </p:tav>
-                                      </p:tavLst>
-                                    </p:anim>
-                                    <p:anim calcmode="lin" valueType="num">
-                                      <p:cBhvr>
-                                        <p:cTn id="8" dur="500" fill="hold"/>
-                                        <p:tgtEl>
-                                          <p:spTgt spid="3"/>
-                                        </p:tgtEl>
-                                        <p:attrNameLst>
-                                          <p:attrName>ppt_h</p:attrName>
-                                        </p:attrNameLst>
-                                      </p:cBhvr>
-                                      <p:tavLst>
-                                        <p:tav tm="0">
-                                          <p:val>
-                                            <p:fltVal val="0"/>
-                                          </p:val>
-                                        </p:tav>
-                                        <p:tav tm="100000">
-                                          <p:val>
-                                            <p:strVal val="#ppt_h"/>
-                                          </p:val>
-                                        </p:tav>
-                                      </p:tavLst>
-                                    </p:anim>
-                                    <p:animEffect transition="in" filter="fade">
-                                      <p:cBhvr>
-                                        <p:cTn id="9" dur="500"/>
-                                        <p:tgtEl>
-                                          <p:spTgt spid="3"/>
-                                        </p:tgtEl>
-                                      </p:cBhvr>
-                                    </p:animEffect>
-                                  </p:childTnLst>
-                                </p:cTn>
-                              </p:par>
-                            </p:childTnLst>
-                          </p:cTn>
-                        </p:par>
-                      </p:childTnLst>
-                    </p:cTn>
-                  </p:par>
-                </p:childTnLst>
-              </p:cTn>
-              <p:prevCondLst>
-                <p:cond evt="onPrev" delay="0">
-                  <p:tgtEl>
-                    <p:sldTgt/>
-                  </p:tgtEl>
-                </p:cond>
-              </p:prevCondLst>
-              <p:nextCondLst>
-                <p:cond evt="onNext" delay="0">
-                  <p:tgtEl>
-                    <p:sldTgt/>
-                  </p:tgtEl>
-                </p:cond>
-              </p:nextCondLst>
-            </p:seq>
-          </p:childTnLst>
-        </p:cTn>
+        <p:cTn id="1" dur="indefinite" restart="never" nodeType="tmRoot"/>
       </p:par>
     </p:tnLst>
-    <p:bldLst>
-      <p:bldP spid="3" grpId="0" animBg="1"/>
-    </p:bldLst>
   </p:timing>
 </p:sld>
 </file>
@@ -28088,26 +27946,34 @@
       </p:pic>
       <p:pic>
         <p:nvPicPr>
-          <p:cNvPr id="22" name="21 Imagen" descr="WIF_logo.gif"/>
+          <p:cNvPr id="1026" name="Picture 2"/>
           <p:cNvPicPr>
-            <a:picLocks noChangeAspect="1"/>
+            <a:picLocks noChangeAspect="1" noChangeArrowheads="1"/>
           </p:cNvPicPr>
           <p:nvPr/>
         </p:nvPicPr>
         <p:blipFill>
           <a:blip r:embed="rId7" cstate="print"/>
+          <a:srcRect t="33075" b="33075"/>
           <a:stretch>
             <a:fillRect/>
           </a:stretch>
         </p:blipFill>
-        <p:spPr>
+        <p:spPr bwMode="auto">
           <a:xfrm>
-            <a:off x="2930330" y="3684568"/>
-            <a:ext cx="4386276" cy="824552"/>
+            <a:off x="3419872" y="3645024"/>
+            <a:ext cx="2552700" cy="864096"/>
           </a:xfrm>
           <a:prstGeom prst="rect">
             <a:avLst/>
           </a:prstGeom>
+          <a:noFill/>
+          <a:ln w="9525">
+            <a:noFill/>
+            <a:miter lim="800000"/>
+            <a:headEnd/>
+            <a:tailEnd/>
+          </a:ln>
         </p:spPr>
       </p:pic>
     </p:spTree>
@@ -28152,7 +28018,7 @@
                                           </p:stCondLst>
                                         </p:cTn>
                                         <p:tgtEl>
-                                          <p:spTgt spid="22"/>
+                                          <p:spTgt spid="20"/>
                                         </p:tgtEl>
                                         <p:attrNameLst>
                                           <p:attrName>style.visibility</p:attrName>
@@ -28166,7 +28032,7 @@
                                       <p:cBhvr>
                                         <p:cTn id="7" dur="1" fill="hold"/>
                                         <p:tgtEl>
-                                          <p:spTgt spid="22"/>
+                                          <p:spTgt spid="20"/>
                                         </p:tgtEl>
                                         <p:attrNameLst>
                                           <p:attrName/>
@@ -28190,7 +28056,7 @@
                                           </p:stCondLst>
                                         </p:cTn>
                                         <p:tgtEl>
-                                          <p:spTgt spid="20"/>
+                                          <p:spTgt spid="10"/>
                                         </p:tgtEl>
                                         <p:attrNameLst>
                                           <p:attrName>style.visibility</p:attrName>
@@ -28204,7 +28070,7 @@
                                       <p:cBhvr>
                                         <p:cTn id="10" dur="1" fill="hold"/>
                                         <p:tgtEl>
-                                          <p:spTgt spid="20"/>
+                                          <p:spTgt spid="10"/>
                                         </p:tgtEl>
                                         <p:attrNameLst>
                                           <p:attrName/>
@@ -28228,7 +28094,7 @@
                                           </p:stCondLst>
                                         </p:cTn>
                                         <p:tgtEl>
-                                          <p:spTgt spid="10"/>
+                                          <p:spTgt spid="21"/>
                                         </p:tgtEl>
                                         <p:attrNameLst>
                                           <p:attrName>style.visibility</p:attrName>
@@ -28241,44 +28107,6 @@
                                     <p:anim to="" calcmode="lin" valueType="num">
                                       <p:cBhvr>
                                         <p:cTn id="13" dur="1" fill="hold"/>
-                                        <p:tgtEl>
-                                          <p:spTgt spid="10"/>
-                                        </p:tgtEl>
-                                        <p:attrNameLst>
-                                          <p:attrName/>
-                                        </p:attrNameLst>
-                                      </p:cBhvr>
-                                    </p:anim>
-                                  </p:childTnLst>
-                                </p:cTn>
-                              </p:par>
-                              <p:par>
-                                <p:cTn id="14" presetID="24" presetClass="entr" presetSubtype="0" fill="hold" nodeType="withEffect">
-                                  <p:stCondLst>
-                                    <p:cond delay="0"/>
-                                  </p:stCondLst>
-                                  <p:childTnLst>
-                                    <p:set>
-                                      <p:cBhvr>
-                                        <p:cTn id="15" dur="1" fill="hold">
-                                          <p:stCondLst>
-                                            <p:cond delay="0"/>
-                                          </p:stCondLst>
-                                        </p:cTn>
-                                        <p:tgtEl>
-                                          <p:spTgt spid="21"/>
-                                        </p:tgtEl>
-                                        <p:attrNameLst>
-                                          <p:attrName>style.visibility</p:attrName>
-                                        </p:attrNameLst>
-                                      </p:cBhvr>
-                                      <p:to>
-                                        <p:strVal val="visible"/>
-                                      </p:to>
-                                    </p:set>
-                                    <p:anim to="" calcmode="lin" valueType="num">
-                                      <p:cBhvr>
-                                        <p:cTn id="16" dur="1" fill="hold"/>
                                         <p:tgtEl>
                                           <p:spTgt spid="21"/>
                                         </p:tgtEl>

</xml_diff>

<commit_message>
# ajustes finales a la presentación
</commit_message>
<xml_diff>
--- a/presentations/presentacionFinal.pptx
+++ b/presentations/presentacionFinal.pptx
@@ -20,8 +20,8 @@
     <p:sldId id="299" r:id="rId8"/>
     <p:sldId id="297" r:id="rId9"/>
     <p:sldId id="276" r:id="rId10"/>
-    <p:sldId id="296" r:id="rId11"/>
-    <p:sldId id="278" r:id="rId12"/>
+    <p:sldId id="278" r:id="rId11"/>
+    <p:sldId id="296" r:id="rId12"/>
     <p:sldId id="286" r:id="rId13"/>
     <p:sldId id="301" r:id="rId14"/>
     <p:sldId id="302" r:id="rId15"/>
@@ -3625,8 +3625,8 @@
     <dgm:cxn modelId="{F54C81C4-0BF3-45D2-BEEB-836330666D85}" srcId="{D39DC43E-DB26-4A49-93E5-225531332D90}" destId="{3B9743B4-F01D-4586-AC45-4E69667D0F26}" srcOrd="1" destOrd="0" parTransId="{5F40C76A-850B-4463-A83C-A0ADF637C544}" sibTransId="{431939FB-991F-4F77-BF80-CE18E689CFBA}"/>
     <dgm:cxn modelId="{024F3004-0FB1-4D4A-9237-D3CE237DD7E2}" srcId="{091CB852-3C3B-4641-B340-B62A23A17396}" destId="{D39DC43E-DB26-4A49-93E5-225531332D90}" srcOrd="0" destOrd="0" parTransId="{E47ACF2A-8D15-4275-9F09-BFCF12B33D96}" sibTransId="{2C6F4B07-6439-4A6B-8853-165E860B82DC}"/>
     <dgm:cxn modelId="{28D4EC2B-90E4-461E-8F48-559CB4B7530E}" srcId="{091CB852-3C3B-4641-B340-B62A23A17396}" destId="{1335ED87-60AC-4FFC-8D24-F07B546057F0}" srcOrd="1" destOrd="0" parTransId="{3759289C-15D4-4436-9D80-C32145D909D1}" sibTransId="{C7C5EE43-52AC-43FA-ABC7-872C8F6C822A}"/>
+    <dgm:cxn modelId="{8540E702-437C-4689-882B-F57CA367D2D9}" type="presOf" srcId="{ADD28C15-BDC6-4856-B977-CB7B9AA9115F}" destId="{224C24F4-2C6C-4F8C-861B-CC3CF40F5803}" srcOrd="0" destOrd="0" presId="urn:microsoft.com/office/officeart/2005/8/layout/vList5"/>
     <dgm:cxn modelId="{598EA5F9-4224-4E00-9650-A7D1A2D67DD5}" srcId="{D39DC43E-DB26-4A49-93E5-225531332D90}" destId="{EB0277B1-F0AD-41EF-8F28-0993A90E4BE4}" srcOrd="0" destOrd="0" parTransId="{EAF91662-4125-450F-9EDE-806F7C5AD8B8}" sibTransId="{C36C1C2F-9358-4263-AA14-27F3908BB04C}"/>
-    <dgm:cxn modelId="{8540E702-437C-4689-882B-F57CA367D2D9}" type="presOf" srcId="{ADD28C15-BDC6-4856-B977-CB7B9AA9115F}" destId="{224C24F4-2C6C-4F8C-861B-CC3CF40F5803}" srcOrd="0" destOrd="0" presId="urn:microsoft.com/office/officeart/2005/8/layout/vList5"/>
     <dgm:cxn modelId="{6F69E9B2-CE1D-44D5-92FD-E6C2E0ED5BA4}" type="presOf" srcId="{3B9743B4-F01D-4586-AC45-4E69667D0F26}" destId="{32161D7C-8BF5-45A2-B633-1D94A9C34A3E}" srcOrd="0" destOrd="1" presId="urn:microsoft.com/office/officeart/2005/8/layout/vList5"/>
     <dgm:cxn modelId="{EFE232A2-C856-4825-BBF1-35B18A274A30}" type="presOf" srcId="{D39DC43E-DB26-4A49-93E5-225531332D90}" destId="{D6DBB934-FBD1-4336-B203-F955487F2A33}" srcOrd="0" destOrd="0" presId="urn:microsoft.com/office/officeart/2005/8/layout/vList5"/>
     <dgm:cxn modelId="{610A8C35-D324-48EF-BA75-8F88004F461C}" type="presOf" srcId="{EB0277B1-F0AD-41EF-8F28-0993A90E4BE4}" destId="{32161D7C-8BF5-45A2-B633-1D94A9C34A3E}" srcOrd="0" destOrd="0" presId="urn:microsoft.com/office/officeart/2005/8/layout/vList5"/>
@@ -3650,7 +3650,7 @@
   <dgm:whole/>
   <dgm:extLst>
     <a:ext uri="http://schemas.microsoft.com/office/drawing/2008/diagram">
-      <dsp:dataModelExt xmlns="" xmlns:dsp="http://schemas.microsoft.com/office/drawing/2008/diagram" relId="rId7" minVer="http://schemas.openxmlformats.org/drawingml/2006/diagram"/>
+      <dsp:dataModelExt xmlns:dsp="http://schemas.microsoft.com/office/drawing/2008/diagram" xmlns="" relId="rId7" minVer="http://schemas.openxmlformats.org/drawingml/2006/diagram"/>
     </a:ext>
   </dgm:extLst>
 </dgm:dataModel>
@@ -3952,7 +3952,7 @@
   <dgm:whole/>
   <dgm:extLst>
     <a:ext uri="http://schemas.microsoft.com/office/drawing/2008/diagram">
-      <dsp:dataModelExt xmlns="" xmlns:dsp="http://schemas.microsoft.com/office/drawing/2008/diagram" relId="rId7" minVer="http://schemas.openxmlformats.org/drawingml/2006/diagram"/>
+      <dsp:dataModelExt xmlns:dsp="http://schemas.microsoft.com/office/drawing/2008/diagram" xmlns="" relId="rId7" minVer="http://schemas.openxmlformats.org/drawingml/2006/diagram"/>
     </a:ext>
   </dgm:extLst>
 </dgm:dataModel>
@@ -4187,7 +4187,7 @@
   <dgm:whole/>
   <dgm:extLst>
     <a:ext uri="http://schemas.microsoft.com/office/drawing/2008/diagram">
-      <dsp:dataModelExt xmlns="" xmlns:dsp="http://schemas.microsoft.com/office/drawing/2008/diagram" relId="rId7" minVer="http://schemas.openxmlformats.org/drawingml/2006/diagram"/>
+      <dsp:dataModelExt xmlns:dsp="http://schemas.microsoft.com/office/drawing/2008/diagram" xmlns="" relId="rId7" minVer="http://schemas.openxmlformats.org/drawingml/2006/diagram"/>
     </a:ext>
   </dgm:extLst>
 </dgm:dataModel>
@@ -4346,7 +4346,7 @@
   <dgm:whole/>
   <dgm:extLst>
     <a:ext uri="http://schemas.microsoft.com/office/drawing/2008/diagram">
-      <dsp:dataModelExt xmlns="" xmlns:dsp="http://schemas.microsoft.com/office/drawing/2008/diagram" relId="rId8" minVer="http://schemas.openxmlformats.org/drawingml/2006/diagram"/>
+      <dsp:dataModelExt xmlns:dsp="http://schemas.microsoft.com/office/drawing/2008/diagram" xmlns="" relId="rId8" minVer="http://schemas.openxmlformats.org/drawingml/2006/diagram"/>
     </a:ext>
   </dgm:extLst>
 </dgm:dataModel>
@@ -5386,6 +5386,378 @@
       <dsp:cNvGrpSpPr/>
     </dsp:nvGrpSpPr>
     <dsp:grpSpPr/>
+    <dsp:sp modelId="{B3E6B583-9654-4E7F-892D-8908B1435FF6}">
+      <dsp:nvSpPr>
+        <dsp:cNvPr id="0" name=""/>
+        <dsp:cNvSpPr/>
+      </dsp:nvSpPr>
+      <dsp:spPr>
+        <a:xfrm>
+          <a:off x="561662" y="0"/>
+          <a:ext cx="6365507" cy="4248472"/>
+        </a:xfrm>
+        <a:prstGeom prst="rightArrow">
+          <a:avLst/>
+        </a:prstGeom>
+        <a:solidFill>
+          <a:schemeClr val="dk2">
+            <a:tint val="40000"/>
+            <a:hueOff val="0"/>
+            <a:satOff val="0"/>
+            <a:lumOff val="0"/>
+            <a:alphaOff val="0"/>
+          </a:schemeClr>
+        </a:solidFill>
+        <a:ln>
+          <a:noFill/>
+        </a:ln>
+        <a:effectLst>
+          <a:outerShdw blurRad="40000" dist="23000" dir="5400000" rotWithShape="0">
+            <a:srgbClr val="000000">
+              <a:alpha val="35000"/>
+            </a:srgbClr>
+          </a:outerShdw>
+        </a:effectLst>
+      </dsp:spPr>
+      <dsp:style>
+        <a:lnRef idx="0">
+          <a:scrgbClr r="0" g="0" b="0"/>
+        </a:lnRef>
+        <a:fillRef idx="1">
+          <a:scrgbClr r="0" g="0" b="0"/>
+        </a:fillRef>
+        <a:effectRef idx="2">
+          <a:scrgbClr r="0" g="0" b="0"/>
+        </a:effectRef>
+        <a:fontRef idx="minor"/>
+      </dsp:style>
+    </dsp:sp>
+    <dsp:sp modelId="{C9C6AA2F-F6CE-4F9A-A0A0-A4FB364B78E4}">
+      <dsp:nvSpPr>
+        <dsp:cNvPr id="0" name=""/>
+        <dsp:cNvSpPr/>
+      </dsp:nvSpPr>
+      <dsp:spPr>
+        <a:xfrm>
+          <a:off x="2702" y="1274541"/>
+          <a:ext cx="2172053" cy="1699388"/>
+        </a:xfrm>
+        <a:prstGeom prst="roundRect">
+          <a:avLst/>
+        </a:prstGeom>
+        <a:gradFill rotWithShape="0">
+          <a:gsLst>
+            <a:gs pos="0">
+              <a:schemeClr val="dk2">
+                <a:hueOff val="0"/>
+                <a:satOff val="0"/>
+                <a:lumOff val="0"/>
+                <a:alphaOff val="0"/>
+                <a:shade val="51000"/>
+                <a:satMod val="130000"/>
+              </a:schemeClr>
+            </a:gs>
+            <a:gs pos="80000">
+              <a:schemeClr val="dk2">
+                <a:hueOff val="0"/>
+                <a:satOff val="0"/>
+                <a:lumOff val="0"/>
+                <a:alphaOff val="0"/>
+                <a:shade val="93000"/>
+                <a:satMod val="130000"/>
+              </a:schemeClr>
+            </a:gs>
+            <a:gs pos="100000">
+              <a:schemeClr val="dk2">
+                <a:hueOff val="0"/>
+                <a:satOff val="0"/>
+                <a:lumOff val="0"/>
+                <a:alphaOff val="0"/>
+                <a:shade val="94000"/>
+                <a:satMod val="135000"/>
+              </a:schemeClr>
+            </a:gs>
+          </a:gsLst>
+          <a:lin ang="16200000" scaled="0"/>
+        </a:gradFill>
+        <a:ln>
+          <a:noFill/>
+        </a:ln>
+        <a:effectLst>
+          <a:outerShdw blurRad="40000" dist="23000" dir="5400000" rotWithShape="0">
+            <a:srgbClr val="000000">
+              <a:alpha val="35000"/>
+            </a:srgbClr>
+          </a:outerShdw>
+        </a:effectLst>
+      </dsp:spPr>
+      <dsp:style>
+        <a:lnRef idx="0">
+          <a:scrgbClr r="0" g="0" b="0"/>
+        </a:lnRef>
+        <a:fillRef idx="3">
+          <a:scrgbClr r="0" g="0" b="0"/>
+        </a:fillRef>
+        <a:effectRef idx="2">
+          <a:scrgbClr r="0" g="0" b="0"/>
+        </a:effectRef>
+        <a:fontRef idx="minor">
+          <a:schemeClr val="lt1"/>
+        </a:fontRef>
+      </dsp:style>
+      <dsp:txBody>
+        <a:bodyPr spcFirstLastPara="0" vert="horz" wrap="square" lIns="68580" tIns="68580" rIns="68580" bIns="68580" numCol="1" spcCol="1270" anchor="ctr" anchorCtr="0">
+          <a:noAutofit/>
+        </a:bodyPr>
+        <a:lstStyle/>
+        <a:p>
+          <a:pPr lvl="0" algn="ctr" defTabSz="800100">
+            <a:lnSpc>
+              <a:spcPct val="90000"/>
+            </a:lnSpc>
+            <a:spcBef>
+              <a:spcPct val="0"/>
+            </a:spcBef>
+            <a:spcAft>
+              <a:spcPct val="35000"/>
+            </a:spcAft>
+          </a:pPr>
+          <a:r>
+            <a:rPr lang="es-AR" sz="1800" kern="1200" dirty="0" smtClean="0"/>
+            <a:t>Agregado de nuevas </a:t>
+          </a:r>
+          <a:r>
+            <a:rPr lang="es-AR" sz="1800" kern="1200" dirty="0" err="1" smtClean="0"/>
+            <a:t>stories</a:t>
+          </a:r>
+          <a:endParaRPr lang="en-US" sz="1800" kern="1200" dirty="0"/>
+        </a:p>
+      </dsp:txBody>
+      <dsp:txXfrm>
+        <a:off x="2702" y="1274541"/>
+        <a:ext cx="2172053" cy="1699388"/>
+      </dsp:txXfrm>
+    </dsp:sp>
+    <dsp:sp modelId="{89E31B8C-B1F1-4ACF-9FA6-A908EB5B54AA}">
+      <dsp:nvSpPr>
+        <dsp:cNvPr id="0" name=""/>
+        <dsp:cNvSpPr/>
+      </dsp:nvSpPr>
+      <dsp:spPr>
+        <a:xfrm>
+          <a:off x="2536764" y="1274541"/>
+          <a:ext cx="2172053" cy="1699388"/>
+        </a:xfrm>
+        <a:prstGeom prst="roundRect">
+          <a:avLst/>
+        </a:prstGeom>
+        <a:gradFill rotWithShape="0">
+          <a:gsLst>
+            <a:gs pos="0">
+              <a:schemeClr val="dk2">
+                <a:hueOff val="0"/>
+                <a:satOff val="0"/>
+                <a:lumOff val="0"/>
+                <a:alphaOff val="0"/>
+                <a:shade val="51000"/>
+                <a:satMod val="130000"/>
+              </a:schemeClr>
+            </a:gs>
+            <a:gs pos="80000">
+              <a:schemeClr val="dk2">
+                <a:hueOff val="0"/>
+                <a:satOff val="0"/>
+                <a:lumOff val="0"/>
+                <a:alphaOff val="0"/>
+                <a:shade val="93000"/>
+                <a:satMod val="130000"/>
+              </a:schemeClr>
+            </a:gs>
+            <a:gs pos="100000">
+              <a:schemeClr val="dk2">
+                <a:hueOff val="0"/>
+                <a:satOff val="0"/>
+                <a:lumOff val="0"/>
+                <a:alphaOff val="0"/>
+                <a:shade val="94000"/>
+                <a:satMod val="135000"/>
+              </a:schemeClr>
+            </a:gs>
+          </a:gsLst>
+          <a:lin ang="16200000" scaled="0"/>
+        </a:gradFill>
+        <a:ln>
+          <a:noFill/>
+        </a:ln>
+        <a:effectLst>
+          <a:outerShdw blurRad="40000" dist="23000" dir="5400000" rotWithShape="0">
+            <a:srgbClr val="000000">
+              <a:alpha val="35000"/>
+            </a:srgbClr>
+          </a:outerShdw>
+        </a:effectLst>
+      </dsp:spPr>
+      <dsp:style>
+        <a:lnRef idx="0">
+          <a:scrgbClr r="0" g="0" b="0"/>
+        </a:lnRef>
+        <a:fillRef idx="3">
+          <a:scrgbClr r="0" g="0" b="0"/>
+        </a:fillRef>
+        <a:effectRef idx="2">
+          <a:scrgbClr r="0" g="0" b="0"/>
+        </a:effectRef>
+        <a:fontRef idx="minor">
+          <a:schemeClr val="lt1"/>
+        </a:fontRef>
+      </dsp:style>
+      <dsp:txBody>
+        <a:bodyPr spcFirstLastPara="0" vert="horz" wrap="square" lIns="68580" tIns="68580" rIns="68580" bIns="68580" numCol="1" spcCol="1270" anchor="ctr" anchorCtr="0">
+          <a:noAutofit/>
+        </a:bodyPr>
+        <a:lstStyle/>
+        <a:p>
+          <a:pPr lvl="0" algn="ctr" defTabSz="800100">
+            <a:lnSpc>
+              <a:spcPct val="90000"/>
+            </a:lnSpc>
+            <a:spcBef>
+              <a:spcPct val="0"/>
+            </a:spcBef>
+            <a:spcAft>
+              <a:spcPct val="35000"/>
+            </a:spcAft>
+          </a:pPr>
+          <a:r>
+            <a:rPr lang="es-AR" sz="1800" kern="1200" dirty="0" err="1" smtClean="0"/>
+            <a:t>Repriorización</a:t>
+          </a:r>
+          <a:r>
+            <a:rPr lang="es-AR" sz="1800" kern="1200" dirty="0" smtClean="0"/>
+            <a:t> del </a:t>
+          </a:r>
+          <a:r>
+            <a:rPr lang="es-AR" sz="1800" kern="1200" dirty="0" err="1" smtClean="0"/>
+            <a:t>backlog</a:t>
+          </a:r>
+          <a:endParaRPr lang="en-US" sz="1800" kern="1200" dirty="0"/>
+        </a:p>
+      </dsp:txBody>
+      <dsp:txXfrm>
+        <a:off x="2536764" y="1274541"/>
+        <a:ext cx="2172053" cy="1699388"/>
+      </dsp:txXfrm>
+    </dsp:sp>
+    <dsp:sp modelId="{31A8DE1E-3226-437D-9608-072DF772CBF1}">
+      <dsp:nvSpPr>
+        <dsp:cNvPr id="0" name=""/>
+        <dsp:cNvSpPr/>
+      </dsp:nvSpPr>
+      <dsp:spPr>
+        <a:xfrm>
+          <a:off x="5070827" y="1274541"/>
+          <a:ext cx="2415302" cy="1699388"/>
+        </a:xfrm>
+        <a:prstGeom prst="roundRect">
+          <a:avLst/>
+        </a:prstGeom>
+        <a:gradFill rotWithShape="0">
+          <a:gsLst>
+            <a:gs pos="0">
+              <a:schemeClr val="dk2">
+                <a:hueOff val="0"/>
+                <a:satOff val="0"/>
+                <a:lumOff val="0"/>
+                <a:alphaOff val="0"/>
+                <a:shade val="51000"/>
+                <a:satMod val="130000"/>
+              </a:schemeClr>
+            </a:gs>
+            <a:gs pos="80000">
+              <a:schemeClr val="dk2">
+                <a:hueOff val="0"/>
+                <a:satOff val="0"/>
+                <a:lumOff val="0"/>
+                <a:alphaOff val="0"/>
+                <a:shade val="93000"/>
+                <a:satMod val="130000"/>
+              </a:schemeClr>
+            </a:gs>
+            <a:gs pos="100000">
+              <a:schemeClr val="dk2">
+                <a:hueOff val="0"/>
+                <a:satOff val="0"/>
+                <a:lumOff val="0"/>
+                <a:alphaOff val="0"/>
+                <a:shade val="94000"/>
+                <a:satMod val="135000"/>
+              </a:schemeClr>
+            </a:gs>
+          </a:gsLst>
+          <a:lin ang="16200000" scaled="0"/>
+        </a:gradFill>
+        <a:ln>
+          <a:noFill/>
+        </a:ln>
+        <a:effectLst>
+          <a:outerShdw blurRad="40000" dist="23000" dir="5400000" rotWithShape="0">
+            <a:srgbClr val="000000">
+              <a:alpha val="35000"/>
+            </a:srgbClr>
+          </a:outerShdw>
+        </a:effectLst>
+      </dsp:spPr>
+      <dsp:style>
+        <a:lnRef idx="0">
+          <a:scrgbClr r="0" g="0" b="0"/>
+        </a:lnRef>
+        <a:fillRef idx="3">
+          <a:scrgbClr r="0" g="0" b="0"/>
+        </a:fillRef>
+        <a:effectRef idx="2">
+          <a:scrgbClr r="0" g="0" b="0"/>
+        </a:effectRef>
+        <a:fontRef idx="minor">
+          <a:schemeClr val="lt1"/>
+        </a:fontRef>
+      </dsp:style>
+      <dsp:txBody>
+        <a:bodyPr spcFirstLastPara="0" vert="horz" wrap="square" lIns="68580" tIns="68580" rIns="68580" bIns="68580" numCol="1" spcCol="1270" anchor="ctr" anchorCtr="0">
+          <a:noAutofit/>
+        </a:bodyPr>
+        <a:lstStyle/>
+        <a:p>
+          <a:pPr lvl="0" algn="ctr" defTabSz="800100">
+            <a:lnSpc>
+              <a:spcPct val="90000"/>
+            </a:lnSpc>
+            <a:spcBef>
+              <a:spcPct val="0"/>
+            </a:spcBef>
+            <a:spcAft>
+              <a:spcPct val="35000"/>
+            </a:spcAft>
+          </a:pPr>
+          <a:r>
+            <a:rPr lang="es-AR" sz="1800" kern="1200" dirty="0" smtClean="0"/>
+            <a:t>Implementación de nuevas </a:t>
+          </a:r>
+          <a:r>
+            <a:rPr lang="es-AR" sz="1800" kern="1200" dirty="0" err="1" smtClean="0"/>
+            <a:t>stories</a:t>
+          </a:r>
+          <a:r>
+            <a:rPr lang="es-AR" sz="1800" kern="1200" dirty="0" smtClean="0"/>
+            <a:t> en Sprint 2</a:t>
+          </a:r>
+          <a:endParaRPr lang="en-US" sz="1800" kern="1200" dirty="0"/>
+        </a:p>
+      </dsp:txBody>
+      <dsp:txXfrm>
+        <a:off x="5070827" y="1274541"/>
+        <a:ext cx="2415302" cy="1699388"/>
+      </dsp:txXfrm>
+    </dsp:sp>
   </dsp:spTree>
 </dsp:drawing>
 </file>
@@ -12416,6 +12788,175 @@
       </p:grpSpPr>
       <p:sp>
         <p:nvSpPr>
+          <p:cNvPr id="44034" name="Rectangle 7"/>
+          <p:cNvSpPr>
+            <a:spLocks noGrp="1" noChangeArrowheads="1"/>
+          </p:cNvSpPr>
+          <p:nvPr>
+            <p:ph type="sldNum" sz="quarter" idx="5"/>
+          </p:nvPr>
+        </p:nvSpPr>
+        <p:spPr>
+          <a:noFill/>
+        </p:spPr>
+        <p:txBody>
+          <a:bodyPr/>
+          <a:lstStyle/>
+          <a:p>
+            <a:fld id="{D9234D06-4B3E-4649-8770-4AC86EB469B1}" type="slidenum">
+              <a:rPr lang="es-ES" smtClean="0"/>
+              <a:pPr/>
+              <a:t>10</a:t>
+            </a:fld>
+            <a:endParaRPr lang="es-ES" smtClean="0"/>
+          </a:p>
+        </p:txBody>
+      </p:sp>
+      <p:sp>
+        <p:nvSpPr>
+          <p:cNvPr id="44035" name="Rectangle 2"/>
+          <p:cNvSpPr>
+            <a:spLocks noGrp="1" noRot="1" noChangeAspect="1" noChangeArrowheads="1" noTextEdit="1"/>
+          </p:cNvSpPr>
+          <p:nvPr>
+            <p:ph type="sldImg"/>
+          </p:nvPr>
+        </p:nvSpPr>
+        <p:spPr>
+          <a:ln cap="flat"/>
+        </p:spPr>
+      </p:sp>
+      <p:sp>
+        <p:nvSpPr>
+          <p:cNvPr id="44036" name="Rectangle 3"/>
+          <p:cNvSpPr>
+            <a:spLocks noGrp="1" noChangeArrowheads="1"/>
+          </p:cNvSpPr>
+          <p:nvPr>
+            <p:ph type="body" idx="1"/>
+          </p:nvPr>
+        </p:nvSpPr>
+        <p:spPr>
+          <a:noFill/>
+          <a:ln/>
+        </p:spPr>
+        <p:txBody>
+          <a:bodyPr/>
+          <a:lstStyle/>
+          <a:p>
+            <a:pPr eaLnBrk="1" hangingPunct="1"/>
+            <a:r>
+              <a:rPr lang="es-AR" b="1" dirty="0" smtClean="0"/>
+              <a:t>Speaker:</a:t>
+            </a:r>
+          </a:p>
+          <a:p>
+            <a:pPr eaLnBrk="1" hangingPunct="1"/>
+            <a:endParaRPr lang="es-AR" b="1" baseline="0" dirty="0" smtClean="0"/>
+          </a:p>
+          <a:p>
+            <a:pPr eaLnBrk="1" hangingPunct="1"/>
+            <a:r>
+              <a:rPr lang="es-AR" dirty="0" smtClean="0"/>
+              <a:t>Utilizamos</a:t>
+            </a:r>
+            <a:r>
+              <a:rPr lang="es-AR" baseline="0" dirty="0" smtClean="0"/>
+              <a:t> etiquetas y links a archivos en los </a:t>
+            </a:r>
+            <a:r>
+              <a:rPr lang="es-AR" baseline="0" dirty="0" err="1" smtClean="0"/>
+              <a:t>Stories</a:t>
+            </a:r>
+            <a:r>
+              <a:rPr lang="es-AR" baseline="0" dirty="0" smtClean="0"/>
+              <a:t> para realizar la trazabilidad. Las </a:t>
+            </a:r>
+            <a:r>
+              <a:rPr lang="es-AR" dirty="0" err="1" smtClean="0"/>
+              <a:t>UATs</a:t>
+            </a:r>
+            <a:r>
+              <a:rPr lang="es-AR" dirty="0" smtClean="0"/>
+              <a:t> se encuentran relacionadas</a:t>
+            </a:r>
+            <a:r>
+              <a:rPr lang="es-AR" baseline="0" dirty="0" smtClean="0"/>
+              <a:t> con su </a:t>
+            </a:r>
+            <a:r>
+              <a:rPr lang="es-AR" baseline="0" dirty="0" err="1" smtClean="0"/>
+              <a:t>story</a:t>
+            </a:r>
+            <a:r>
+              <a:rPr lang="es-AR" baseline="0" dirty="0" smtClean="0"/>
+              <a:t> correspondiente. En cada </a:t>
+            </a:r>
+            <a:r>
+              <a:rPr lang="es-AR" baseline="0" dirty="0" err="1" smtClean="0"/>
+              <a:t>commit</a:t>
+            </a:r>
+            <a:r>
+              <a:rPr lang="es-AR" baseline="0" dirty="0" smtClean="0"/>
+              <a:t> se mencionaba la </a:t>
+            </a:r>
+            <a:r>
+              <a:rPr lang="es-AR" baseline="0" dirty="0" err="1" smtClean="0"/>
+              <a:t>story</a:t>
+            </a:r>
+            <a:r>
+              <a:rPr lang="es-AR" baseline="0" dirty="0" smtClean="0"/>
+              <a:t> involucrada.</a:t>
+            </a:r>
+          </a:p>
+          <a:p>
+            <a:pPr eaLnBrk="1" hangingPunct="1"/>
+            <a:endParaRPr lang="es-AR" baseline="0" dirty="0" smtClean="0"/>
+          </a:p>
+          <a:p>
+            <a:pPr eaLnBrk="1" hangingPunct="1"/>
+            <a:r>
+              <a:rPr lang="es-AR" b="1" baseline="0" dirty="0" smtClean="0"/>
+              <a:t>(Demo con </a:t>
+            </a:r>
+            <a:r>
+              <a:rPr lang="es-AR" b="1" baseline="0" dirty="0" err="1" smtClean="0"/>
+              <a:t>Wolof</a:t>
+            </a:r>
+            <a:r>
+              <a:rPr lang="es-AR" b="1" baseline="0" dirty="0" smtClean="0"/>
+              <a:t> mostrando trazabilidad para el alta de campañas)</a:t>
+            </a:r>
+          </a:p>
+        </p:txBody>
+      </p:sp>
+    </p:spTree>
+  </p:cSld>
+  <p:clrMapOvr>
+    <a:masterClrMapping/>
+  </p:clrMapOvr>
+</p:notes>
+</file>
+
+<file path=ppt/notesSlides/notesSlide11.xml><?xml version="1.0" encoding="utf-8"?>
+<p:notes xmlns:a="http://schemas.openxmlformats.org/drawingml/2006/main" xmlns:r="http://schemas.openxmlformats.org/officeDocument/2006/relationships" xmlns:p="http://schemas.openxmlformats.org/presentationml/2006/main">
+  <p:cSld>
+    <p:spTree>
+      <p:nvGrpSpPr>
+        <p:cNvPr id="1" name=""/>
+        <p:cNvGrpSpPr/>
+        <p:nvPr/>
+      </p:nvGrpSpPr>
+      <p:grpSpPr>
+        <a:xfrm>
+          <a:off x="0" y="0"/>
+          <a:ext cx="0" cy="0"/>
+          <a:chOff x="0" y="0"/>
+          <a:chExt cx="0" cy="0"/>
+        </a:xfrm>
+      </p:grpSpPr>
+      <p:sp>
+        <p:nvSpPr>
           <p:cNvPr id="47106" name="Rectangle 7"/>
           <p:cNvSpPr>
             <a:spLocks noGrp="1" noChangeArrowheads="1"/>
@@ -12434,7 +12975,7 @@
             <a:fld id="{060F6942-349D-437D-B6CE-AF49DFD3E8BD}" type="slidenum">
               <a:rPr lang="es-ES" smtClean="0"/>
               <a:pPr/>
-              <a:t>10</a:t>
+              <a:t>11</a:t>
             </a:fld>
             <a:endParaRPr lang="es-ES" smtClean="0"/>
           </a:p>
@@ -12487,175 +13028,6 @@
             <a:r>
               <a:rPr lang="es-AR" b="0" baseline="0" dirty="0" smtClean="0"/>
               <a:t>Ahora pasamos a la demo del sistema</a:t>
-            </a:r>
-          </a:p>
-        </p:txBody>
-      </p:sp>
-    </p:spTree>
-  </p:cSld>
-  <p:clrMapOvr>
-    <a:masterClrMapping/>
-  </p:clrMapOvr>
-</p:notes>
-</file>
-
-<file path=ppt/notesSlides/notesSlide11.xml><?xml version="1.0" encoding="utf-8"?>
-<p:notes xmlns:a="http://schemas.openxmlformats.org/drawingml/2006/main" xmlns:r="http://schemas.openxmlformats.org/officeDocument/2006/relationships" xmlns:p="http://schemas.openxmlformats.org/presentationml/2006/main">
-  <p:cSld>
-    <p:spTree>
-      <p:nvGrpSpPr>
-        <p:cNvPr id="1" name=""/>
-        <p:cNvGrpSpPr/>
-        <p:nvPr/>
-      </p:nvGrpSpPr>
-      <p:grpSpPr>
-        <a:xfrm>
-          <a:off x="0" y="0"/>
-          <a:ext cx="0" cy="0"/>
-          <a:chOff x="0" y="0"/>
-          <a:chExt cx="0" cy="0"/>
-        </a:xfrm>
-      </p:grpSpPr>
-      <p:sp>
-        <p:nvSpPr>
-          <p:cNvPr id="44034" name="Rectangle 7"/>
-          <p:cNvSpPr>
-            <a:spLocks noGrp="1" noChangeArrowheads="1"/>
-          </p:cNvSpPr>
-          <p:nvPr>
-            <p:ph type="sldNum" sz="quarter" idx="5"/>
-          </p:nvPr>
-        </p:nvSpPr>
-        <p:spPr>
-          <a:noFill/>
-        </p:spPr>
-        <p:txBody>
-          <a:bodyPr/>
-          <a:lstStyle/>
-          <a:p>
-            <a:fld id="{D9234D06-4B3E-4649-8770-4AC86EB469B1}" type="slidenum">
-              <a:rPr lang="es-ES" smtClean="0"/>
-              <a:pPr/>
-              <a:t>11</a:t>
-            </a:fld>
-            <a:endParaRPr lang="es-ES" smtClean="0"/>
-          </a:p>
-        </p:txBody>
-      </p:sp>
-      <p:sp>
-        <p:nvSpPr>
-          <p:cNvPr id="44035" name="Rectangle 2"/>
-          <p:cNvSpPr>
-            <a:spLocks noGrp="1" noRot="1" noChangeAspect="1" noChangeArrowheads="1" noTextEdit="1"/>
-          </p:cNvSpPr>
-          <p:nvPr>
-            <p:ph type="sldImg"/>
-          </p:nvPr>
-        </p:nvSpPr>
-        <p:spPr>
-          <a:ln cap="flat"/>
-        </p:spPr>
-      </p:sp>
-      <p:sp>
-        <p:nvSpPr>
-          <p:cNvPr id="44036" name="Rectangle 3"/>
-          <p:cNvSpPr>
-            <a:spLocks noGrp="1" noChangeArrowheads="1"/>
-          </p:cNvSpPr>
-          <p:nvPr>
-            <p:ph type="body" idx="1"/>
-          </p:nvPr>
-        </p:nvSpPr>
-        <p:spPr>
-          <a:noFill/>
-          <a:ln/>
-        </p:spPr>
-        <p:txBody>
-          <a:bodyPr/>
-          <a:lstStyle/>
-          <a:p>
-            <a:pPr eaLnBrk="1" hangingPunct="1"/>
-            <a:r>
-              <a:rPr lang="es-AR" b="1" dirty="0" smtClean="0"/>
-              <a:t>Speaker:</a:t>
-            </a:r>
-          </a:p>
-          <a:p>
-            <a:pPr eaLnBrk="1" hangingPunct="1"/>
-            <a:endParaRPr lang="es-AR" b="1" baseline="0" dirty="0" smtClean="0"/>
-          </a:p>
-          <a:p>
-            <a:pPr eaLnBrk="1" hangingPunct="1"/>
-            <a:r>
-              <a:rPr lang="es-AR" dirty="0" smtClean="0"/>
-              <a:t>Utilizamos</a:t>
-            </a:r>
-            <a:r>
-              <a:rPr lang="es-AR" baseline="0" dirty="0" smtClean="0"/>
-              <a:t> etiquetas y links a archivos en los </a:t>
-            </a:r>
-            <a:r>
-              <a:rPr lang="es-AR" baseline="0" dirty="0" err="1" smtClean="0"/>
-              <a:t>Stories</a:t>
-            </a:r>
-            <a:r>
-              <a:rPr lang="es-AR" baseline="0" dirty="0" smtClean="0"/>
-              <a:t> para realizar la trazabilidad. Las </a:t>
-            </a:r>
-            <a:r>
-              <a:rPr lang="es-AR" dirty="0" err="1" smtClean="0"/>
-              <a:t>UATs</a:t>
-            </a:r>
-            <a:r>
-              <a:rPr lang="es-AR" dirty="0" smtClean="0"/>
-              <a:t> se encuentran relacionadas</a:t>
-            </a:r>
-            <a:r>
-              <a:rPr lang="es-AR" baseline="0" dirty="0" smtClean="0"/>
-              <a:t> con su </a:t>
-            </a:r>
-            <a:r>
-              <a:rPr lang="es-AR" baseline="0" dirty="0" err="1" smtClean="0"/>
-              <a:t>story</a:t>
-            </a:r>
-            <a:r>
-              <a:rPr lang="es-AR" baseline="0" dirty="0" smtClean="0"/>
-              <a:t> correspondiente. En cada </a:t>
-            </a:r>
-            <a:r>
-              <a:rPr lang="es-AR" baseline="0" dirty="0" err="1" smtClean="0"/>
-              <a:t>commit</a:t>
-            </a:r>
-            <a:r>
-              <a:rPr lang="es-AR" baseline="0" dirty="0" smtClean="0"/>
-              <a:t> se mencionaba la </a:t>
-            </a:r>
-            <a:r>
-              <a:rPr lang="es-AR" baseline="0" dirty="0" err="1" smtClean="0"/>
-              <a:t>story</a:t>
-            </a:r>
-            <a:r>
-              <a:rPr lang="es-AR" baseline="0" dirty="0" smtClean="0"/>
-              <a:t> involucrada.</a:t>
-            </a:r>
-          </a:p>
-          <a:p>
-            <a:pPr eaLnBrk="1" hangingPunct="1"/>
-            <a:endParaRPr lang="es-AR" baseline="0" dirty="0" smtClean="0"/>
-          </a:p>
-          <a:p>
-            <a:pPr eaLnBrk="1" hangingPunct="1"/>
-            <a:r>
-              <a:rPr lang="es-AR" b="1" baseline="0" dirty="0" smtClean="0"/>
-              <a:t>(Demo con </a:t>
-            </a:r>
-            <a:r>
-              <a:rPr lang="es-AR" b="1" baseline="0" dirty="0" err="1" smtClean="0"/>
-              <a:t>Wolof</a:t>
-            </a:r>
-            <a:r>
-              <a:rPr lang="es-AR" b="1" baseline="0" dirty="0" smtClean="0"/>
-              <a:t> mostrando trazabilidad para el alta de campañas)</a:t>
             </a:r>
           </a:p>
         </p:txBody>
@@ -12875,11 +13247,7 @@
             <a:pPr eaLnBrk="1" hangingPunct="1"/>
             <a:r>
               <a:rPr lang="es-AR" b="1" dirty="0" smtClean="0"/>
-              <a:t>Speaker</a:t>
-            </a:r>
-            <a:r>
-              <a:rPr lang="es-AR" b="1" dirty="0" smtClean="0"/>
-              <a:t>:</a:t>
+              <a:t>Speaker:</a:t>
             </a:r>
           </a:p>
           <a:p>
@@ -21362,124 +21730,6 @@
           <a:chExt cx="0" cy="0"/>
         </a:xfrm>
       </p:grpSpPr>
-      <p:pic>
-        <p:nvPicPr>
-          <p:cNvPr id="2050" name="Picture 2"/>
-          <p:cNvPicPr>
-            <a:picLocks noChangeAspect="1" noChangeArrowheads="1"/>
-          </p:cNvPicPr>
-          <p:nvPr/>
-        </p:nvPicPr>
-        <p:blipFill>
-          <a:blip r:embed="rId3" cstate="print"/>
-          <a:srcRect/>
-          <a:stretch>
-            <a:fillRect/>
-          </a:stretch>
-        </p:blipFill>
-        <p:spPr bwMode="auto">
-          <a:xfrm>
-            <a:off x="1706195" y="1873852"/>
-            <a:ext cx="6276522" cy="4428000"/>
-          </a:xfrm>
-          <a:prstGeom prst="rect">
-            <a:avLst/>
-          </a:prstGeom>
-          <a:ln>
-            <a:noFill/>
-          </a:ln>
-          <a:effectLst>
-            <a:outerShdw blurRad="190500" algn="tl" rotWithShape="0">
-              <a:srgbClr val="000000">
-                <a:alpha val="70000"/>
-              </a:srgbClr>
-            </a:outerShdw>
-          </a:effectLst>
-        </p:spPr>
-      </p:pic>
-      <p:sp>
-        <p:nvSpPr>
-          <p:cNvPr id="4099" name="Rectangle 2"/>
-          <p:cNvSpPr>
-            <a:spLocks noGrp="1" noChangeArrowheads="1"/>
-          </p:cNvSpPr>
-          <p:nvPr>
-            <p:ph type="title"/>
-          </p:nvPr>
-        </p:nvSpPr>
-        <p:spPr/>
-        <p:txBody>
-          <a:bodyPr/>
-          <a:lstStyle/>
-          <a:p>
-            <a:pPr eaLnBrk="1" hangingPunct="1"/>
-            <a:r>
-              <a:rPr lang="es-AR" dirty="0" smtClean="0">
-                <a:latin typeface="Copperplate Gothic Bold" pitchFamily="34" charset="0"/>
-              </a:rPr>
-              <a:t>DEMO</a:t>
-            </a:r>
-          </a:p>
-        </p:txBody>
-      </p:sp>
-      <p:pic>
-        <p:nvPicPr>
-          <p:cNvPr id="4" name="Picture 3" descr="C:\Users\sixdemons\AppData\Local\Microsoft\Windows\Temporary Internet Files\Content.IE5\07ASDV69\MCj02157920000[1].wmf"/>
-          <p:cNvPicPr>
-            <a:picLocks noChangeAspect="1" noChangeArrowheads="1"/>
-          </p:cNvPicPr>
-          <p:nvPr/>
-        </p:nvPicPr>
-        <p:blipFill>
-          <a:blip r:embed="rId4" cstate="print"/>
-          <a:srcRect/>
-          <a:stretch>
-            <a:fillRect/>
-          </a:stretch>
-        </p:blipFill>
-        <p:spPr bwMode="auto">
-          <a:xfrm>
-            <a:off x="6876256" y="4293096"/>
-            <a:ext cx="1584000" cy="2241926"/>
-          </a:xfrm>
-          <a:prstGeom prst="rect">
-            <a:avLst/>
-          </a:prstGeom>
-          <a:noFill/>
-        </p:spPr>
-      </p:pic>
-    </p:spTree>
-  </p:cSld>
-  <p:clrMapOvr>
-    <a:masterClrMapping/>
-  </p:clrMapOvr>
-  <p:timing>
-    <p:tnLst>
-      <p:par>
-        <p:cTn id="1" dur="indefinite" restart="never" nodeType="tmRoot"/>
-      </p:par>
-    </p:tnLst>
-  </p:timing>
-</p:sld>
-</file>
-
-<file path=ppt/slides/slide11.xml><?xml version="1.0" encoding="utf-8"?>
-<p:sld xmlns:a="http://schemas.openxmlformats.org/drawingml/2006/main" xmlns:r="http://schemas.openxmlformats.org/officeDocument/2006/relationships" xmlns:p="http://schemas.openxmlformats.org/presentationml/2006/main">
-  <p:cSld>
-    <p:spTree>
-      <p:nvGrpSpPr>
-        <p:cNvPr id="1" name=""/>
-        <p:cNvGrpSpPr/>
-        <p:nvPr/>
-      </p:nvGrpSpPr>
-      <p:grpSpPr>
-        <a:xfrm>
-          <a:off x="0" y="0"/>
-          <a:ext cx="0" cy="0"/>
-          <a:chOff x="0" y="0"/>
-          <a:chExt cx="0" cy="0"/>
-        </a:xfrm>
-      </p:grpSpPr>
       <p:sp>
         <p:nvSpPr>
           <p:cNvPr id="21506" name="Rectangle 2"/>
@@ -21513,10 +21763,10 @@
         </p:nvGrpSpPr>
         <p:grpSpPr>
           <a:xfrm>
-            <a:off x="1259632" y="1714488"/>
-            <a:ext cx="7416824" cy="1962886"/>
-            <a:chOff x="1259632" y="1714488"/>
-            <a:chExt cx="7416824" cy="1962886"/>
+            <a:off x="1056308" y="1714488"/>
+            <a:ext cx="7908180" cy="2028753"/>
+            <a:chOff x="1018208" y="1714488"/>
+            <a:chExt cx="7908180" cy="2028753"/>
           </a:xfrm>
         </p:grpSpPr>
         <p:grpSp>
@@ -21527,10 +21777,10 @@
           </p:nvGrpSpPr>
           <p:grpSpPr>
             <a:xfrm>
-              <a:off x="1259632" y="1714488"/>
-              <a:ext cx="4795290" cy="1962886"/>
-              <a:chOff x="1576910" y="1673497"/>
-              <a:chExt cx="4795290" cy="1962886"/>
+              <a:off x="1018208" y="1714488"/>
+              <a:ext cx="5112914" cy="1962886"/>
+              <a:chOff x="1335486" y="1673497"/>
+              <a:chExt cx="5112914" cy="1962886"/>
             </a:xfrm>
           </p:grpSpPr>
           <p:pic>
@@ -21549,7 +21799,7 @@
             </p:blipFill>
             <p:spPr>
               <a:xfrm>
-                <a:off x="3645969" y="1673497"/>
+                <a:off x="3722169" y="1673497"/>
                 <a:ext cx="2726231" cy="1962886"/>
               </a:xfrm>
               <a:prstGeom prst="rect">
@@ -21577,8 +21827,8 @@
             </p:nvSpPr>
             <p:spPr bwMode="auto">
               <a:xfrm>
-                <a:off x="1576910" y="2034373"/>
-                <a:ext cx="1656184" cy="1569660"/>
+                <a:off x="1335486" y="1706425"/>
+                <a:ext cx="2376264" cy="830997"/>
               </a:xfrm>
               <a:prstGeom prst="rect">
                 <a:avLst/>
@@ -21687,8 +21937,8 @@
           </p:nvSpPr>
           <p:spPr bwMode="auto">
             <a:xfrm>
-              <a:off x="6251574" y="2428868"/>
-              <a:ext cx="2424882" cy="1200329"/>
+              <a:off x="6046068" y="2912244"/>
+              <a:ext cx="2880320" cy="830997"/>
             </a:xfrm>
             <a:prstGeom prst="rect">
               <a:avLst/>
@@ -21784,9 +22034,9 @@
         <p:grpSpPr>
           <a:xfrm>
             <a:off x="1036612" y="4214818"/>
-            <a:ext cx="8207488" cy="2411829"/>
+            <a:ext cx="8048502" cy="2411829"/>
             <a:chOff x="1036612" y="4214818"/>
-            <a:chExt cx="8207488" cy="2411829"/>
+            <a:chExt cx="8048502" cy="2411829"/>
           </a:xfrm>
         </p:grpSpPr>
         <p:grpSp>
@@ -21798,9 +22048,9 @@
           <p:grpSpPr>
             <a:xfrm>
               <a:off x="3851920" y="4286256"/>
-              <a:ext cx="5392180" cy="2340391"/>
+              <a:ext cx="5233194" cy="2340391"/>
               <a:chOff x="2013360" y="4221087"/>
-              <a:chExt cx="5392180" cy="2340391"/>
+              <a:chExt cx="5233194" cy="2340391"/>
             </a:xfrm>
           </p:grpSpPr>
           <p:pic>
@@ -21856,7 +22106,7 @@
             </p:nvSpPr>
             <p:spPr bwMode="auto">
               <a:xfrm>
-                <a:off x="4476602" y="5013176"/>
+                <a:off x="4317616" y="5422446"/>
                 <a:ext cx="2928938" cy="461665"/>
               </a:xfrm>
               <a:prstGeom prst="rect">
@@ -22223,6 +22473,127 @@
 </p:sld>
 </file>
 
+<file path=ppt/slides/slide11.xml><?xml version="1.0" encoding="utf-8"?>
+<p:sld xmlns:a="http://schemas.openxmlformats.org/drawingml/2006/main" xmlns:r="http://schemas.openxmlformats.org/officeDocument/2006/relationships" xmlns:p="http://schemas.openxmlformats.org/presentationml/2006/main">
+  <p:cSld>
+    <p:spTree>
+      <p:nvGrpSpPr>
+        <p:cNvPr id="1" name=""/>
+        <p:cNvGrpSpPr/>
+        <p:nvPr/>
+      </p:nvGrpSpPr>
+      <p:grpSpPr>
+        <a:xfrm>
+          <a:off x="0" y="0"/>
+          <a:ext cx="0" cy="0"/>
+          <a:chOff x="0" y="0"/>
+          <a:chExt cx="0" cy="0"/>
+        </a:xfrm>
+      </p:grpSpPr>
+      <p:pic>
+        <p:nvPicPr>
+          <p:cNvPr id="2050" name="Picture 2"/>
+          <p:cNvPicPr>
+            <a:picLocks noChangeAspect="1" noChangeArrowheads="1"/>
+          </p:cNvPicPr>
+          <p:nvPr/>
+        </p:nvPicPr>
+        <p:blipFill>
+          <a:blip r:embed="rId3" cstate="print"/>
+          <a:srcRect/>
+          <a:stretch>
+            <a:fillRect/>
+          </a:stretch>
+        </p:blipFill>
+        <p:spPr bwMode="auto">
+          <a:xfrm>
+            <a:off x="1706195" y="1873852"/>
+            <a:ext cx="6276522" cy="4428000"/>
+          </a:xfrm>
+          <a:prstGeom prst="rect">
+            <a:avLst/>
+          </a:prstGeom>
+          <a:ln>
+            <a:noFill/>
+          </a:ln>
+          <a:effectLst>
+            <a:outerShdw blurRad="190500" algn="tl" rotWithShape="0">
+              <a:srgbClr val="000000">
+                <a:alpha val="70000"/>
+              </a:srgbClr>
+            </a:outerShdw>
+          </a:effectLst>
+        </p:spPr>
+      </p:pic>
+      <p:sp>
+        <p:nvSpPr>
+          <p:cNvPr id="4099" name="Rectangle 2"/>
+          <p:cNvSpPr>
+            <a:spLocks noGrp="1" noChangeArrowheads="1"/>
+          </p:cNvSpPr>
+          <p:nvPr>
+            <p:ph type="title"/>
+          </p:nvPr>
+        </p:nvSpPr>
+        <p:spPr/>
+        <p:txBody>
+          <a:bodyPr/>
+          <a:lstStyle/>
+          <a:p>
+            <a:pPr eaLnBrk="1" hangingPunct="1"/>
+            <a:r>
+              <a:rPr lang="es-AR" dirty="0" smtClean="0">
+                <a:latin typeface="Copperplate Gothic Bold" pitchFamily="34" charset="0"/>
+              </a:rPr>
+              <a:t>Demo</a:t>
+            </a:r>
+            <a:endParaRPr lang="es-AR" dirty="0" smtClean="0">
+              <a:latin typeface="Copperplate Gothic Bold" pitchFamily="34" charset="0"/>
+            </a:endParaRPr>
+          </a:p>
+        </p:txBody>
+      </p:sp>
+      <p:pic>
+        <p:nvPicPr>
+          <p:cNvPr id="4" name="Picture 3" descr="C:\Users\sixdemons\AppData\Local\Microsoft\Windows\Temporary Internet Files\Content.IE5\07ASDV69\MCj02157920000[1].wmf"/>
+          <p:cNvPicPr>
+            <a:picLocks noChangeAspect="1" noChangeArrowheads="1"/>
+          </p:cNvPicPr>
+          <p:nvPr/>
+        </p:nvPicPr>
+        <p:blipFill>
+          <a:blip r:embed="rId4" cstate="print"/>
+          <a:srcRect/>
+          <a:stretch>
+            <a:fillRect/>
+          </a:stretch>
+        </p:blipFill>
+        <p:spPr bwMode="auto">
+          <a:xfrm>
+            <a:off x="6973840" y="4571450"/>
+            <a:ext cx="1584000" cy="2241926"/>
+          </a:xfrm>
+          <a:prstGeom prst="rect">
+            <a:avLst/>
+          </a:prstGeom>
+          <a:noFill/>
+        </p:spPr>
+      </p:pic>
+    </p:spTree>
+  </p:cSld>
+  <p:clrMapOvr>
+    <a:masterClrMapping/>
+  </p:clrMapOvr>
+  <p:timing>
+    <p:tnLst>
+      <p:par>
+        <p:cTn id="1" dur="indefinite" restart="never" nodeType="tmRoot"/>
+      </p:par>
+    </p:tnLst>
+  </p:timing>
+</p:sld>
+</file>
+
 <file path=ppt/slides/slide12.xml><?xml version="1.0" encoding="utf-8"?>
 <p:sld xmlns:a="http://schemas.openxmlformats.org/drawingml/2006/main" xmlns:r="http://schemas.openxmlformats.org/officeDocument/2006/relationships" xmlns:p="http://schemas.openxmlformats.org/presentationml/2006/main">
   <p:cSld>
@@ -22590,7 +22961,7 @@
           <p:nvPr/>
         </p:nvPicPr>
         <p:blipFill>
-          <a:blip r:embed="rId3"/>
+          <a:blip r:embed="rId3" cstate="print"/>
           <a:srcRect/>
           <a:stretch>
             <a:fillRect/>
@@ -22598,7 +22969,7 @@
         </p:blipFill>
         <p:spPr bwMode="auto">
           <a:xfrm>
-            <a:off x="7858148" y="5286388"/>
+            <a:off x="7740352" y="4869160"/>
             <a:ext cx="1159379" cy="1357322"/>
           </a:xfrm>
           <a:prstGeom prst="rect">
@@ -22650,7 +23021,7 @@
         <p:spPr bwMode="auto">
           <a:xfrm>
             <a:off x="928662" y="2205261"/>
-            <a:ext cx="7715304" cy="5081391"/>
+            <a:ext cx="7715304" cy="3746667"/>
           </a:xfrm>
           <a:prstGeom prst="rect">
             <a:avLst/>
@@ -22693,41 +23064,8 @@
                 <a:latin typeface="Cambria" pitchFamily="18" charset="0"/>
                 <a:cs typeface="Arial" charset="0"/>
               </a:rPr>
-              <a:t>Comunicación </a:t>
-            </a:r>
-            <a:r>
-              <a:rPr lang="es-AR" sz="3200" dirty="0" smtClean="0">
-                <a:solidFill>
-                  <a:schemeClr val="tx2">
-                    <a:lumMod val="50000"/>
-                  </a:schemeClr>
-                </a:solidFill>
-                <a:latin typeface="Cambria" pitchFamily="18" charset="0"/>
-                <a:cs typeface="Arial" charset="0"/>
-              </a:rPr>
-              <a:t>fluida con </a:t>
-            </a:r>
-            <a:r>
-              <a:rPr lang="es-AR" sz="3200" dirty="0" smtClean="0">
-                <a:solidFill>
-                  <a:schemeClr val="tx2">
-                    <a:lumMod val="50000"/>
-                  </a:schemeClr>
-                </a:solidFill>
-                <a:latin typeface="Cambria" pitchFamily="18" charset="0"/>
-                <a:cs typeface="Arial" charset="0"/>
-              </a:rPr>
-              <a:t>el cliente</a:t>
-            </a:r>
-            <a:endParaRPr lang="es-AR" sz="3200" dirty="0" smtClean="0">
-              <a:solidFill>
-                <a:schemeClr val="tx2">
-                  <a:lumMod val="50000"/>
-                </a:schemeClr>
-              </a:solidFill>
-              <a:latin typeface="Cambria" pitchFamily="18" charset="0"/>
-              <a:cs typeface="Arial" charset="0"/>
-            </a:endParaRPr>
+              <a:t>Comunicación fluida con el cliente</a:t>
+            </a:r>
           </a:p>
           <a:p>
             <a:pPr marL="261938" indent="-261938" eaLnBrk="0" hangingPunct="0">
@@ -22782,7 +23120,7 @@
                 <a:latin typeface="Cambria" pitchFamily="18" charset="0"/>
                 <a:cs typeface="Arial" charset="0"/>
               </a:rPr>
-              <a:t>Lo </a:t>
+              <a:t>Lo que no está escrito no se ha </a:t>
             </a:r>
             <a:r>
               <a:rPr lang="es-AR" sz="3200" dirty="0" smtClean="0">
@@ -22794,24 +23132,8 @@
                 <a:latin typeface="Cambria" pitchFamily="18" charset="0"/>
                 <a:cs typeface="Arial" charset="0"/>
               </a:rPr>
-              <a:t>que no está escrito no se ha dicho</a:t>
-            </a:r>
-          </a:p>
-          <a:p>
-            <a:pPr marL="261938" indent="-261938" eaLnBrk="0" hangingPunct="0">
-              <a:spcBef>
-                <a:spcPct val="20000"/>
-              </a:spcBef>
-              <a:spcAft>
-                <a:spcPts val="4800"/>
-              </a:spcAft>
-              <a:buClr>
-                <a:schemeClr val="tx2"/>
-              </a:buClr>
-              <a:buSzPct val="70000"/>
-              <a:buFont typeface="Arial" pitchFamily="34" charset="0"/>
-              <a:buChar char="•"/>
-            </a:pPr>
+              <a:t>dicho</a:t>
+            </a:r>
             <a:endParaRPr lang="es-AR" sz="3200" dirty="0" smtClean="0">
               <a:solidFill>
                 <a:schemeClr val="tx2">
@@ -22928,6 +23250,41 @@
                                   </p:childTnLst>
                                 </p:cTn>
                               </p:par>
+                              <p:par>
+                                <p:cTn id="8" presetID="10" presetClass="entr" presetSubtype="0" fill="hold" nodeType="withEffect">
+                                  <p:stCondLst>
+                                    <p:cond delay="0"/>
+                                  </p:stCondLst>
+                                  <p:childTnLst>
+                                    <p:set>
+                                      <p:cBhvr>
+                                        <p:cTn id="9" dur="1" fill="hold">
+                                          <p:stCondLst>
+                                            <p:cond delay="0"/>
+                                          </p:stCondLst>
+                                        </p:cTn>
+                                        <p:tgtEl>
+                                          <p:spTgt spid="1026"/>
+                                        </p:tgtEl>
+                                        <p:attrNameLst>
+                                          <p:attrName>style.visibility</p:attrName>
+                                        </p:attrNameLst>
+                                      </p:cBhvr>
+                                      <p:to>
+                                        <p:strVal val="visible"/>
+                                      </p:to>
+                                    </p:set>
+                                    <p:animEffect transition="in" filter="fade">
+                                      <p:cBhvr>
+                                        <p:cTn id="10" dur="2000"/>
+                                        <p:tgtEl>
+                                          <p:spTgt spid="1026"/>
+                                        </p:tgtEl>
+                                      </p:cBhvr>
+                                    </p:animEffect>
+                                  </p:childTnLst>
+                                </p:cTn>
+                              </p:par>
                             </p:childTnLst>
                           </p:cTn>
                         </p:par>
@@ -22935,26 +23292,26 @@
                     </p:cTn>
                   </p:par>
                   <p:par>
-                    <p:cTn id="8" fill="hold">
+                    <p:cTn id="11" fill="hold">
                       <p:stCondLst>
                         <p:cond delay="indefinite"/>
                       </p:stCondLst>
                       <p:childTnLst>
                         <p:par>
-                          <p:cTn id="9" fill="hold">
+                          <p:cTn id="12" fill="hold">
                             <p:stCondLst>
                               <p:cond delay="0"/>
                             </p:stCondLst>
                             <p:childTnLst>
                               <p:par>
-                                <p:cTn id="10" presetID="22" presetClass="entr" presetSubtype="4" fill="hold" grpId="0" nodeType="clickEffect">
+                                <p:cTn id="13" presetID="22" presetClass="entr" presetSubtype="4" fill="hold" grpId="0" nodeType="clickEffect">
                                   <p:stCondLst>
                                     <p:cond delay="0"/>
                                   </p:stCondLst>
                                   <p:childTnLst>
                                     <p:set>
                                       <p:cBhvr>
-                                        <p:cTn id="11" dur="1" fill="hold">
+                                        <p:cTn id="14" dur="1" fill="hold">
                                           <p:stCondLst>
                                             <p:cond delay="0"/>
                                           </p:stCondLst>
@@ -22976,7 +23333,7 @@
                                     </p:set>
                                     <p:animEffect transition="in" filter="wipe(down)">
                                       <p:cBhvr>
-                                        <p:cTn id="12" dur="500"/>
+                                        <p:cTn id="15" dur="500"/>
                                         <p:tgtEl>
                                           <p:spTgt spid="5">
                                             <p:txEl>
@@ -22996,26 +23353,26 @@
                     </p:cTn>
                   </p:par>
                   <p:par>
-                    <p:cTn id="13" fill="hold">
+                    <p:cTn id="16" fill="hold">
                       <p:stCondLst>
                         <p:cond delay="indefinite"/>
                       </p:stCondLst>
                       <p:childTnLst>
                         <p:par>
-                          <p:cTn id="14" fill="hold">
+                          <p:cTn id="17" fill="hold">
                             <p:stCondLst>
                               <p:cond delay="0"/>
                             </p:stCondLst>
                             <p:childTnLst>
                               <p:par>
-                                <p:cTn id="15" presetID="22" presetClass="entr" presetSubtype="4" fill="hold" grpId="0" nodeType="clickEffect">
+                                <p:cTn id="18" presetID="22" presetClass="entr" presetSubtype="4" fill="hold" grpId="0" nodeType="clickEffect">
                                   <p:stCondLst>
                                     <p:cond delay="0"/>
                                   </p:stCondLst>
                                   <p:childTnLst>
                                     <p:set>
                                       <p:cBhvr>
-                                        <p:cTn id="16" dur="1" fill="hold">
+                                        <p:cTn id="19" dur="1" fill="hold">
                                           <p:stCondLst>
                                             <p:cond delay="0"/>
                                           </p:stCondLst>
@@ -23037,13 +23394,48 @@
                                     </p:set>
                                     <p:animEffect transition="in" filter="wipe(down)">
                                       <p:cBhvr>
-                                        <p:cTn id="17" dur="500"/>
+                                        <p:cTn id="20" dur="500"/>
                                         <p:tgtEl>
                                           <p:spTgt spid="5">
                                             <p:txEl>
                                               <p:pRg st="2" end="2"/>
                                             </p:txEl>
                                           </p:spTgt>
+                                        </p:tgtEl>
+                                      </p:cBhvr>
+                                    </p:animEffect>
+                                  </p:childTnLst>
+                                </p:cTn>
+                              </p:par>
+                              <p:par>
+                                <p:cTn id="21" presetID="10" presetClass="entr" presetSubtype="0" fill="hold" nodeType="withEffect">
+                                  <p:stCondLst>
+                                    <p:cond delay="0"/>
+                                  </p:stCondLst>
+                                  <p:childTnLst>
+                                    <p:set>
+                                      <p:cBhvr>
+                                        <p:cTn id="22" dur="1" fill="hold">
+                                          <p:stCondLst>
+                                            <p:cond delay="0"/>
+                                          </p:stCondLst>
+                                        </p:cTn>
+                                        <p:tgtEl>
+                                          <p:spTgt spid="2050"/>
+                                        </p:tgtEl>
+                                        <p:attrNameLst>
+                                          <p:attrName>style.visibility</p:attrName>
+                                        </p:attrNameLst>
+                                      </p:cBhvr>
+                                      <p:to>
+                                        <p:strVal val="visible"/>
+                                      </p:to>
+                                    </p:set>
+                                    <p:animEffect transition="in" filter="fade">
+                                      <p:cBhvr>
+                                        <p:cTn id="23" dur="2000"/>
+                                        <p:tgtEl>
+                                          <p:spTgt spid="2050"/>
                                         </p:tgtEl>
                                       </p:cBhvr>
                                     </p:animEffect>
@@ -23120,13 +23512,7 @@
               <a:rPr lang="es-AR" dirty="0" smtClean="0">
                 <a:latin typeface="Copperplate Gothic Bold" pitchFamily="34" charset="0"/>
               </a:rPr>
-              <a:t>Lecciones Aprendidas </a:t>
-            </a:r>
-            <a:r>
-              <a:rPr lang="es-AR" dirty="0" smtClean="0">
-                <a:latin typeface="Copperplate Gothic Bold" pitchFamily="34" charset="0"/>
-              </a:rPr>
-              <a:t>(3)</a:t>
+              <a:t>Lecciones Aprendidas (3)</a:t>
             </a:r>
             <a:endParaRPr lang="es-AR" dirty="0"/>
           </a:p>
@@ -23228,7 +23614,7 @@
           <p:nvPr/>
         </p:nvPicPr>
         <p:blipFill>
-          <a:blip r:embed="rId3"/>
+          <a:blip r:embed="rId3" cstate="print"/>
           <a:srcRect/>
           <a:stretch>
             <a:fillRect/>
@@ -23236,7 +23622,7 @@
         </p:blipFill>
         <p:spPr bwMode="auto">
           <a:xfrm>
-            <a:off x="7786710" y="2214554"/>
+            <a:off x="7524328" y="2204864"/>
             <a:ext cx="1285884" cy="963172"/>
           </a:xfrm>
           <a:prstGeom prst="rect">
@@ -23261,7 +23647,7 @@
           <p:nvPr/>
         </p:nvPicPr>
         <p:blipFill>
-          <a:blip r:embed="rId4"/>
+          <a:blip r:embed="rId4" cstate="print"/>
           <a:srcRect/>
           <a:stretch>
             <a:fillRect/>
@@ -23269,7 +23655,7 @@
         </p:blipFill>
         <p:spPr bwMode="auto">
           <a:xfrm>
-            <a:off x="8001024" y="3857628"/>
+            <a:off x="7897068" y="3598416"/>
             <a:ext cx="1000132" cy="969426"/>
           </a:xfrm>
           <a:prstGeom prst="rect">
@@ -23294,7 +23680,7 @@
           <p:nvPr/>
         </p:nvPicPr>
         <p:blipFill>
-          <a:blip r:embed="rId5"/>
+          <a:blip r:embed="rId5" cstate="print"/>
           <a:srcRect/>
           <a:stretch>
             <a:fillRect/>
@@ -23302,7 +23688,7 @@
         </p:blipFill>
         <p:spPr bwMode="auto">
           <a:xfrm>
-            <a:off x="6929454" y="5500702"/>
+            <a:off x="7579486" y="5059784"/>
             <a:ext cx="1071570" cy="1016416"/>
           </a:xfrm>
           <a:prstGeom prst="rect">
@@ -23323,6 +23709,594 @@
   <p:clrMapOvr>
     <a:masterClrMapping/>
   </p:clrMapOvr>
+  <p:timing>
+    <p:tnLst>
+      <p:par>
+        <p:cTn id="1" dur="indefinite" restart="never" nodeType="tmRoot">
+          <p:childTnLst>
+            <p:seq concurrent="1" nextAc="seek">
+              <p:cTn id="2" dur="indefinite" nodeType="mainSeq">
+                <p:childTnLst>
+                  <p:par>
+                    <p:cTn id="3" fill="hold">
+                      <p:stCondLst>
+                        <p:cond delay="indefinite"/>
+                        <p:cond evt="onBegin" delay="0">
+                          <p:tn val="2"/>
+                        </p:cond>
+                      </p:stCondLst>
+                      <p:childTnLst>
+                        <p:par>
+                          <p:cTn id="4" fill="hold">
+                            <p:stCondLst>
+                              <p:cond delay="0"/>
+                            </p:stCondLst>
+                            <p:childTnLst>
+                              <p:par>
+                                <p:cTn id="5" presetID="2" presetClass="entr" presetSubtype="4" fill="hold" grpId="0" nodeType="withEffect">
+                                  <p:stCondLst>
+                                    <p:cond delay="0"/>
+                                  </p:stCondLst>
+                                  <p:childTnLst>
+                                    <p:set>
+                                      <p:cBhvr>
+                                        <p:cTn id="6" dur="1" fill="hold">
+                                          <p:stCondLst>
+                                            <p:cond delay="0"/>
+                                          </p:stCondLst>
+                                        </p:cTn>
+                                        <p:tgtEl>
+                                          <p:spTgt spid="3">
+                                            <p:txEl>
+                                              <p:pRg st="0" end="0"/>
+                                            </p:txEl>
+                                          </p:spTgt>
+                                        </p:tgtEl>
+                                        <p:attrNameLst>
+                                          <p:attrName>style.visibility</p:attrName>
+                                        </p:attrNameLst>
+                                      </p:cBhvr>
+                                      <p:to>
+                                        <p:strVal val="visible"/>
+                                      </p:to>
+                                    </p:set>
+                                    <p:anim calcmode="lin" valueType="num">
+                                      <p:cBhvr additive="base">
+                                        <p:cTn id="7" dur="500" fill="hold"/>
+                                        <p:tgtEl>
+                                          <p:spTgt spid="3">
+                                            <p:txEl>
+                                              <p:pRg st="0" end="0"/>
+                                            </p:txEl>
+                                          </p:spTgt>
+                                        </p:tgtEl>
+                                        <p:attrNameLst>
+                                          <p:attrName>ppt_x</p:attrName>
+                                        </p:attrNameLst>
+                                      </p:cBhvr>
+                                      <p:tavLst>
+                                        <p:tav tm="0">
+                                          <p:val>
+                                            <p:strVal val="#ppt_x"/>
+                                          </p:val>
+                                        </p:tav>
+                                        <p:tav tm="100000">
+                                          <p:val>
+                                            <p:strVal val="#ppt_x"/>
+                                          </p:val>
+                                        </p:tav>
+                                      </p:tavLst>
+                                    </p:anim>
+                                    <p:anim calcmode="lin" valueType="num">
+                                      <p:cBhvr additive="base">
+                                        <p:cTn id="8" dur="500" fill="hold"/>
+                                        <p:tgtEl>
+                                          <p:spTgt spid="3">
+                                            <p:txEl>
+                                              <p:pRg st="0" end="0"/>
+                                            </p:txEl>
+                                          </p:spTgt>
+                                        </p:tgtEl>
+                                        <p:attrNameLst>
+                                          <p:attrName>ppt_y</p:attrName>
+                                        </p:attrNameLst>
+                                      </p:cBhvr>
+                                      <p:tavLst>
+                                        <p:tav tm="0">
+                                          <p:val>
+                                            <p:strVal val="1+#ppt_h/2"/>
+                                          </p:val>
+                                        </p:tav>
+                                        <p:tav tm="100000">
+                                          <p:val>
+                                            <p:strVal val="#ppt_y"/>
+                                          </p:val>
+                                        </p:tav>
+                                      </p:tavLst>
+                                    </p:anim>
+                                  </p:childTnLst>
+                                </p:cTn>
+                              </p:par>
+                              <p:par>
+                                <p:cTn id="9" presetID="55" presetClass="entr" presetSubtype="0" fill="hold" nodeType="withEffect">
+                                  <p:stCondLst>
+                                    <p:cond delay="0"/>
+                                  </p:stCondLst>
+                                  <p:childTnLst>
+                                    <p:set>
+                                      <p:cBhvr>
+                                        <p:cTn id="10" dur="1" fill="hold">
+                                          <p:stCondLst>
+                                            <p:cond delay="0"/>
+                                          </p:stCondLst>
+                                        </p:cTn>
+                                        <p:tgtEl>
+                                          <p:spTgt spid="1031"/>
+                                        </p:tgtEl>
+                                        <p:attrNameLst>
+                                          <p:attrName>style.visibility</p:attrName>
+                                        </p:attrNameLst>
+                                      </p:cBhvr>
+                                      <p:to>
+                                        <p:strVal val="visible"/>
+                                      </p:to>
+                                    </p:set>
+                                    <p:anim calcmode="lin" valueType="num">
+                                      <p:cBhvr>
+                                        <p:cTn id="11" dur="1000" fill="hold"/>
+                                        <p:tgtEl>
+                                          <p:spTgt spid="1031"/>
+                                        </p:tgtEl>
+                                        <p:attrNameLst>
+                                          <p:attrName>ppt_w</p:attrName>
+                                        </p:attrNameLst>
+                                      </p:cBhvr>
+                                      <p:tavLst>
+                                        <p:tav tm="0">
+                                          <p:val>
+                                            <p:strVal val="#ppt_w*0.70"/>
+                                          </p:val>
+                                        </p:tav>
+                                        <p:tav tm="100000">
+                                          <p:val>
+                                            <p:strVal val="#ppt_w"/>
+                                          </p:val>
+                                        </p:tav>
+                                      </p:tavLst>
+                                    </p:anim>
+                                    <p:anim calcmode="lin" valueType="num">
+                                      <p:cBhvr>
+                                        <p:cTn id="12" dur="1000" fill="hold"/>
+                                        <p:tgtEl>
+                                          <p:spTgt spid="1031"/>
+                                        </p:tgtEl>
+                                        <p:attrNameLst>
+                                          <p:attrName>ppt_h</p:attrName>
+                                        </p:attrNameLst>
+                                      </p:cBhvr>
+                                      <p:tavLst>
+                                        <p:tav tm="0">
+                                          <p:val>
+                                            <p:strVal val="#ppt_h"/>
+                                          </p:val>
+                                        </p:tav>
+                                        <p:tav tm="100000">
+                                          <p:val>
+                                            <p:strVal val="#ppt_h"/>
+                                          </p:val>
+                                        </p:tav>
+                                      </p:tavLst>
+                                    </p:anim>
+                                    <p:animEffect transition="in" filter="fade">
+                                      <p:cBhvr>
+                                        <p:cTn id="13" dur="1000"/>
+                                        <p:tgtEl>
+                                          <p:spTgt spid="1031"/>
+                                        </p:tgtEl>
+                                      </p:cBhvr>
+                                    </p:animEffect>
+                                  </p:childTnLst>
+                                </p:cTn>
+                              </p:par>
+                            </p:childTnLst>
+                          </p:cTn>
+                        </p:par>
+                      </p:childTnLst>
+                    </p:cTn>
+                  </p:par>
+                  <p:par>
+                    <p:cTn id="14" fill="hold">
+                      <p:stCondLst>
+                        <p:cond delay="indefinite"/>
+                      </p:stCondLst>
+                      <p:childTnLst>
+                        <p:par>
+                          <p:cTn id="15" fill="hold">
+                            <p:stCondLst>
+                              <p:cond delay="0"/>
+                            </p:stCondLst>
+                            <p:childTnLst>
+                              <p:par>
+                                <p:cTn id="16" presetID="2" presetClass="entr" presetSubtype="4" fill="hold" grpId="0" nodeType="clickEffect">
+                                  <p:stCondLst>
+                                    <p:cond delay="0"/>
+                                  </p:stCondLst>
+                                  <p:childTnLst>
+                                    <p:set>
+                                      <p:cBhvr>
+                                        <p:cTn id="17" dur="1" fill="hold">
+                                          <p:stCondLst>
+                                            <p:cond delay="0"/>
+                                          </p:stCondLst>
+                                        </p:cTn>
+                                        <p:tgtEl>
+                                          <p:spTgt spid="3">
+                                            <p:txEl>
+                                              <p:pRg st="1" end="1"/>
+                                            </p:txEl>
+                                          </p:spTgt>
+                                        </p:tgtEl>
+                                        <p:attrNameLst>
+                                          <p:attrName>style.visibility</p:attrName>
+                                        </p:attrNameLst>
+                                      </p:cBhvr>
+                                      <p:to>
+                                        <p:strVal val="visible"/>
+                                      </p:to>
+                                    </p:set>
+                                    <p:anim calcmode="lin" valueType="num">
+                                      <p:cBhvr additive="base">
+                                        <p:cTn id="18" dur="500" fill="hold"/>
+                                        <p:tgtEl>
+                                          <p:spTgt spid="3">
+                                            <p:txEl>
+                                              <p:pRg st="1" end="1"/>
+                                            </p:txEl>
+                                          </p:spTgt>
+                                        </p:tgtEl>
+                                        <p:attrNameLst>
+                                          <p:attrName>ppt_x</p:attrName>
+                                        </p:attrNameLst>
+                                      </p:cBhvr>
+                                      <p:tavLst>
+                                        <p:tav tm="0">
+                                          <p:val>
+                                            <p:strVal val="#ppt_x"/>
+                                          </p:val>
+                                        </p:tav>
+                                        <p:tav tm="100000">
+                                          <p:val>
+                                            <p:strVal val="#ppt_x"/>
+                                          </p:val>
+                                        </p:tav>
+                                      </p:tavLst>
+                                    </p:anim>
+                                    <p:anim calcmode="lin" valueType="num">
+                                      <p:cBhvr additive="base">
+                                        <p:cTn id="19" dur="500" fill="hold"/>
+                                        <p:tgtEl>
+                                          <p:spTgt spid="3">
+                                            <p:txEl>
+                                              <p:pRg st="1" end="1"/>
+                                            </p:txEl>
+                                          </p:spTgt>
+                                        </p:tgtEl>
+                                        <p:attrNameLst>
+                                          <p:attrName>ppt_y</p:attrName>
+                                        </p:attrNameLst>
+                                      </p:cBhvr>
+                                      <p:tavLst>
+                                        <p:tav tm="0">
+                                          <p:val>
+                                            <p:strVal val="1+#ppt_h/2"/>
+                                          </p:val>
+                                        </p:tav>
+                                        <p:tav tm="100000">
+                                          <p:val>
+                                            <p:strVal val="#ppt_y"/>
+                                          </p:val>
+                                        </p:tav>
+                                      </p:tavLst>
+                                    </p:anim>
+                                  </p:childTnLst>
+                                </p:cTn>
+                              </p:par>
+                              <p:par>
+                                <p:cTn id="20" presetID="55" presetClass="entr" presetSubtype="0" fill="hold" nodeType="withEffect">
+                                  <p:stCondLst>
+                                    <p:cond delay="0"/>
+                                  </p:stCondLst>
+                                  <p:childTnLst>
+                                    <p:set>
+                                      <p:cBhvr>
+                                        <p:cTn id="21" dur="1" fill="hold">
+                                          <p:stCondLst>
+                                            <p:cond delay="0"/>
+                                          </p:stCondLst>
+                                        </p:cTn>
+                                        <p:tgtEl>
+                                          <p:spTgt spid="1032"/>
+                                        </p:tgtEl>
+                                        <p:attrNameLst>
+                                          <p:attrName>style.visibility</p:attrName>
+                                        </p:attrNameLst>
+                                      </p:cBhvr>
+                                      <p:to>
+                                        <p:strVal val="visible"/>
+                                      </p:to>
+                                    </p:set>
+                                    <p:anim calcmode="lin" valueType="num">
+                                      <p:cBhvr>
+                                        <p:cTn id="22" dur="1000" fill="hold"/>
+                                        <p:tgtEl>
+                                          <p:spTgt spid="1032"/>
+                                        </p:tgtEl>
+                                        <p:attrNameLst>
+                                          <p:attrName>ppt_w</p:attrName>
+                                        </p:attrNameLst>
+                                      </p:cBhvr>
+                                      <p:tavLst>
+                                        <p:tav tm="0">
+                                          <p:val>
+                                            <p:strVal val="#ppt_w*0.70"/>
+                                          </p:val>
+                                        </p:tav>
+                                        <p:tav tm="100000">
+                                          <p:val>
+                                            <p:strVal val="#ppt_w"/>
+                                          </p:val>
+                                        </p:tav>
+                                      </p:tavLst>
+                                    </p:anim>
+                                    <p:anim calcmode="lin" valueType="num">
+                                      <p:cBhvr>
+                                        <p:cTn id="23" dur="1000" fill="hold"/>
+                                        <p:tgtEl>
+                                          <p:spTgt spid="1032"/>
+                                        </p:tgtEl>
+                                        <p:attrNameLst>
+                                          <p:attrName>ppt_h</p:attrName>
+                                        </p:attrNameLst>
+                                      </p:cBhvr>
+                                      <p:tavLst>
+                                        <p:tav tm="0">
+                                          <p:val>
+                                            <p:strVal val="#ppt_h"/>
+                                          </p:val>
+                                        </p:tav>
+                                        <p:tav tm="100000">
+                                          <p:val>
+                                            <p:strVal val="#ppt_h"/>
+                                          </p:val>
+                                        </p:tav>
+                                      </p:tavLst>
+                                    </p:anim>
+                                    <p:animEffect transition="in" filter="fade">
+                                      <p:cBhvr>
+                                        <p:cTn id="24" dur="1000"/>
+                                        <p:tgtEl>
+                                          <p:spTgt spid="1032"/>
+                                        </p:tgtEl>
+                                      </p:cBhvr>
+                                    </p:animEffect>
+                                  </p:childTnLst>
+                                </p:cTn>
+                              </p:par>
+                            </p:childTnLst>
+                          </p:cTn>
+                        </p:par>
+                      </p:childTnLst>
+                    </p:cTn>
+                  </p:par>
+                  <p:par>
+                    <p:cTn id="25" fill="hold">
+                      <p:stCondLst>
+                        <p:cond delay="indefinite"/>
+                      </p:stCondLst>
+                      <p:childTnLst>
+                        <p:par>
+                          <p:cTn id="26" fill="hold">
+                            <p:stCondLst>
+                              <p:cond delay="0"/>
+                            </p:stCondLst>
+                            <p:childTnLst>
+                              <p:par>
+                                <p:cTn id="27" presetID="2" presetClass="entr" presetSubtype="4" fill="hold" grpId="0" nodeType="clickEffect">
+                                  <p:stCondLst>
+                                    <p:cond delay="0"/>
+                                  </p:stCondLst>
+                                  <p:childTnLst>
+                                    <p:set>
+                                      <p:cBhvr>
+                                        <p:cTn id="28" dur="1" fill="hold">
+                                          <p:stCondLst>
+                                            <p:cond delay="0"/>
+                                          </p:stCondLst>
+                                        </p:cTn>
+                                        <p:tgtEl>
+                                          <p:spTgt spid="3">
+                                            <p:txEl>
+                                              <p:pRg st="2" end="2"/>
+                                            </p:txEl>
+                                          </p:spTgt>
+                                        </p:tgtEl>
+                                        <p:attrNameLst>
+                                          <p:attrName>style.visibility</p:attrName>
+                                        </p:attrNameLst>
+                                      </p:cBhvr>
+                                      <p:to>
+                                        <p:strVal val="visible"/>
+                                      </p:to>
+                                    </p:set>
+                                    <p:anim calcmode="lin" valueType="num">
+                                      <p:cBhvr additive="base">
+                                        <p:cTn id="29" dur="500" fill="hold"/>
+                                        <p:tgtEl>
+                                          <p:spTgt spid="3">
+                                            <p:txEl>
+                                              <p:pRg st="2" end="2"/>
+                                            </p:txEl>
+                                          </p:spTgt>
+                                        </p:tgtEl>
+                                        <p:attrNameLst>
+                                          <p:attrName>ppt_x</p:attrName>
+                                        </p:attrNameLst>
+                                      </p:cBhvr>
+                                      <p:tavLst>
+                                        <p:tav tm="0">
+                                          <p:val>
+                                            <p:strVal val="#ppt_x"/>
+                                          </p:val>
+                                        </p:tav>
+                                        <p:tav tm="100000">
+                                          <p:val>
+                                            <p:strVal val="#ppt_x"/>
+                                          </p:val>
+                                        </p:tav>
+                                      </p:tavLst>
+                                    </p:anim>
+                                    <p:anim calcmode="lin" valueType="num">
+                                      <p:cBhvr additive="base">
+                                        <p:cTn id="30" dur="500" fill="hold"/>
+                                        <p:tgtEl>
+                                          <p:spTgt spid="3">
+                                            <p:txEl>
+                                              <p:pRg st="2" end="2"/>
+                                            </p:txEl>
+                                          </p:spTgt>
+                                        </p:tgtEl>
+                                        <p:attrNameLst>
+                                          <p:attrName>ppt_y</p:attrName>
+                                        </p:attrNameLst>
+                                      </p:cBhvr>
+                                      <p:tavLst>
+                                        <p:tav tm="0">
+                                          <p:val>
+                                            <p:strVal val="1+#ppt_h/2"/>
+                                          </p:val>
+                                        </p:tav>
+                                        <p:tav tm="100000">
+                                          <p:val>
+                                            <p:strVal val="#ppt_y"/>
+                                          </p:val>
+                                        </p:tav>
+                                      </p:tavLst>
+                                    </p:anim>
+                                  </p:childTnLst>
+                                </p:cTn>
+                              </p:par>
+                              <p:par>
+                                <p:cTn id="31" presetID="55" presetClass="entr" presetSubtype="0" fill="hold" nodeType="withEffect">
+                                  <p:stCondLst>
+                                    <p:cond delay="0"/>
+                                  </p:stCondLst>
+                                  <p:childTnLst>
+                                    <p:set>
+                                      <p:cBhvr>
+                                        <p:cTn id="32" dur="1" fill="hold">
+                                          <p:stCondLst>
+                                            <p:cond delay="0"/>
+                                          </p:stCondLst>
+                                        </p:cTn>
+                                        <p:tgtEl>
+                                          <p:spTgt spid="1033"/>
+                                        </p:tgtEl>
+                                        <p:attrNameLst>
+                                          <p:attrName>style.visibility</p:attrName>
+                                        </p:attrNameLst>
+                                      </p:cBhvr>
+                                      <p:to>
+                                        <p:strVal val="visible"/>
+                                      </p:to>
+                                    </p:set>
+                                    <p:anim calcmode="lin" valueType="num">
+                                      <p:cBhvr>
+                                        <p:cTn id="33" dur="1000" fill="hold"/>
+                                        <p:tgtEl>
+                                          <p:spTgt spid="1033"/>
+                                        </p:tgtEl>
+                                        <p:attrNameLst>
+                                          <p:attrName>ppt_w</p:attrName>
+                                        </p:attrNameLst>
+                                      </p:cBhvr>
+                                      <p:tavLst>
+                                        <p:tav tm="0">
+                                          <p:val>
+                                            <p:strVal val="#ppt_w*0.70"/>
+                                          </p:val>
+                                        </p:tav>
+                                        <p:tav tm="100000">
+                                          <p:val>
+                                            <p:strVal val="#ppt_w"/>
+                                          </p:val>
+                                        </p:tav>
+                                      </p:tavLst>
+                                    </p:anim>
+                                    <p:anim calcmode="lin" valueType="num">
+                                      <p:cBhvr>
+                                        <p:cTn id="34" dur="1000" fill="hold"/>
+                                        <p:tgtEl>
+                                          <p:spTgt spid="1033"/>
+                                        </p:tgtEl>
+                                        <p:attrNameLst>
+                                          <p:attrName>ppt_h</p:attrName>
+                                        </p:attrNameLst>
+                                      </p:cBhvr>
+                                      <p:tavLst>
+                                        <p:tav tm="0">
+                                          <p:val>
+                                            <p:strVal val="#ppt_h"/>
+                                          </p:val>
+                                        </p:tav>
+                                        <p:tav tm="100000">
+                                          <p:val>
+                                            <p:strVal val="#ppt_h"/>
+                                          </p:val>
+                                        </p:tav>
+                                      </p:tavLst>
+                                    </p:anim>
+                                    <p:animEffect transition="in" filter="fade">
+                                      <p:cBhvr>
+                                        <p:cTn id="35" dur="1000"/>
+                                        <p:tgtEl>
+                                          <p:spTgt spid="1033"/>
+                                        </p:tgtEl>
+                                      </p:cBhvr>
+                                    </p:animEffect>
+                                  </p:childTnLst>
+                                </p:cTn>
+                              </p:par>
+                            </p:childTnLst>
+                          </p:cTn>
+                        </p:par>
+                      </p:childTnLst>
+                    </p:cTn>
+                  </p:par>
+                </p:childTnLst>
+              </p:cTn>
+              <p:prevCondLst>
+                <p:cond evt="onPrev" delay="0">
+                  <p:tgtEl>
+                    <p:sldTgt/>
+                  </p:tgtEl>
+                </p:cond>
+              </p:prevCondLst>
+              <p:nextCondLst>
+                <p:cond evt="onNext" delay="0">
+                  <p:tgtEl>
+                    <p:sldTgt/>
+                  </p:tgtEl>
+                </p:cond>
+              </p:nextCondLst>
+            </p:seq>
+          </p:childTnLst>
+        </p:cTn>
+      </p:par>
+    </p:tnLst>
+    <p:bldLst>
+      <p:bldP spid="3" grpId="0" uiExpand="1" build="p"/>
+    </p:bldLst>
+  </p:timing>
 </p:sld>
 </file>
 
@@ -23362,13 +24336,7 @@
               <a:rPr lang="es-AR" dirty="0" smtClean="0">
                 <a:latin typeface="Copperplate Gothic Bold" pitchFamily="34" charset="0"/>
               </a:rPr>
-              <a:t>Lecciones Aprendidas </a:t>
-            </a:r>
-            <a:r>
-              <a:rPr lang="es-AR" dirty="0" smtClean="0">
-                <a:latin typeface="Copperplate Gothic Bold" pitchFamily="34" charset="0"/>
-              </a:rPr>
-              <a:t>(4)</a:t>
+              <a:t>Lecciones Aprendidas (4)</a:t>
             </a:r>
             <a:endParaRPr lang="es-AR" dirty="0"/>
           </a:p>
@@ -23385,7 +24353,7 @@
         <p:spPr bwMode="auto">
           <a:xfrm>
             <a:off x="1071538" y="1785926"/>
-            <a:ext cx="7313612" cy="4114800"/>
+            <a:ext cx="7313612" cy="778978"/>
           </a:xfrm>
           <a:prstGeom prst="rect">
             <a:avLst/>
@@ -23442,274 +24410,30 @@
                 <a:ea typeface="+mn-ea"/>
                 <a:cs typeface="Arial" charset="0"/>
               </a:rPr>
-              <a:t>Estética y usabilidad</a:t>
-            </a:r>
-            <a:endParaRPr kumimoji="0" lang="es-AR" sz="3200" b="0" i="0" u="none" strike="noStrike" kern="0" cap="none" spc="0" normalizeH="0" noProof="0" dirty="0" smtClean="0">
-              <a:ln>
-                <a:noFill/>
-              </a:ln>
-              <a:solidFill>
-                <a:schemeClr val="tx2">
-                  <a:lumMod val="50000"/>
-                </a:schemeClr>
-              </a:solidFill>
-              <a:effectLst/>
-              <a:uLnTx/>
-              <a:uFillTx/>
-              <a:latin typeface="Cambria" pitchFamily="18" charset="0"/>
-              <a:ea typeface="+mn-ea"/>
-              <a:cs typeface="Arial" charset="0"/>
-            </a:endParaRPr>
-          </a:p>
-          <a:p>
-            <a:pPr marL="261938" marR="0" lvl="0" indent="-261938" algn="l" defTabSz="914400" rtl="0" eaLnBrk="0" fontAlgn="base" latinLnBrk="0" hangingPunct="0">
-              <a:lnSpc>
-                <a:spcPct val="100000"/>
-              </a:lnSpc>
-              <a:spcBef>
-                <a:spcPct val="20000"/>
-              </a:spcBef>
-              <a:spcAft>
-                <a:spcPts val="3000"/>
-              </a:spcAft>
-              <a:buClr>
-                <a:schemeClr val="tx2"/>
-              </a:buClr>
-              <a:buSzPct val="70000"/>
-              <a:buFont typeface="Arial" pitchFamily="34" charset="0"/>
-              <a:buChar char="•"/>
-              <a:tabLst/>
-              <a:defRPr/>
-            </a:pPr>
-            <a:endParaRPr lang="es-AR" sz="3200" kern="0" baseline="0" dirty="0" smtClean="0">
-              <a:solidFill>
-                <a:schemeClr val="tx2">
-                  <a:lumMod val="50000"/>
-                </a:schemeClr>
-              </a:solidFill>
-              <a:latin typeface="Cambria" pitchFamily="18" charset="0"/>
-              <a:cs typeface="Arial" charset="0"/>
-            </a:endParaRPr>
-          </a:p>
-          <a:p>
-            <a:pPr marL="261938" marR="0" lvl="0" indent="-261938" algn="l" defTabSz="914400" rtl="0" eaLnBrk="0" fontAlgn="base" latinLnBrk="0" hangingPunct="0">
-              <a:lnSpc>
-                <a:spcPct val="100000"/>
-              </a:lnSpc>
-              <a:spcBef>
-                <a:spcPct val="20000"/>
-              </a:spcBef>
-              <a:spcAft>
-                <a:spcPts val="3000"/>
-              </a:spcAft>
-              <a:buClr>
-                <a:schemeClr val="tx2"/>
-              </a:buClr>
-              <a:buSzPct val="70000"/>
-              <a:buFont typeface="Arial" pitchFamily="34" charset="0"/>
-              <a:buChar char="•"/>
-              <a:tabLst/>
-              <a:defRPr/>
-            </a:pPr>
-            <a:endParaRPr lang="es-AR" sz="3200" kern="0" baseline="0" dirty="0" smtClean="0">
-              <a:solidFill>
-                <a:schemeClr val="tx2">
-                  <a:lumMod val="50000"/>
-                </a:schemeClr>
-              </a:solidFill>
-              <a:latin typeface="Cambria" pitchFamily="18" charset="0"/>
-              <a:cs typeface="Arial" charset="0"/>
-            </a:endParaRPr>
-          </a:p>
-          <a:p>
-            <a:pPr marL="261938" indent="-261938" eaLnBrk="0" hangingPunct="0">
-              <a:spcBef>
-                <a:spcPts val="2400"/>
-              </a:spcBef>
-              <a:spcAft>
-                <a:spcPts val="1200"/>
-              </a:spcAft>
-              <a:buClr>
-                <a:schemeClr val="tx2"/>
-              </a:buClr>
-              <a:buSzPct val="70000"/>
-              <a:buFont typeface="Arial" pitchFamily="34" charset="0"/>
-              <a:buChar char="•"/>
-            </a:pPr>
-            <a:r>
-              <a:rPr lang="es-AR" sz="3200" kern="0" baseline="0" dirty="0" smtClean="0">
+              <a:t>Estética y </a:t>
+            </a:r>
+            <a:r>
+              <a:rPr kumimoji="0" lang="es-AR" sz="3200" b="0" i="0" u="none" strike="noStrike" kern="0" cap="none" spc="0" normalizeH="0" baseline="0" noProof="0" dirty="0" smtClean="0">
+                <a:ln>
+                  <a:noFill/>
+                </a:ln>
                 <a:solidFill>
                   <a:schemeClr val="tx2">
                     <a:lumMod val="50000"/>
                   </a:schemeClr>
                 </a:solidFill>
+                <a:effectLst/>
+                <a:uLnTx/>
+                <a:uFillTx/>
                 <a:latin typeface="Cambria" pitchFamily="18" charset="0"/>
+                <a:ea typeface="+mn-ea"/>
                 <a:cs typeface="Arial" charset="0"/>
               </a:rPr>
-              <a:t>Evitar </a:t>
-            </a:r>
-            <a:r>
-              <a:rPr lang="es-AR" sz="3200" kern="0" dirty="0" smtClean="0">
-                <a:solidFill>
-                  <a:schemeClr val="tx2">
-                    <a:lumMod val="50000"/>
-                  </a:schemeClr>
-                </a:solidFill>
-                <a:latin typeface="Cambria" pitchFamily="18" charset="0"/>
-                <a:cs typeface="Arial" charset="0"/>
-              </a:rPr>
-              <a:t>Síndrome </a:t>
-            </a:r>
-            <a:r>
-              <a:rPr lang="es-AR" sz="3200" kern="0" dirty="0" smtClean="0">
-                <a:solidFill>
-                  <a:schemeClr val="tx2">
-                    <a:lumMod val="50000"/>
-                  </a:schemeClr>
-                </a:solidFill>
-                <a:latin typeface="Cambria" pitchFamily="18" charset="0"/>
-                <a:cs typeface="Arial" charset="0"/>
-              </a:rPr>
-              <a:t>del </a:t>
-            </a:r>
-            <a:r>
-              <a:rPr lang="es-AR" sz="3200" kern="0" dirty="0" smtClean="0">
-                <a:solidFill>
-                  <a:schemeClr val="tx2">
-                    <a:lumMod val="50000"/>
-                  </a:schemeClr>
-                </a:solidFill>
-                <a:latin typeface="Cambria" pitchFamily="18" charset="0"/>
-                <a:cs typeface="Arial" charset="0"/>
-              </a:rPr>
-              <a:t>Estudiante:  </a:t>
-            </a:r>
-          </a:p>
-          <a:p>
-            <a:pPr marL="261938" indent="-261938" eaLnBrk="0" hangingPunct="0">
-              <a:spcBef>
-                <a:spcPts val="0"/>
-              </a:spcBef>
-              <a:spcAft>
-                <a:spcPts val="3000"/>
-              </a:spcAft>
-              <a:buClr>
-                <a:schemeClr val="tx2"/>
-              </a:buClr>
-              <a:buSzPct val="70000"/>
-            </a:pPr>
-            <a:r>
-              <a:rPr lang="es-AR" sz="2400" kern="0" dirty="0" smtClean="0">
-                <a:solidFill>
-                  <a:schemeClr val="tx2">
-                    <a:lumMod val="50000"/>
-                  </a:schemeClr>
-                </a:solidFill>
-                <a:latin typeface="Cambria" pitchFamily="18" charset="0"/>
-                <a:cs typeface="Arial" charset="0"/>
-              </a:rPr>
-              <a:t>   M</a:t>
-            </a:r>
-            <a:r>
-              <a:rPr lang="es-AR" sz="2400" kern="0" baseline="0" dirty="0" smtClean="0">
-                <a:solidFill>
-                  <a:schemeClr val="tx2">
-                    <a:lumMod val="50000"/>
-                  </a:schemeClr>
-                </a:solidFill>
-                <a:latin typeface="Cambria" pitchFamily="18" charset="0"/>
-                <a:cs typeface="Arial" charset="0"/>
-              </a:rPr>
-              <a:t>antener</a:t>
-            </a:r>
-            <a:r>
-              <a:rPr lang="es-AR" sz="2400" kern="0" dirty="0" smtClean="0">
-                <a:solidFill>
-                  <a:schemeClr val="tx2">
-                    <a:lumMod val="50000"/>
-                  </a:schemeClr>
-                </a:solidFill>
-                <a:latin typeface="Cambria" pitchFamily="18" charset="0"/>
-                <a:cs typeface="Arial" charset="0"/>
-              </a:rPr>
-              <a:t> objetivos de corto plazo</a:t>
-            </a:r>
-            <a:endParaRPr kumimoji="0" lang="es-AR" sz="2400" b="0" i="0" u="none" strike="noStrike" kern="0" cap="none" spc="0" normalizeH="0" baseline="0" noProof="0" dirty="0" smtClean="0">
-              <a:ln>
-                <a:noFill/>
-              </a:ln>
-              <a:solidFill>
-                <a:schemeClr val="tx2">
-                  <a:lumMod val="50000"/>
-                </a:schemeClr>
-              </a:solidFill>
-              <a:effectLst/>
-              <a:uLnTx/>
-              <a:uFillTx/>
-              <a:latin typeface="Cambria" pitchFamily="18" charset="0"/>
-              <a:ea typeface="+mn-ea"/>
-              <a:cs typeface="Arial" charset="0"/>
-            </a:endParaRPr>
-          </a:p>
-          <a:p>
-            <a:pPr marL="342900" marR="0" lvl="0" indent="-342900" algn="l" defTabSz="914400" rtl="0" eaLnBrk="0" fontAlgn="base" latinLnBrk="0" hangingPunct="0">
-              <a:lnSpc>
-                <a:spcPct val="100000"/>
-              </a:lnSpc>
-              <a:spcBef>
-                <a:spcPct val="20000"/>
-              </a:spcBef>
-              <a:spcAft>
-                <a:spcPct val="0"/>
-              </a:spcAft>
-              <a:buClr>
-                <a:schemeClr val="tx2"/>
-              </a:buClr>
-              <a:buSzPct val="70000"/>
-              <a:tabLst/>
-              <a:defRPr/>
-            </a:pPr>
-            <a:endParaRPr kumimoji="0" lang="es-AR" sz="2900" b="0" i="0" u="none" strike="noStrike" kern="0" cap="none" spc="0" normalizeH="0" baseline="0" noProof="0" dirty="0">
-              <a:ln>
-                <a:noFill/>
-              </a:ln>
-              <a:solidFill>
-                <a:schemeClr val="tx1"/>
-              </a:solidFill>
-              <a:effectLst/>
-              <a:uLnTx/>
-              <a:uFillTx/>
-              <a:latin typeface="+mn-lt"/>
-              <a:ea typeface="+mn-ea"/>
-              <a:cs typeface="+mn-cs"/>
-            </a:endParaRPr>
+              <a:t>usabilidad</a:t>
+            </a:r>
           </a:p>
         </p:txBody>
       </p:sp>
-      <p:pic>
-        <p:nvPicPr>
-          <p:cNvPr id="9" name="8 Imagen" descr="Inicio.png"/>
-          <p:cNvPicPr>
-            <a:picLocks noChangeAspect="1"/>
-          </p:cNvPicPr>
-          <p:nvPr/>
-        </p:nvPicPr>
-        <p:blipFill>
-          <a:blip r:embed="rId3" cstate="print"/>
-          <a:stretch>
-            <a:fillRect/>
-          </a:stretch>
-        </p:blipFill>
-        <p:spPr>
-          <a:xfrm>
-            <a:off x="1428728" y="2571744"/>
-            <a:ext cx="3429025" cy="1993120"/>
-          </a:xfrm>
-          <a:prstGeom prst="rect">
-            <a:avLst/>
-          </a:prstGeom>
-        </p:spPr>
-      </p:pic>
       <p:pic>
         <p:nvPicPr>
           <p:cNvPr id="3077" name="Picture 5"/>
@@ -23719,7 +24443,7 @@
           <p:nvPr/>
         </p:nvPicPr>
         <p:blipFill>
-          <a:blip r:embed="rId4"/>
+          <a:blip r:embed="rId3" cstate="print"/>
           <a:srcRect/>
           <a:stretch>
             <a:fillRect/>
@@ -23727,7 +24451,7 @@
         </p:blipFill>
         <p:spPr bwMode="auto">
           <a:xfrm>
-            <a:off x="7215206" y="5000636"/>
+            <a:off x="7719757" y="5000636"/>
             <a:ext cx="1028707" cy="1714512"/>
           </a:xfrm>
           <a:prstGeom prst="rect">
@@ -23745,7 +24469,42 @@
       </p:pic>
       <p:pic>
         <p:nvPicPr>
-          <p:cNvPr id="11" name="10 Imagen" descr="visualizarEstadoAgente2.png"/>
+          <p:cNvPr id="7" name="6 Imagen"/>
+          <p:cNvPicPr>
+            <a:picLocks noChangeAspect="1"/>
+          </p:cNvPicPr>
+          <p:nvPr/>
+        </p:nvPicPr>
+        <p:blipFill>
+          <a:blip r:embed="rId4" cstate="print"/>
+          <a:srcRect/>
+          <a:stretch>
+            <a:fillRect/>
+          </a:stretch>
+        </p:blipFill>
+        <p:spPr bwMode="auto">
+          <a:xfrm>
+            <a:off x="1495032" y="2391435"/>
+            <a:ext cx="3456000" cy="2380916"/>
+          </a:xfrm>
+          <a:prstGeom prst="rect">
+            <a:avLst/>
+          </a:prstGeom>
+          <a:ln>
+            <a:noFill/>
+          </a:ln>
+          <a:effectLst>
+            <a:outerShdw blurRad="190500" algn="tl" rotWithShape="0">
+              <a:srgbClr val="000000">
+                <a:alpha val="70000"/>
+              </a:srgbClr>
+            </a:outerShdw>
+          </a:effectLst>
+        </p:spPr>
+      </p:pic>
+      <p:pic>
+        <p:nvPicPr>
+          <p:cNvPr id="8" name="7 Imagen"/>
           <p:cNvPicPr>
             <a:picLocks noChangeAspect="1"/>
           </p:cNvPicPr>
@@ -23753,25 +24512,527 @@
         </p:nvPicPr>
         <p:blipFill>
           <a:blip r:embed="rId5" cstate="print"/>
+          <a:srcRect/>
           <a:stretch>
             <a:fillRect/>
           </a:stretch>
         </p:blipFill>
-        <p:spPr>
+        <p:spPr bwMode="auto">
           <a:xfrm>
-            <a:off x="5500694" y="2571744"/>
-            <a:ext cx="2562047" cy="2011485"/>
+            <a:off x="5173864" y="2399547"/>
+            <a:ext cx="3456000" cy="2350469"/>
           </a:xfrm>
           <a:prstGeom prst="rect">
             <a:avLst/>
           </a:prstGeom>
+          <a:ln>
+            <a:noFill/>
+          </a:ln>
+          <a:effectLst>
+            <a:outerShdw blurRad="190500" algn="tl" rotWithShape="0">
+              <a:srgbClr val="000000">
+                <a:alpha val="70000"/>
+              </a:srgbClr>
+            </a:outerShdw>
+          </a:effectLst>
         </p:spPr>
       </p:pic>
+      <p:sp>
+        <p:nvSpPr>
+          <p:cNvPr id="10" name="9 CuadroTexto"/>
+          <p:cNvSpPr txBox="1"/>
+          <p:nvPr/>
+        </p:nvSpPr>
+        <p:spPr>
+          <a:xfrm>
+            <a:off x="1081708" y="4925369"/>
+            <a:ext cx="6686767" cy="1383951"/>
+          </a:xfrm>
+          <a:prstGeom prst="rect">
+            <a:avLst/>
+          </a:prstGeom>
+          <a:noFill/>
+          <a:ln w="9525">
+            <a:noFill/>
+            <a:miter lim="800000"/>
+            <a:headEnd/>
+            <a:tailEnd/>
+          </a:ln>
+        </p:spPr>
+        <p:txBody>
+          <a:bodyPr vert="horz" wrap="square" lIns="92075" tIns="46038" rIns="92075" bIns="46038" numCol="1" anchor="t" anchorCtr="0" compatLnSpc="1">
+            <a:prstTxWarp prst="textNoShape">
+              <a:avLst/>
+            </a:prstTxWarp>
+          </a:bodyPr>
+          <a:lstStyle/>
+          <a:p>
+            <a:pPr marL="261938" indent="-261938" eaLnBrk="0" hangingPunct="0">
+              <a:spcBef>
+                <a:spcPts val="0"/>
+              </a:spcBef>
+              <a:spcAft>
+                <a:spcPts val="0"/>
+              </a:spcAft>
+              <a:buClr>
+                <a:schemeClr val="tx2"/>
+              </a:buClr>
+              <a:buSzPct val="70000"/>
+              <a:buFont typeface="Arial" pitchFamily="34" charset="0"/>
+              <a:buChar char="•"/>
+              <a:defRPr/>
+            </a:pPr>
+            <a:r>
+              <a:rPr lang="es-AR" sz="3200" kern="0" dirty="0" smtClean="0">
+                <a:solidFill>
+                  <a:schemeClr val="tx2">
+                    <a:lumMod val="50000"/>
+                  </a:schemeClr>
+                </a:solidFill>
+                <a:latin typeface="Cambria" pitchFamily="18" charset="0"/>
+                <a:cs typeface="Arial" charset="0"/>
+              </a:rPr>
+              <a:t>Evitar Síndrome del </a:t>
+            </a:r>
+            <a:r>
+              <a:rPr lang="es-AR" sz="3200" kern="0" dirty="0" smtClean="0">
+                <a:solidFill>
+                  <a:schemeClr val="tx2">
+                    <a:lumMod val="50000"/>
+                  </a:schemeClr>
+                </a:solidFill>
+                <a:latin typeface="Cambria" pitchFamily="18" charset="0"/>
+                <a:cs typeface="Arial" charset="0"/>
+              </a:rPr>
+              <a:t>Estudiante: Mantener </a:t>
+            </a:r>
+            <a:r>
+              <a:rPr lang="es-AR" sz="3200" kern="0" dirty="0" smtClean="0">
+                <a:solidFill>
+                  <a:schemeClr val="tx2">
+                    <a:lumMod val="50000"/>
+                  </a:schemeClr>
+                </a:solidFill>
+                <a:latin typeface="Cambria" pitchFamily="18" charset="0"/>
+                <a:cs typeface="Arial" charset="0"/>
+              </a:rPr>
+              <a:t>objetivos de corto </a:t>
+            </a:r>
+            <a:r>
+              <a:rPr lang="es-AR" sz="3200" kern="0" dirty="0" smtClean="0">
+                <a:solidFill>
+                  <a:schemeClr val="tx2">
+                    <a:lumMod val="50000"/>
+                  </a:schemeClr>
+                </a:solidFill>
+                <a:latin typeface="Cambria" pitchFamily="18" charset="0"/>
+                <a:cs typeface="Arial" charset="0"/>
+              </a:rPr>
+              <a:t>plazo</a:t>
+            </a:r>
+            <a:endParaRPr lang="es-AR" sz="3200" kern="0" dirty="0" smtClean="0">
+              <a:solidFill>
+                <a:schemeClr val="tx2">
+                  <a:lumMod val="50000"/>
+                </a:schemeClr>
+              </a:solidFill>
+              <a:latin typeface="Cambria" pitchFamily="18" charset="0"/>
+              <a:cs typeface="Arial" charset="0"/>
+            </a:endParaRPr>
+          </a:p>
+        </p:txBody>
+      </p:sp>
     </p:spTree>
   </p:cSld>
   <p:clrMapOvr>
     <a:masterClrMapping/>
   </p:clrMapOvr>
+  <p:timing>
+    <p:tnLst>
+      <p:par>
+        <p:cTn id="1" dur="indefinite" restart="never" nodeType="tmRoot">
+          <p:childTnLst>
+            <p:seq concurrent="1" nextAc="seek">
+              <p:cTn id="2" dur="indefinite" nodeType="mainSeq">
+                <p:childTnLst>
+                  <p:par>
+                    <p:cTn id="3" fill="hold">
+                      <p:stCondLst>
+                        <p:cond delay="indefinite"/>
+                        <p:cond evt="onBegin" delay="0">
+                          <p:tn val="2"/>
+                        </p:cond>
+                      </p:stCondLst>
+                      <p:childTnLst>
+                        <p:par>
+                          <p:cTn id="4" fill="hold">
+                            <p:stCondLst>
+                              <p:cond delay="0"/>
+                            </p:stCondLst>
+                            <p:childTnLst>
+                              <p:par>
+                                <p:cTn id="5" presetID="3" presetClass="entr" presetSubtype="10" fill="hold" grpId="0" nodeType="withEffect">
+                                  <p:stCondLst>
+                                    <p:cond delay="0"/>
+                                  </p:stCondLst>
+                                  <p:childTnLst>
+                                    <p:set>
+                                      <p:cBhvr>
+                                        <p:cTn id="6" dur="1" fill="hold">
+                                          <p:stCondLst>
+                                            <p:cond delay="0"/>
+                                          </p:stCondLst>
+                                        </p:cTn>
+                                        <p:tgtEl>
+                                          <p:spTgt spid="5"/>
+                                        </p:tgtEl>
+                                        <p:attrNameLst>
+                                          <p:attrName>style.visibility</p:attrName>
+                                        </p:attrNameLst>
+                                      </p:cBhvr>
+                                      <p:to>
+                                        <p:strVal val="visible"/>
+                                      </p:to>
+                                    </p:set>
+                                    <p:animEffect transition="in" filter="blinds(horizontal)">
+                                      <p:cBhvr>
+                                        <p:cTn id="7" dur="500"/>
+                                        <p:tgtEl>
+                                          <p:spTgt spid="5"/>
+                                        </p:tgtEl>
+                                      </p:cBhvr>
+                                    </p:animEffect>
+                                  </p:childTnLst>
+                                </p:cTn>
+                              </p:par>
+                              <p:par>
+                                <p:cTn id="8" presetID="55" presetClass="entr" presetSubtype="0" fill="hold" nodeType="withEffect">
+                                  <p:stCondLst>
+                                    <p:cond delay="0"/>
+                                  </p:stCondLst>
+                                  <p:childTnLst>
+                                    <p:set>
+                                      <p:cBhvr>
+                                        <p:cTn id="9" dur="1" fill="hold">
+                                          <p:stCondLst>
+                                            <p:cond delay="0"/>
+                                          </p:stCondLst>
+                                        </p:cTn>
+                                        <p:tgtEl>
+                                          <p:spTgt spid="7"/>
+                                        </p:tgtEl>
+                                        <p:attrNameLst>
+                                          <p:attrName>style.visibility</p:attrName>
+                                        </p:attrNameLst>
+                                      </p:cBhvr>
+                                      <p:to>
+                                        <p:strVal val="visible"/>
+                                      </p:to>
+                                    </p:set>
+                                    <p:anim calcmode="lin" valueType="num">
+                                      <p:cBhvr>
+                                        <p:cTn id="10" dur="1000" fill="hold"/>
+                                        <p:tgtEl>
+                                          <p:spTgt spid="7"/>
+                                        </p:tgtEl>
+                                        <p:attrNameLst>
+                                          <p:attrName>ppt_w</p:attrName>
+                                        </p:attrNameLst>
+                                      </p:cBhvr>
+                                      <p:tavLst>
+                                        <p:tav tm="0">
+                                          <p:val>
+                                            <p:strVal val="#ppt_w*0.70"/>
+                                          </p:val>
+                                        </p:tav>
+                                        <p:tav tm="100000">
+                                          <p:val>
+                                            <p:strVal val="#ppt_w"/>
+                                          </p:val>
+                                        </p:tav>
+                                      </p:tavLst>
+                                    </p:anim>
+                                    <p:anim calcmode="lin" valueType="num">
+                                      <p:cBhvr>
+                                        <p:cTn id="11" dur="1000" fill="hold"/>
+                                        <p:tgtEl>
+                                          <p:spTgt spid="7"/>
+                                        </p:tgtEl>
+                                        <p:attrNameLst>
+                                          <p:attrName>ppt_h</p:attrName>
+                                        </p:attrNameLst>
+                                      </p:cBhvr>
+                                      <p:tavLst>
+                                        <p:tav tm="0">
+                                          <p:val>
+                                            <p:strVal val="#ppt_h"/>
+                                          </p:val>
+                                        </p:tav>
+                                        <p:tav tm="100000">
+                                          <p:val>
+                                            <p:strVal val="#ppt_h"/>
+                                          </p:val>
+                                        </p:tav>
+                                      </p:tavLst>
+                                    </p:anim>
+                                    <p:animEffect transition="in" filter="fade">
+                                      <p:cBhvr>
+                                        <p:cTn id="12" dur="1000"/>
+                                        <p:tgtEl>
+                                          <p:spTgt spid="7"/>
+                                        </p:tgtEl>
+                                      </p:cBhvr>
+                                    </p:animEffect>
+                                  </p:childTnLst>
+                                </p:cTn>
+                              </p:par>
+                              <p:par>
+                                <p:cTn id="13" presetID="55" presetClass="entr" presetSubtype="0" fill="hold" nodeType="withEffect">
+                                  <p:stCondLst>
+                                    <p:cond delay="0"/>
+                                  </p:stCondLst>
+                                  <p:childTnLst>
+                                    <p:set>
+                                      <p:cBhvr>
+                                        <p:cTn id="14" dur="1" fill="hold">
+                                          <p:stCondLst>
+                                            <p:cond delay="0"/>
+                                          </p:stCondLst>
+                                        </p:cTn>
+                                        <p:tgtEl>
+                                          <p:spTgt spid="8"/>
+                                        </p:tgtEl>
+                                        <p:attrNameLst>
+                                          <p:attrName>style.visibility</p:attrName>
+                                        </p:attrNameLst>
+                                      </p:cBhvr>
+                                      <p:to>
+                                        <p:strVal val="visible"/>
+                                      </p:to>
+                                    </p:set>
+                                    <p:anim calcmode="lin" valueType="num">
+                                      <p:cBhvr>
+                                        <p:cTn id="15" dur="1000" fill="hold"/>
+                                        <p:tgtEl>
+                                          <p:spTgt spid="8"/>
+                                        </p:tgtEl>
+                                        <p:attrNameLst>
+                                          <p:attrName>ppt_w</p:attrName>
+                                        </p:attrNameLst>
+                                      </p:cBhvr>
+                                      <p:tavLst>
+                                        <p:tav tm="0">
+                                          <p:val>
+                                            <p:strVal val="#ppt_w*0.70"/>
+                                          </p:val>
+                                        </p:tav>
+                                        <p:tav tm="100000">
+                                          <p:val>
+                                            <p:strVal val="#ppt_w"/>
+                                          </p:val>
+                                        </p:tav>
+                                      </p:tavLst>
+                                    </p:anim>
+                                    <p:anim calcmode="lin" valueType="num">
+                                      <p:cBhvr>
+                                        <p:cTn id="16" dur="1000" fill="hold"/>
+                                        <p:tgtEl>
+                                          <p:spTgt spid="8"/>
+                                        </p:tgtEl>
+                                        <p:attrNameLst>
+                                          <p:attrName>ppt_h</p:attrName>
+                                        </p:attrNameLst>
+                                      </p:cBhvr>
+                                      <p:tavLst>
+                                        <p:tav tm="0">
+                                          <p:val>
+                                            <p:strVal val="#ppt_h"/>
+                                          </p:val>
+                                        </p:tav>
+                                        <p:tav tm="100000">
+                                          <p:val>
+                                            <p:strVal val="#ppt_h"/>
+                                          </p:val>
+                                        </p:tav>
+                                      </p:tavLst>
+                                    </p:anim>
+                                    <p:animEffect transition="in" filter="fade">
+                                      <p:cBhvr>
+                                        <p:cTn id="17" dur="1000"/>
+                                        <p:tgtEl>
+                                          <p:spTgt spid="8"/>
+                                        </p:tgtEl>
+                                      </p:cBhvr>
+                                    </p:animEffect>
+                                  </p:childTnLst>
+                                </p:cTn>
+                              </p:par>
+                            </p:childTnLst>
+                          </p:cTn>
+                        </p:par>
+                      </p:childTnLst>
+                    </p:cTn>
+                  </p:par>
+                  <p:par>
+                    <p:cTn id="18" fill="hold">
+                      <p:stCondLst>
+                        <p:cond delay="indefinite"/>
+                      </p:stCondLst>
+                      <p:childTnLst>
+                        <p:par>
+                          <p:cTn id="19" fill="hold">
+                            <p:stCondLst>
+                              <p:cond delay="0"/>
+                            </p:stCondLst>
+                            <p:childTnLst>
+                              <p:par>
+                                <p:cTn id="20" presetID="3" presetClass="entr" presetSubtype="10" fill="hold" grpId="0" nodeType="clickEffect">
+                                  <p:stCondLst>
+                                    <p:cond delay="0"/>
+                                  </p:stCondLst>
+                                  <p:childTnLst>
+                                    <p:set>
+                                      <p:cBhvr>
+                                        <p:cTn id="21" dur="1" fill="hold">
+                                          <p:stCondLst>
+                                            <p:cond delay="0"/>
+                                          </p:stCondLst>
+                                        </p:cTn>
+                                        <p:tgtEl>
+                                          <p:spTgt spid="10"/>
+                                        </p:tgtEl>
+                                        <p:attrNameLst>
+                                          <p:attrName>style.visibility</p:attrName>
+                                        </p:attrNameLst>
+                                      </p:cBhvr>
+                                      <p:to>
+                                        <p:strVal val="visible"/>
+                                      </p:to>
+                                    </p:set>
+                                    <p:animEffect transition="in" filter="blinds(horizontal)">
+                                      <p:cBhvr>
+                                        <p:cTn id="22" dur="500"/>
+                                        <p:tgtEl>
+                                          <p:spTgt spid="10"/>
+                                        </p:tgtEl>
+                                      </p:cBhvr>
+                                    </p:animEffect>
+                                  </p:childTnLst>
+                                </p:cTn>
+                              </p:par>
+                              <p:par>
+                                <p:cTn id="23" presetID="55" presetClass="entr" presetSubtype="0" fill="hold" nodeType="withEffect">
+                                  <p:stCondLst>
+                                    <p:cond delay="0"/>
+                                  </p:stCondLst>
+                                  <p:childTnLst>
+                                    <p:set>
+                                      <p:cBhvr>
+                                        <p:cTn id="24" dur="1" fill="hold">
+                                          <p:stCondLst>
+                                            <p:cond delay="0"/>
+                                          </p:stCondLst>
+                                        </p:cTn>
+                                        <p:tgtEl>
+                                          <p:spTgt spid="3077"/>
+                                        </p:tgtEl>
+                                        <p:attrNameLst>
+                                          <p:attrName>style.visibility</p:attrName>
+                                        </p:attrNameLst>
+                                      </p:cBhvr>
+                                      <p:to>
+                                        <p:strVal val="visible"/>
+                                      </p:to>
+                                    </p:set>
+                                    <p:anim calcmode="lin" valueType="num">
+                                      <p:cBhvr>
+                                        <p:cTn id="25" dur="1000" fill="hold"/>
+                                        <p:tgtEl>
+                                          <p:spTgt spid="3077"/>
+                                        </p:tgtEl>
+                                        <p:attrNameLst>
+                                          <p:attrName>ppt_w</p:attrName>
+                                        </p:attrNameLst>
+                                      </p:cBhvr>
+                                      <p:tavLst>
+                                        <p:tav tm="0">
+                                          <p:val>
+                                            <p:strVal val="#ppt_w*0.70"/>
+                                          </p:val>
+                                        </p:tav>
+                                        <p:tav tm="100000">
+                                          <p:val>
+                                            <p:strVal val="#ppt_w"/>
+                                          </p:val>
+                                        </p:tav>
+                                      </p:tavLst>
+                                    </p:anim>
+                                    <p:anim calcmode="lin" valueType="num">
+                                      <p:cBhvr>
+                                        <p:cTn id="26" dur="1000" fill="hold"/>
+                                        <p:tgtEl>
+                                          <p:spTgt spid="3077"/>
+                                        </p:tgtEl>
+                                        <p:attrNameLst>
+                                          <p:attrName>ppt_h</p:attrName>
+                                        </p:attrNameLst>
+                                      </p:cBhvr>
+                                      <p:tavLst>
+                                        <p:tav tm="0">
+                                          <p:val>
+                                            <p:strVal val="#ppt_h"/>
+                                          </p:val>
+                                        </p:tav>
+                                        <p:tav tm="100000">
+                                          <p:val>
+                                            <p:strVal val="#ppt_h"/>
+                                          </p:val>
+                                        </p:tav>
+                                      </p:tavLst>
+                                    </p:anim>
+                                    <p:animEffect transition="in" filter="fade">
+                                      <p:cBhvr>
+                                        <p:cTn id="27" dur="1000"/>
+                                        <p:tgtEl>
+                                          <p:spTgt spid="3077"/>
+                                        </p:tgtEl>
+                                      </p:cBhvr>
+                                    </p:animEffect>
+                                  </p:childTnLst>
+                                </p:cTn>
+                              </p:par>
+                            </p:childTnLst>
+                          </p:cTn>
+                        </p:par>
+                      </p:childTnLst>
+                    </p:cTn>
+                  </p:par>
+                </p:childTnLst>
+              </p:cTn>
+              <p:prevCondLst>
+                <p:cond evt="onPrev" delay="0">
+                  <p:tgtEl>
+                    <p:sldTgt/>
+                  </p:tgtEl>
+                </p:cond>
+              </p:prevCondLst>
+              <p:nextCondLst>
+                <p:cond evt="onNext" delay="0">
+                  <p:tgtEl>
+                    <p:sldTgt/>
+                  </p:tgtEl>
+                </p:cond>
+              </p:nextCondLst>
+            </p:seq>
+          </p:childTnLst>
+        </p:cTn>
+      </p:par>
+    </p:tnLst>
+    <p:bldLst>
+      <p:bldP spid="5" grpId="0"/>
+      <p:bldP spid="10" grpId="0"/>
+    </p:bldLst>
+  </p:timing>
 </p:sld>
 </file>
 
@@ -23957,8 +25218,8 @@
           </p:blipFill>
           <p:spPr bwMode="auto">
             <a:xfrm>
-              <a:off x="3635896" y="3068960"/>
-              <a:ext cx="1857388" cy="1857388"/>
+              <a:off x="3707904" y="3140968"/>
+              <a:ext cx="1785380" cy="1785380"/>
             </a:xfrm>
             <a:prstGeom prst="rect">
               <a:avLst/>
@@ -24886,7 +26147,7 @@
             <p:nvPr/>
           </p:nvPicPr>
           <p:blipFill>
-            <a:blip r:embed="rId7" cstate="print"/>
+            <a:blip r:embed="rId8" cstate="print"/>
             <a:srcRect/>
             <a:stretch>
               <a:fillRect/>
@@ -24921,7 +26182,7 @@
             <p:nvPr/>
           </p:nvPicPr>
           <p:blipFill>
-            <a:blip r:embed="rId8" cstate="print"/>
+            <a:blip r:embed="rId9" cstate="print"/>
             <a:srcRect/>
             <a:stretch>
               <a:fillRect/>
@@ -24956,7 +26217,7 @@
             <p:nvPr/>
           </p:nvPicPr>
           <p:blipFill>
-            <a:blip r:embed="rId7" cstate="print"/>
+            <a:blip r:embed="rId8" cstate="print"/>
             <a:srcRect/>
             <a:stretch>
               <a:fillRect/>
@@ -25000,6 +26261,9 @@
                     <p:cTn id="3" fill="hold">
                       <p:stCondLst>
                         <p:cond delay="indefinite"/>
+                        <p:cond evt="onBegin" delay="0">
+                          <p:tn val="2"/>
+                        </p:cond>
                       </p:stCondLst>
                       <p:childTnLst>
                         <p:par>
@@ -25009,7 +26273,7 @@
                             </p:stCondLst>
                             <p:childTnLst>
                               <p:par>
-                                <p:cTn id="5" presetID="2" presetClass="entr" presetSubtype="4" fill="hold" nodeType="clickEffect">
+                                <p:cTn id="5" presetID="2" presetClass="entr" presetSubtype="4" fill="hold" nodeType="withEffect">
                                   <p:stCondLst>
                                     <p:cond delay="0"/>
                                   </p:stCondLst>
@@ -25154,8 +26418,11 @@
               <a:rPr lang="es-AR" dirty="0" smtClean="0">
                 <a:latin typeface="Copperplate Gothic Bold" pitchFamily="34" charset="0"/>
               </a:rPr>
-              <a:t>ACEPTACION</a:t>
-            </a:r>
+              <a:t>Aceptación</a:t>
+            </a:r>
+            <a:endParaRPr lang="es-AR" dirty="0" smtClean="0">
+              <a:latin typeface="Copperplate Gothic Bold" pitchFamily="34" charset="0"/>
+            </a:endParaRPr>
           </a:p>
         </p:txBody>
       </p:sp>
@@ -25256,7 +26523,7 @@
           <p:nvPr/>
         </p:nvPicPr>
         <p:blipFill>
-          <a:blip r:embed="rId7" cstate="print"/>
+          <a:blip r:embed="rId8" cstate="print"/>
           <a:srcRect/>
           <a:stretch>
             <a:fillRect/>
@@ -25615,11 +26882,20 @@
           <a:p>
             <a:pPr eaLnBrk="1" hangingPunct="1"/>
             <a:r>
-              <a:rPr lang="es-AR" sz="3200" smtClean="0">
+              <a:rPr lang="es-AR" dirty="0" smtClean="0">
                 <a:latin typeface="Copperplate Gothic Bold" pitchFamily="34" charset="0"/>
               </a:rPr>
-              <a:t>Seguimiento y Control</a:t>
-            </a:r>
+              <a:t>Seguimiento y </a:t>
+            </a:r>
+            <a:r>
+              <a:rPr lang="es-AR" dirty="0" smtClean="0">
+                <a:latin typeface="Copperplate Gothic Bold" pitchFamily="34" charset="0"/>
+              </a:rPr>
+              <a:t>Control (1)</a:t>
+            </a:r>
+            <a:endParaRPr lang="es-AR" dirty="0" smtClean="0">
+              <a:latin typeface="Copperplate Gothic Bold" pitchFamily="34" charset="0"/>
+            </a:endParaRPr>
           </a:p>
         </p:txBody>
       </p:sp>
@@ -25924,11 +27200,26 @@
           <a:p>
             <a:pPr eaLnBrk="1" hangingPunct="1"/>
             <a:r>
-              <a:rPr lang="es-AR" sz="3200" smtClean="0">
+              <a:rPr lang="es-AR" dirty="0" smtClean="0">
                 <a:latin typeface="Copperplate Gothic Bold" pitchFamily="34" charset="0"/>
               </a:rPr>
-              <a:t>Seguimiento y Control</a:t>
-            </a:r>
+              <a:t>Seguimiento y </a:t>
+            </a:r>
+            <a:r>
+              <a:rPr lang="es-AR" dirty="0" smtClean="0">
+                <a:latin typeface="Copperplate Gothic Bold" pitchFamily="34" charset="0"/>
+              </a:rPr>
+              <a:t>Control </a:t>
+            </a:r>
+            <a:r>
+              <a:rPr lang="es-AR" dirty="0" smtClean="0">
+                <a:latin typeface="Copperplate Gothic Bold" pitchFamily="34" charset="0"/>
+              </a:rPr>
+              <a:t>(2)</a:t>
+            </a:r>
+            <a:endParaRPr lang="es-AR" dirty="0" smtClean="0">
+              <a:latin typeface="Copperplate Gothic Bold" pitchFamily="34" charset="0"/>
+            </a:endParaRPr>
           </a:p>
         </p:txBody>
       </p:sp>
@@ -26233,11 +27524,26 @@
           <a:p>
             <a:pPr eaLnBrk="1" hangingPunct="1"/>
             <a:r>
-              <a:rPr lang="es-AR" sz="3200" smtClean="0">
+              <a:rPr lang="es-AR" dirty="0" smtClean="0">
                 <a:latin typeface="Copperplate Gothic Bold" pitchFamily="34" charset="0"/>
               </a:rPr>
-              <a:t>Seguimiento y Control</a:t>
-            </a:r>
+              <a:t>Seguimiento y </a:t>
+            </a:r>
+            <a:r>
+              <a:rPr lang="es-AR" dirty="0" smtClean="0">
+                <a:latin typeface="Copperplate Gothic Bold" pitchFamily="34" charset="0"/>
+              </a:rPr>
+              <a:t>Control </a:t>
+            </a:r>
+            <a:r>
+              <a:rPr lang="es-AR" dirty="0" smtClean="0">
+                <a:latin typeface="Copperplate Gothic Bold" pitchFamily="34" charset="0"/>
+              </a:rPr>
+              <a:t>(3)</a:t>
+            </a:r>
+            <a:endParaRPr lang="es-AR" dirty="0" smtClean="0">
+              <a:latin typeface="Copperplate Gothic Bold" pitchFamily="34" charset="0"/>
+            </a:endParaRPr>
           </a:p>
         </p:txBody>
       </p:sp>
@@ -26251,7 +27557,7 @@
         </p:nvSpPr>
         <p:spPr bwMode="auto">
           <a:xfrm>
-            <a:off x="1403648" y="1657266"/>
+            <a:off x="1403648" y="1644566"/>
             <a:ext cx="4033837" cy="523220"/>
           </a:xfrm>
           <a:prstGeom prst="rect">
@@ -26303,7 +27609,7 @@
         </p:nvGrpSpPr>
         <p:grpSpPr>
           <a:xfrm>
-            <a:off x="971600" y="2132856"/>
+            <a:off x="997000" y="2120156"/>
             <a:ext cx="7805330" cy="4536504"/>
             <a:chOff x="971600" y="2132856"/>
             <a:chExt cx="7805330" cy="4536504"/>
@@ -26532,8 +27838,17 @@
               <a:rPr lang="es-AR" dirty="0" smtClean="0">
                 <a:latin typeface="Copperplate Gothic Bold" pitchFamily="34" charset="0"/>
               </a:rPr>
-              <a:t>Desvíos No Planificados</a:t>
-            </a:r>
+              <a:t>Desvíos No </a:t>
+            </a:r>
+            <a:r>
+              <a:rPr lang="es-AR" dirty="0" smtClean="0">
+                <a:latin typeface="Copperplate Gothic Bold" pitchFamily="34" charset="0"/>
+              </a:rPr>
+              <a:t>Planificados</a:t>
+            </a:r>
+            <a:endParaRPr lang="es-AR" dirty="0" smtClean="0">
+              <a:latin typeface="Copperplate Gothic Bold" pitchFamily="34" charset="0"/>
+            </a:endParaRPr>
           </a:p>
         </p:txBody>
       </p:sp>

</xml_diff>